<commit_message>
Add risk mitigation slide
</commit_message>
<xml_diff>
--- a/Valuation/Field_Progress_App_Prototype_Pres_20191004.pptx
+++ b/Valuation/Field_Progress_App_Prototype_Pres_20191004.pptx
@@ -1,39 +1,40 @@
 
 <file path=ppt/presentation.xml><?xml version="1.0" encoding="utf-8"?>
-<p:presentation xmlns:a="http://schemas.openxmlformats.org/drawingml/2006/main" xmlns:r="http://schemas.openxmlformats.org/officeDocument/2006/relationships" xmlns:mc="http://schemas.openxmlformats.org/markup-compatibility/2006" xmlns:mv="urn:schemas-microsoft-com:mac:vml" xmlns:p="http://schemas.openxmlformats.org/presentationml/2006/main" xmlns:c="http://schemas.openxmlformats.org/drawingml/2006/chart" xmlns:dgm="http://schemas.openxmlformats.org/drawingml/2006/diagram" xmlns:o="urn:schemas-microsoft-com:office:office" xmlns:v="urn:schemas-microsoft-com:vml" xmlns:pvml="urn:schemas-microsoft-com:office:powerpoint" xmlns:com="http://schemas.openxmlformats.org/drawingml/2006/compatibility" xmlns:p14="http://schemas.microsoft.com/office/powerpoint/2010/main" xmlns:p15="http://schemas.microsoft.com/office/powerpoint/2012/main" autoCompressPictures="0" embedTrueTypeFonts="1" strictFirstAndLastChars="0" saveSubsetFonts="1">
+<p:presentation xmlns:a="http://schemas.openxmlformats.org/drawingml/2006/main" xmlns:r="http://schemas.openxmlformats.org/officeDocument/2006/relationships" xmlns:p="http://schemas.openxmlformats.org/presentationml/2006/main" strictFirstAndLastChars="0" embedTrueTypeFonts="1" saveSubsetFonts="1" autoCompressPictures="0">
   <p:sldMasterIdLst>
-    <p:sldMasterId id="2147483659" r:id="rId4"/>
+    <p:sldMasterId id="2147483659" r:id="rId1"/>
   </p:sldMasterIdLst>
   <p:notesMasterIdLst>
-    <p:notesMasterId r:id="rId5"/>
+    <p:notesMasterId r:id="rId10"/>
   </p:notesMasterIdLst>
   <p:sldIdLst>
-    <p:sldId id="256" r:id="rId6"/>
-    <p:sldId id="257" r:id="rId7"/>
-    <p:sldId id="258" r:id="rId8"/>
-    <p:sldId id="259" r:id="rId9"/>
-    <p:sldId id="260" r:id="rId10"/>
-    <p:sldId id="261" r:id="rId11"/>
-    <p:sldId id="262" r:id="rId12"/>
+    <p:sldId id="256" r:id="rId2"/>
+    <p:sldId id="257" r:id="rId3"/>
+    <p:sldId id="258" r:id="rId4"/>
+    <p:sldId id="259" r:id="rId5"/>
+    <p:sldId id="260" r:id="rId6"/>
+    <p:sldId id="261" r:id="rId7"/>
+    <p:sldId id="262" r:id="rId8"/>
+    <p:sldId id="263" r:id="rId9"/>
   </p:sldIdLst>
-  <p:sldSz cy="5143500" cx="9144000"/>
+  <p:sldSz cx="9144000" cy="5143500" type="screen16x9"/>
   <p:notesSz cx="6858000" cy="9144000"/>
   <p:embeddedFontLst>
     <p:embeddedFont>
-      <p:font typeface="Roboto Slab"/>
-      <p:regular r:id="rId13"/>
-      <p:bold r:id="rId14"/>
+      <p:font typeface="Roboto" panose="02000000000000000000" pitchFamily="2" charset="0"/>
+      <p:regular r:id="rId11"/>
+      <p:bold r:id="rId12"/>
+      <p:italic r:id="rId13"/>
+      <p:boldItalic r:id="rId14"/>
     </p:embeddedFont>
     <p:embeddedFont>
-      <p:font typeface="Roboto"/>
+      <p:font typeface="Roboto Slab" pitchFamily="2" charset="0"/>
       <p:regular r:id="rId15"/>
       <p:bold r:id="rId16"/>
-      <p:italic r:id="rId17"/>
-      <p:boldItalic r:id="rId18"/>
     </p:embeddedFont>
   </p:embeddedFontLst>
   <p:defaultTextStyle>
-    <a:defPPr lvl="0" marR="0" rtl="0" algn="l">
+    <a:defPPr marR="0" lvl="0" algn="l" rtl="0">
       <a:lnSpc>
         <a:spcPct val="100000"/>
       </a:lnSpc>
@@ -44,7 +45,7 @@
         <a:spcPts val="0"/>
       </a:spcAft>
     </a:defPPr>
-    <a:lvl1pPr lvl="0" marR="0" rtl="0" algn="l">
+    <a:lvl1pPr marR="0" lvl="0" algn="l" rtl="0">
       <a:lnSpc>
         <a:spcPct val="100000"/>
       </a:lnSpc>
@@ -58,7 +59,7 @@
         <a:srgbClr val="000000"/>
       </a:buClr>
       <a:buFont typeface="Arial"/>
-      <a:defRPr b="0" i="0" sz="1400" u="none" cap="none" strike="noStrike">
+      <a:defRPr sz="1400" b="0" i="0" u="none" strike="noStrike" cap="none">
         <a:solidFill>
           <a:srgbClr val="000000"/>
         </a:solidFill>
@@ -68,7 +69,7 @@
         <a:sym typeface="Arial"/>
       </a:defRPr>
     </a:lvl1pPr>
-    <a:lvl2pPr lvl="1" marR="0" rtl="0" algn="l">
+    <a:lvl2pPr marR="0" lvl="1" algn="l" rtl="0">
       <a:lnSpc>
         <a:spcPct val="100000"/>
       </a:lnSpc>
@@ -82,7 +83,7 @@
         <a:srgbClr val="000000"/>
       </a:buClr>
       <a:buFont typeface="Arial"/>
-      <a:defRPr b="0" i="0" sz="1400" u="none" cap="none" strike="noStrike">
+      <a:defRPr sz="1400" b="0" i="0" u="none" strike="noStrike" cap="none">
         <a:solidFill>
           <a:srgbClr val="000000"/>
         </a:solidFill>
@@ -92,7 +93,7 @@
         <a:sym typeface="Arial"/>
       </a:defRPr>
     </a:lvl2pPr>
-    <a:lvl3pPr lvl="2" marR="0" rtl="0" algn="l">
+    <a:lvl3pPr marR="0" lvl="2" algn="l" rtl="0">
       <a:lnSpc>
         <a:spcPct val="100000"/>
       </a:lnSpc>
@@ -106,7 +107,7 @@
         <a:srgbClr val="000000"/>
       </a:buClr>
       <a:buFont typeface="Arial"/>
-      <a:defRPr b="0" i="0" sz="1400" u="none" cap="none" strike="noStrike">
+      <a:defRPr sz="1400" b="0" i="0" u="none" strike="noStrike" cap="none">
         <a:solidFill>
           <a:srgbClr val="000000"/>
         </a:solidFill>
@@ -116,7 +117,7 @@
         <a:sym typeface="Arial"/>
       </a:defRPr>
     </a:lvl3pPr>
-    <a:lvl4pPr lvl="3" marR="0" rtl="0" algn="l">
+    <a:lvl4pPr marR="0" lvl="3" algn="l" rtl="0">
       <a:lnSpc>
         <a:spcPct val="100000"/>
       </a:lnSpc>
@@ -130,7 +131,7 @@
         <a:srgbClr val="000000"/>
       </a:buClr>
       <a:buFont typeface="Arial"/>
-      <a:defRPr b="0" i="0" sz="1400" u="none" cap="none" strike="noStrike">
+      <a:defRPr sz="1400" b="0" i="0" u="none" strike="noStrike" cap="none">
         <a:solidFill>
           <a:srgbClr val="000000"/>
         </a:solidFill>
@@ -140,7 +141,7 @@
         <a:sym typeface="Arial"/>
       </a:defRPr>
     </a:lvl4pPr>
-    <a:lvl5pPr lvl="4" marR="0" rtl="0" algn="l">
+    <a:lvl5pPr marR="0" lvl="4" algn="l" rtl="0">
       <a:lnSpc>
         <a:spcPct val="100000"/>
       </a:lnSpc>
@@ -154,7 +155,7 @@
         <a:srgbClr val="000000"/>
       </a:buClr>
       <a:buFont typeface="Arial"/>
-      <a:defRPr b="0" i="0" sz="1400" u="none" cap="none" strike="noStrike">
+      <a:defRPr sz="1400" b="0" i="0" u="none" strike="noStrike" cap="none">
         <a:solidFill>
           <a:srgbClr val="000000"/>
         </a:solidFill>
@@ -164,7 +165,7 @@
         <a:sym typeface="Arial"/>
       </a:defRPr>
     </a:lvl5pPr>
-    <a:lvl6pPr lvl="5" marR="0" rtl="0" algn="l">
+    <a:lvl6pPr marR="0" lvl="5" algn="l" rtl="0">
       <a:lnSpc>
         <a:spcPct val="100000"/>
       </a:lnSpc>
@@ -178,7 +179,7 @@
         <a:srgbClr val="000000"/>
       </a:buClr>
       <a:buFont typeface="Arial"/>
-      <a:defRPr b="0" i="0" sz="1400" u="none" cap="none" strike="noStrike">
+      <a:defRPr sz="1400" b="0" i="0" u="none" strike="noStrike" cap="none">
         <a:solidFill>
           <a:srgbClr val="000000"/>
         </a:solidFill>
@@ -188,7 +189,7 @@
         <a:sym typeface="Arial"/>
       </a:defRPr>
     </a:lvl6pPr>
-    <a:lvl7pPr lvl="6" marR="0" rtl="0" algn="l">
+    <a:lvl7pPr marR="0" lvl="6" algn="l" rtl="0">
       <a:lnSpc>
         <a:spcPct val="100000"/>
       </a:lnSpc>
@@ -202,7 +203,7 @@
         <a:srgbClr val="000000"/>
       </a:buClr>
       <a:buFont typeface="Arial"/>
-      <a:defRPr b="0" i="0" sz="1400" u="none" cap="none" strike="noStrike">
+      <a:defRPr sz="1400" b="0" i="0" u="none" strike="noStrike" cap="none">
         <a:solidFill>
           <a:srgbClr val="000000"/>
         </a:solidFill>
@@ -212,7 +213,7 @@
         <a:sym typeface="Arial"/>
       </a:defRPr>
     </a:lvl7pPr>
-    <a:lvl8pPr lvl="7" marR="0" rtl="0" algn="l">
+    <a:lvl8pPr marR="0" lvl="7" algn="l" rtl="0">
       <a:lnSpc>
         <a:spcPct val="100000"/>
       </a:lnSpc>
@@ -226,7 +227,7 @@
         <a:srgbClr val="000000"/>
       </a:buClr>
       <a:buFont typeface="Arial"/>
-      <a:defRPr b="0" i="0" sz="1400" u="none" cap="none" strike="noStrike">
+      <a:defRPr sz="1400" b="0" i="0" u="none" strike="noStrike" cap="none">
         <a:solidFill>
           <a:srgbClr val="000000"/>
         </a:solidFill>
@@ -236,7 +237,7 @@
         <a:sym typeface="Arial"/>
       </a:defRPr>
     </a:lvl8pPr>
-    <a:lvl9pPr lvl="8" marR="0" rtl="0" algn="l">
+    <a:lvl9pPr marR="0" lvl="8" algn="l" rtl="0">
       <a:lnSpc>
         <a:spcPct val="100000"/>
       </a:lnSpc>
@@ -250,7 +251,7 @@
         <a:srgbClr val="000000"/>
       </a:buClr>
       <a:buFont typeface="Arial"/>
-      <a:defRPr b="0" i="0" sz="1400" u="none" cap="none" strike="noStrike">
+      <a:defRPr sz="1400" b="0" i="0" u="none" strike="noStrike" cap="none">
         <a:solidFill>
           <a:srgbClr val="000000"/>
         </a:solidFill>
@@ -263,7 +264,7 @@
   </p:defaultTextStyle>
   <p:extLst>
     <p:ext uri="{EFAFB233-063F-42B5-8137-9DF3F51BA10A}">
-      <p15:sldGuideLst>
+      <p15:sldGuideLst xmlns:p15="http://schemas.microsoft.com/office/powerpoint/2012/main">
         <p15:guide id="1" orient="horz" pos="1620">
           <p15:clr>
             <a:srgbClr val="A4A3A4"/>
@@ -281,11 +282,16 @@
 </file>
 
 <file path=ppt/notesMasters/notesMaster1.xml><?xml version="1.0" encoding="utf-8"?>
-<p:notesMaster xmlns:a="http://schemas.openxmlformats.org/drawingml/2006/main" xmlns:r="http://schemas.openxmlformats.org/officeDocument/2006/relationships" xmlns:mc="http://schemas.openxmlformats.org/markup-compatibility/2006" xmlns:mv="urn:schemas-microsoft-com:mac:vml" xmlns:p="http://schemas.openxmlformats.org/presentationml/2006/main" xmlns:c="http://schemas.openxmlformats.org/drawingml/2006/chart" xmlns:dgm="http://schemas.openxmlformats.org/drawingml/2006/diagram" xmlns:o="urn:schemas-microsoft-com:office:office" xmlns:v="urn:schemas-microsoft-com:vml" xmlns:pvml="urn:schemas-microsoft-com:office:powerpoint" xmlns:com="http://schemas.openxmlformats.org/drawingml/2006/compatibility" xmlns:p14="http://schemas.microsoft.com/office/powerpoint/2010/main" xmlns:p15="http://schemas.microsoft.com/office/powerpoint/2012/main">
+<p:notesMaster xmlns:a="http://schemas.openxmlformats.org/drawingml/2006/main" xmlns:r="http://schemas.openxmlformats.org/officeDocument/2006/relationships" xmlns:p="http://schemas.openxmlformats.org/presentationml/2006/main">
   <p:cSld>
+    <p:bg>
+      <p:bgRef idx="1001">
+        <a:schemeClr val="bg1"/>
+      </p:bgRef>
+    </p:bg>
     <p:spTree>
       <p:nvGrpSpPr>
-        <p:cNvPr id="2" name="Shape 2"/>
+        <p:cNvPr id="1" name="Shape 2"/>
         <p:cNvGrpSpPr/>
         <p:nvPr/>
       </p:nvGrpSpPr>
@@ -300,9 +306,11 @@
       <p:sp>
         <p:nvSpPr>
           <p:cNvPr id="3" name="Google Shape;3;n"/>
-          <p:cNvSpPr/>
+          <p:cNvSpPr>
+            <a:spLocks noGrp="1" noRot="1" noChangeAspect="1"/>
+          </p:cNvSpPr>
           <p:nvPr>
-            <p:ph idx="2" type="sldImg"/>
+            <p:ph type="sldImg" idx="2"/>
           </p:nvPr>
         </p:nvSpPr>
         <p:spPr>
@@ -311,9 +319,13 @@
             <a:ext cx="6096075" cy="3429000"/>
           </a:xfrm>
           <a:custGeom>
-            <a:rect b="b" l="l" r="r" t="t"/>
+            <a:avLst/>
+            <a:gdLst/>
+            <a:ahLst/>
+            <a:cxnLst/>
+            <a:rect l="l" t="t" r="r" b="b"/>
             <a:pathLst>
-              <a:path extrusionOk="0" h="120000" w="120000">
+              <a:path w="120000" h="120000" extrusionOk="0">
                 <a:moveTo>
                   <a:pt x="0" y="0"/>
                 </a:moveTo>
@@ -331,23 +343,25 @@
             </a:pathLst>
           </a:custGeom>
           <a:noFill/>
-          <a:ln cap="flat" cmpd="sng" w="9525">
+          <a:ln w="9525" cap="flat" cmpd="sng">
             <a:solidFill>
               <a:srgbClr val="000000"/>
             </a:solidFill>
             <a:prstDash val="solid"/>
             <a:round/>
-            <a:headEnd len="sm" w="sm" type="none"/>
-            <a:tailEnd len="sm" w="sm" type="none"/>
+            <a:headEnd type="none" w="sm" len="sm"/>
+            <a:tailEnd type="none" w="sm" len="sm"/>
           </a:ln>
         </p:spPr>
       </p:sp>
       <p:sp>
         <p:nvSpPr>
           <p:cNvPr id="4" name="Google Shape;4;n"/>
-          <p:cNvSpPr txBox="1"/>
+          <p:cNvSpPr txBox="1">
+            <a:spLocks noGrp="1"/>
+          </p:cNvSpPr>
           <p:nvPr>
-            <p:ph idx="1" type="body"/>
+            <p:ph type="body" idx="1"/>
           </p:nvPr>
         </p:nvSpPr>
         <p:spPr>
@@ -364,11 +378,11 @@
           </a:ln>
         </p:spPr>
         <p:txBody>
-          <a:bodyPr anchorCtr="0" anchor="t" bIns="91425" lIns="91425" spcFirstLastPara="1" rIns="91425" wrap="square" tIns="91425">
+          <a:bodyPr spcFirstLastPara="1" wrap="square" lIns="91425" tIns="91425" rIns="91425" bIns="91425" anchor="t" anchorCtr="0">
             <a:noAutofit/>
           </a:bodyPr>
           <a:lstStyle>
-            <a:lvl1pPr indent="-298450" lvl="0" marL="457200">
+            <a:lvl1pPr marL="457200" lvl="0" indent="-298450">
               <a:spcBef>
                 <a:spcPts val="0"/>
               </a:spcBef>
@@ -379,7 +393,7 @@
               <a:buChar char="●"/>
               <a:defRPr sz="1100"/>
             </a:lvl1pPr>
-            <a:lvl2pPr indent="-298450" lvl="1" marL="914400">
+            <a:lvl2pPr marL="914400" lvl="1" indent="-298450">
               <a:spcBef>
                 <a:spcPts val="0"/>
               </a:spcBef>
@@ -390,7 +404,7 @@
               <a:buChar char="○"/>
               <a:defRPr sz="1100"/>
             </a:lvl2pPr>
-            <a:lvl3pPr indent="-298450" lvl="2" marL="1371600">
+            <a:lvl3pPr marL="1371600" lvl="2" indent="-298450">
               <a:spcBef>
                 <a:spcPts val="0"/>
               </a:spcBef>
@@ -401,7 +415,7 @@
               <a:buChar char="■"/>
               <a:defRPr sz="1100"/>
             </a:lvl3pPr>
-            <a:lvl4pPr indent="-298450" lvl="3" marL="1828800">
+            <a:lvl4pPr marL="1828800" lvl="3" indent="-298450">
               <a:spcBef>
                 <a:spcPts val="0"/>
               </a:spcBef>
@@ -412,7 +426,7 @@
               <a:buChar char="●"/>
               <a:defRPr sz="1100"/>
             </a:lvl4pPr>
-            <a:lvl5pPr indent="-298450" lvl="4" marL="2286000">
+            <a:lvl5pPr marL="2286000" lvl="4" indent="-298450">
               <a:spcBef>
                 <a:spcPts val="0"/>
               </a:spcBef>
@@ -423,7 +437,7 @@
               <a:buChar char="○"/>
               <a:defRPr sz="1100"/>
             </a:lvl5pPr>
-            <a:lvl6pPr indent="-298450" lvl="5" marL="2743200">
+            <a:lvl6pPr marL="2743200" lvl="5" indent="-298450">
               <a:spcBef>
                 <a:spcPts val="0"/>
               </a:spcBef>
@@ -434,7 +448,7 @@
               <a:buChar char="■"/>
               <a:defRPr sz="1100"/>
             </a:lvl6pPr>
-            <a:lvl7pPr indent="-298450" lvl="6" marL="3200400">
+            <a:lvl7pPr marL="3200400" lvl="6" indent="-298450">
               <a:spcBef>
                 <a:spcPts val="0"/>
               </a:spcBef>
@@ -445,7 +459,7 @@
               <a:buChar char="●"/>
               <a:defRPr sz="1100"/>
             </a:lvl7pPr>
-            <a:lvl8pPr indent="-298450" lvl="7" marL="3657600">
+            <a:lvl8pPr marL="3657600" lvl="7" indent="-298450">
               <a:spcBef>
                 <a:spcPts val="0"/>
               </a:spcBef>
@@ -456,7 +470,7 @@
               <a:buChar char="○"/>
               <a:defRPr sz="1100"/>
             </a:lvl8pPr>
-            <a:lvl9pPr indent="-298450" lvl="8" marL="4114800">
+            <a:lvl9pPr marL="4114800" lvl="8" indent="-298450">
               <a:spcBef>
                 <a:spcPts val="0"/>
               </a:spcBef>
@@ -468,14 +482,16 @@
               <a:defRPr sz="1100"/>
             </a:lvl9pPr>
           </a:lstStyle>
-          <a:p/>
+          <a:p>
+            <a:endParaRPr/>
+          </a:p>
         </p:txBody>
       </p:sp>
     </p:spTree>
   </p:cSld>
-  <p:clrMap accent1="accent1" accent2="accent2" accent3="accent3" accent4="accent4" accent5="accent5" accent6="accent6" bg1="lt1" bg2="dk2" tx1="dk1" tx2="lt2" folHlink="folHlink" hlink="hlink"/>
+  <p:clrMap bg1="lt1" tx1="dk1" bg2="dk2" tx2="lt2" accent1="accent1" accent2="accent2" accent3="accent3" accent4="accent4" accent5="accent5" accent6="accent6" hlink="hlink" folHlink="folHlink"/>
   <p:notesStyle>
-    <a:defPPr lvl="0" marR="0" rtl="0" algn="l">
+    <a:defPPr marR="0" lvl="0" algn="l" rtl="0">
       <a:lnSpc>
         <a:spcPct val="100000"/>
       </a:lnSpc>
@@ -486,7 +502,7 @@
         <a:spcPts val="0"/>
       </a:spcAft>
     </a:defPPr>
-    <a:lvl1pPr lvl="0" marR="0" rtl="0" algn="l">
+    <a:lvl1pPr marR="0" lvl="0" algn="l" rtl="0">
       <a:lnSpc>
         <a:spcPct val="100000"/>
       </a:lnSpc>
@@ -500,7 +516,7 @@
         <a:srgbClr val="000000"/>
       </a:buClr>
       <a:buFont typeface="Arial"/>
-      <a:defRPr b="0" i="0" sz="1400" u="none" cap="none" strike="noStrike">
+      <a:defRPr sz="1400" b="0" i="0" u="none" strike="noStrike" cap="none">
         <a:solidFill>
           <a:srgbClr val="000000"/>
         </a:solidFill>
@@ -510,7 +526,7 @@
         <a:sym typeface="Arial"/>
       </a:defRPr>
     </a:lvl1pPr>
-    <a:lvl2pPr lvl="1" marR="0" rtl="0" algn="l">
+    <a:lvl2pPr marR="0" lvl="1" algn="l" rtl="0">
       <a:lnSpc>
         <a:spcPct val="100000"/>
       </a:lnSpc>
@@ -524,7 +540,7 @@
         <a:srgbClr val="000000"/>
       </a:buClr>
       <a:buFont typeface="Arial"/>
-      <a:defRPr b="0" i="0" sz="1400" u="none" cap="none" strike="noStrike">
+      <a:defRPr sz="1400" b="0" i="0" u="none" strike="noStrike" cap="none">
         <a:solidFill>
           <a:srgbClr val="000000"/>
         </a:solidFill>
@@ -534,7 +550,7 @@
         <a:sym typeface="Arial"/>
       </a:defRPr>
     </a:lvl2pPr>
-    <a:lvl3pPr lvl="2" marR="0" rtl="0" algn="l">
+    <a:lvl3pPr marR="0" lvl="2" algn="l" rtl="0">
       <a:lnSpc>
         <a:spcPct val="100000"/>
       </a:lnSpc>
@@ -548,7 +564,7 @@
         <a:srgbClr val="000000"/>
       </a:buClr>
       <a:buFont typeface="Arial"/>
-      <a:defRPr b="0" i="0" sz="1400" u="none" cap="none" strike="noStrike">
+      <a:defRPr sz="1400" b="0" i="0" u="none" strike="noStrike" cap="none">
         <a:solidFill>
           <a:srgbClr val="000000"/>
         </a:solidFill>
@@ -558,7 +574,7 @@
         <a:sym typeface="Arial"/>
       </a:defRPr>
     </a:lvl3pPr>
-    <a:lvl4pPr lvl="3" marR="0" rtl="0" algn="l">
+    <a:lvl4pPr marR="0" lvl="3" algn="l" rtl="0">
       <a:lnSpc>
         <a:spcPct val="100000"/>
       </a:lnSpc>
@@ -572,7 +588,7 @@
         <a:srgbClr val="000000"/>
       </a:buClr>
       <a:buFont typeface="Arial"/>
-      <a:defRPr b="0" i="0" sz="1400" u="none" cap="none" strike="noStrike">
+      <a:defRPr sz="1400" b="0" i="0" u="none" strike="noStrike" cap="none">
         <a:solidFill>
           <a:srgbClr val="000000"/>
         </a:solidFill>
@@ -582,7 +598,7 @@
         <a:sym typeface="Arial"/>
       </a:defRPr>
     </a:lvl4pPr>
-    <a:lvl5pPr lvl="4" marR="0" rtl="0" algn="l">
+    <a:lvl5pPr marR="0" lvl="4" algn="l" rtl="0">
       <a:lnSpc>
         <a:spcPct val="100000"/>
       </a:lnSpc>
@@ -596,7 +612,7 @@
         <a:srgbClr val="000000"/>
       </a:buClr>
       <a:buFont typeface="Arial"/>
-      <a:defRPr b="0" i="0" sz="1400" u="none" cap="none" strike="noStrike">
+      <a:defRPr sz="1400" b="0" i="0" u="none" strike="noStrike" cap="none">
         <a:solidFill>
           <a:srgbClr val="000000"/>
         </a:solidFill>
@@ -606,7 +622,7 @@
         <a:sym typeface="Arial"/>
       </a:defRPr>
     </a:lvl5pPr>
-    <a:lvl6pPr lvl="5" marR="0" rtl="0" algn="l">
+    <a:lvl6pPr marR="0" lvl="5" algn="l" rtl="0">
       <a:lnSpc>
         <a:spcPct val="100000"/>
       </a:lnSpc>
@@ -620,7 +636,7 @@
         <a:srgbClr val="000000"/>
       </a:buClr>
       <a:buFont typeface="Arial"/>
-      <a:defRPr b="0" i="0" sz="1400" u="none" cap="none" strike="noStrike">
+      <a:defRPr sz="1400" b="0" i="0" u="none" strike="noStrike" cap="none">
         <a:solidFill>
           <a:srgbClr val="000000"/>
         </a:solidFill>
@@ -630,7 +646,7 @@
         <a:sym typeface="Arial"/>
       </a:defRPr>
     </a:lvl6pPr>
-    <a:lvl7pPr lvl="6" marR="0" rtl="0" algn="l">
+    <a:lvl7pPr marR="0" lvl="6" algn="l" rtl="0">
       <a:lnSpc>
         <a:spcPct val="100000"/>
       </a:lnSpc>
@@ -644,7 +660,7 @@
         <a:srgbClr val="000000"/>
       </a:buClr>
       <a:buFont typeface="Arial"/>
-      <a:defRPr b="0" i="0" sz="1400" u="none" cap="none" strike="noStrike">
+      <a:defRPr sz="1400" b="0" i="0" u="none" strike="noStrike" cap="none">
         <a:solidFill>
           <a:srgbClr val="000000"/>
         </a:solidFill>
@@ -654,7 +670,7 @@
         <a:sym typeface="Arial"/>
       </a:defRPr>
     </a:lvl7pPr>
-    <a:lvl8pPr lvl="7" marR="0" rtl="0" algn="l">
+    <a:lvl8pPr marR="0" lvl="7" algn="l" rtl="0">
       <a:lnSpc>
         <a:spcPct val="100000"/>
       </a:lnSpc>
@@ -668,7 +684,7 @@
         <a:srgbClr val="000000"/>
       </a:buClr>
       <a:buFont typeface="Arial"/>
-      <a:defRPr b="0" i="0" sz="1400" u="none" cap="none" strike="noStrike">
+      <a:defRPr sz="1400" b="0" i="0" u="none" strike="noStrike" cap="none">
         <a:solidFill>
           <a:srgbClr val="000000"/>
         </a:solidFill>
@@ -678,7 +694,7 @@
         <a:sym typeface="Arial"/>
       </a:defRPr>
     </a:lvl8pPr>
-    <a:lvl9pPr lvl="8" marR="0" rtl="0" algn="l">
+    <a:lvl9pPr marR="0" lvl="8" algn="l" rtl="0">
       <a:lnSpc>
         <a:spcPct val="100000"/>
       </a:lnSpc>
@@ -692,7 +708,7 @@
         <a:srgbClr val="000000"/>
       </a:buClr>
       <a:buFont typeface="Arial"/>
-      <a:defRPr b="0" i="0" sz="1400" u="none" cap="none" strike="noStrike">
+      <a:defRPr sz="1400" b="0" i="0" u="none" strike="noStrike" cap="none">
         <a:solidFill>
           <a:srgbClr val="000000"/>
         </a:solidFill>
@@ -707,11 +723,11 @@
 </file>
 
 <file path=ppt/notesSlides/notesSlide1.xml><?xml version="1.0" encoding="utf-8"?>
-<p:notes xmlns:a="http://schemas.openxmlformats.org/drawingml/2006/main" xmlns:r="http://schemas.openxmlformats.org/officeDocument/2006/relationships" xmlns:mc="http://schemas.openxmlformats.org/markup-compatibility/2006" xmlns:mv="urn:schemas-microsoft-com:mac:vml" xmlns:p="http://schemas.openxmlformats.org/presentationml/2006/main" xmlns:c="http://schemas.openxmlformats.org/drawingml/2006/chart" xmlns:dgm="http://schemas.openxmlformats.org/drawingml/2006/diagram" xmlns:o="urn:schemas-microsoft-com:office:office" xmlns:v="urn:schemas-microsoft-com:vml" xmlns:pvml="urn:schemas-microsoft-com:office:powerpoint" xmlns:com="http://schemas.openxmlformats.org/drawingml/2006/compatibility" xmlns:p14="http://schemas.microsoft.com/office/powerpoint/2010/main" xmlns:p15="http://schemas.microsoft.com/office/powerpoint/2012/main" showMasterPhAnim="0" showMasterSp="0">
+<p:notes xmlns:a="http://schemas.openxmlformats.org/drawingml/2006/main" xmlns:r="http://schemas.openxmlformats.org/officeDocument/2006/relationships" xmlns:p="http://schemas.openxmlformats.org/presentationml/2006/main" showMasterSp="0" showMasterPhAnim="0">
   <p:cSld>
     <p:spTree>
       <p:nvGrpSpPr>
-        <p:cNvPr id="59" name="Shape 59"/>
+        <p:cNvPr id="1" name="Shape 59"/>
         <p:cNvGrpSpPr/>
         <p:nvPr/>
       </p:nvGrpSpPr>
@@ -726,9 +742,11 @@
       <p:sp>
         <p:nvSpPr>
           <p:cNvPr id="60" name="Google Shape;60;p:notes"/>
-          <p:cNvSpPr/>
+          <p:cNvSpPr>
+            <a:spLocks noGrp="1" noRot="1" noChangeAspect="1"/>
+          </p:cNvSpPr>
           <p:nvPr>
-            <p:ph idx="2" type="sldImg"/>
+            <p:ph type="sldImg" idx="2"/>
           </p:nvPr>
         </p:nvSpPr>
         <p:spPr>
@@ -737,9 +755,13 @@
             <a:ext cx="6096075" cy="3429000"/>
           </a:xfrm>
           <a:custGeom>
-            <a:rect b="b" l="l" r="r" t="t"/>
+            <a:avLst/>
+            <a:gdLst/>
+            <a:ahLst/>
+            <a:cxnLst/>
+            <a:rect l="l" t="t" r="r" b="b"/>
             <a:pathLst>
-              <a:path extrusionOk="0" h="120000" w="120000">
+              <a:path w="120000" h="120000" extrusionOk="0">
                 <a:moveTo>
                   <a:pt x="0" y="0"/>
                 </a:moveTo>
@@ -761,9 +783,11 @@
       <p:sp>
         <p:nvSpPr>
           <p:cNvPr id="61" name="Google Shape;61;p:notes"/>
-          <p:cNvSpPr txBox="1"/>
+          <p:cNvSpPr txBox="1">
+            <a:spLocks noGrp="1"/>
+          </p:cNvSpPr>
           <p:nvPr>
-            <p:ph idx="1" type="body"/>
+            <p:ph type="body" idx="1"/>
           </p:nvPr>
         </p:nvSpPr>
         <p:spPr>
@@ -776,12 +800,12 @@
           </a:prstGeom>
         </p:spPr>
         <p:txBody>
-          <a:bodyPr anchorCtr="0" anchor="t" bIns="91425" lIns="91425" spcFirstLastPara="1" rIns="91425" wrap="square" tIns="91425">
+          <a:bodyPr spcFirstLastPara="1" wrap="square" lIns="91425" tIns="91425" rIns="91425" bIns="91425" anchor="t" anchorCtr="0">
             <a:noAutofit/>
           </a:bodyPr>
           <a:lstStyle/>
           <a:p>
-            <a:pPr indent="0" lvl="0" marL="0" rtl="0" algn="l">
+            <a:pPr marL="0" lvl="0" indent="0" algn="l" rtl="0">
               <a:spcBef>
                 <a:spcPts val="0"/>
               </a:spcBef>
@@ -790,9 +814,6 @@
               </a:spcAft>
               <a:buNone/>
             </a:pPr>
-            <a:r>
-              <a:t/>
-            </a:r>
             <a:endParaRPr/>
           </a:p>
         </p:txBody>
@@ -806,11 +827,11 @@
 </file>
 
 <file path=ppt/notesSlides/notesSlide2.xml><?xml version="1.0" encoding="utf-8"?>
-<p:notes xmlns:a="http://schemas.openxmlformats.org/drawingml/2006/main" xmlns:r="http://schemas.openxmlformats.org/officeDocument/2006/relationships" xmlns:mc="http://schemas.openxmlformats.org/markup-compatibility/2006" xmlns:mv="urn:schemas-microsoft-com:mac:vml" xmlns:p="http://schemas.openxmlformats.org/presentationml/2006/main" xmlns:c="http://schemas.openxmlformats.org/drawingml/2006/chart" xmlns:dgm="http://schemas.openxmlformats.org/drawingml/2006/diagram" xmlns:o="urn:schemas-microsoft-com:office:office" xmlns:v="urn:schemas-microsoft-com:vml" xmlns:pvml="urn:schemas-microsoft-com:office:powerpoint" xmlns:com="http://schemas.openxmlformats.org/drawingml/2006/compatibility" xmlns:p14="http://schemas.microsoft.com/office/powerpoint/2010/main" xmlns:p15="http://schemas.microsoft.com/office/powerpoint/2012/main" showMasterPhAnim="0" showMasterSp="0">
+<p:notes xmlns:a="http://schemas.openxmlformats.org/drawingml/2006/main" xmlns:r="http://schemas.openxmlformats.org/officeDocument/2006/relationships" xmlns:p="http://schemas.openxmlformats.org/presentationml/2006/main" showMasterSp="0" showMasterPhAnim="0">
   <p:cSld>
     <p:spTree>
       <p:nvGrpSpPr>
-        <p:cNvPr id="66" name="Shape 66"/>
+        <p:cNvPr id="1" name="Shape 66"/>
         <p:cNvGrpSpPr/>
         <p:nvPr/>
       </p:nvGrpSpPr>
@@ -825,9 +846,11 @@
       <p:sp>
         <p:nvSpPr>
           <p:cNvPr id="67" name="Google Shape;67;g649ddd6b74_0_54:notes"/>
-          <p:cNvSpPr/>
+          <p:cNvSpPr>
+            <a:spLocks noGrp="1" noRot="1" noChangeAspect="1"/>
+          </p:cNvSpPr>
           <p:nvPr>
-            <p:ph idx="2" type="sldImg"/>
+            <p:ph type="sldImg" idx="2"/>
           </p:nvPr>
         </p:nvSpPr>
         <p:spPr>
@@ -836,9 +859,13 @@
             <a:ext cx="6096000" cy="3429000"/>
           </a:xfrm>
           <a:custGeom>
-            <a:rect b="b" l="l" r="r" t="t"/>
+            <a:avLst/>
+            <a:gdLst/>
+            <a:ahLst/>
+            <a:cxnLst/>
+            <a:rect l="l" t="t" r="r" b="b"/>
             <a:pathLst>
-              <a:path extrusionOk="0" h="120000" w="120000">
+              <a:path w="120000" h="120000" extrusionOk="0">
                 <a:moveTo>
                   <a:pt x="0" y="0"/>
                 </a:moveTo>
@@ -860,9 +887,11 @@
       <p:sp>
         <p:nvSpPr>
           <p:cNvPr id="68" name="Google Shape;68;g649ddd6b74_0_54:notes"/>
-          <p:cNvSpPr txBox="1"/>
+          <p:cNvSpPr txBox="1">
+            <a:spLocks noGrp="1"/>
+          </p:cNvSpPr>
           <p:nvPr>
-            <p:ph idx="1" type="body"/>
+            <p:ph type="body" idx="1"/>
           </p:nvPr>
         </p:nvSpPr>
         <p:spPr>
@@ -875,12 +904,12 @@
           </a:prstGeom>
         </p:spPr>
         <p:txBody>
-          <a:bodyPr anchorCtr="0" anchor="t" bIns="91425" lIns="91425" spcFirstLastPara="1" rIns="91425" wrap="square" tIns="91425">
+          <a:bodyPr spcFirstLastPara="1" wrap="square" lIns="91425" tIns="91425" rIns="91425" bIns="91425" anchor="t" anchorCtr="0">
             <a:noAutofit/>
           </a:bodyPr>
           <a:lstStyle/>
           <a:p>
-            <a:pPr indent="0" lvl="0" marL="0" rtl="0" algn="l">
+            <a:pPr marL="0" lvl="0" indent="0" algn="l" rtl="0">
               <a:spcBef>
                 <a:spcPts val="0"/>
               </a:spcBef>
@@ -889,9 +918,6 @@
               </a:spcAft>
               <a:buNone/>
             </a:pPr>
-            <a:r>
-              <a:t/>
-            </a:r>
             <a:endParaRPr/>
           </a:p>
         </p:txBody>
@@ -905,11 +931,11 @@
 </file>
 
 <file path=ppt/notesSlides/notesSlide3.xml><?xml version="1.0" encoding="utf-8"?>
-<p:notes xmlns:a="http://schemas.openxmlformats.org/drawingml/2006/main" xmlns:r="http://schemas.openxmlformats.org/officeDocument/2006/relationships" xmlns:mc="http://schemas.openxmlformats.org/markup-compatibility/2006" xmlns:mv="urn:schemas-microsoft-com:mac:vml" xmlns:p="http://schemas.openxmlformats.org/presentationml/2006/main" xmlns:c="http://schemas.openxmlformats.org/drawingml/2006/chart" xmlns:dgm="http://schemas.openxmlformats.org/drawingml/2006/diagram" xmlns:o="urn:schemas-microsoft-com:office:office" xmlns:v="urn:schemas-microsoft-com:vml" xmlns:pvml="urn:schemas-microsoft-com:office:powerpoint" xmlns:com="http://schemas.openxmlformats.org/drawingml/2006/compatibility" xmlns:p14="http://schemas.microsoft.com/office/powerpoint/2010/main" xmlns:p15="http://schemas.microsoft.com/office/powerpoint/2012/main" showMasterPhAnim="0" showMasterSp="0">
+<p:notes xmlns:a="http://schemas.openxmlformats.org/drawingml/2006/main" xmlns:r="http://schemas.openxmlformats.org/officeDocument/2006/relationships" xmlns:p="http://schemas.openxmlformats.org/presentationml/2006/main" showMasterSp="0" showMasterPhAnim="0">
   <p:cSld>
     <p:spTree>
       <p:nvGrpSpPr>
-        <p:cNvPr id="72" name="Shape 72"/>
+        <p:cNvPr id="1" name="Shape 72"/>
         <p:cNvGrpSpPr/>
         <p:nvPr/>
       </p:nvGrpSpPr>
@@ -924,9 +950,11 @@
       <p:sp>
         <p:nvSpPr>
           <p:cNvPr id="73" name="Google Shape;73;g649ddd6b74_0_59:notes"/>
-          <p:cNvSpPr/>
+          <p:cNvSpPr>
+            <a:spLocks noGrp="1" noRot="1" noChangeAspect="1"/>
+          </p:cNvSpPr>
           <p:nvPr>
-            <p:ph idx="2" type="sldImg"/>
+            <p:ph type="sldImg" idx="2"/>
           </p:nvPr>
         </p:nvSpPr>
         <p:spPr>
@@ -935,9 +963,13 @@
             <a:ext cx="6096000" cy="3429000"/>
           </a:xfrm>
           <a:custGeom>
-            <a:rect b="b" l="l" r="r" t="t"/>
+            <a:avLst/>
+            <a:gdLst/>
+            <a:ahLst/>
+            <a:cxnLst/>
+            <a:rect l="l" t="t" r="r" b="b"/>
             <a:pathLst>
-              <a:path extrusionOk="0" h="120000" w="120000">
+              <a:path w="120000" h="120000" extrusionOk="0">
                 <a:moveTo>
                   <a:pt x="0" y="0"/>
                 </a:moveTo>
@@ -959,9 +991,11 @@
       <p:sp>
         <p:nvSpPr>
           <p:cNvPr id="74" name="Google Shape;74;g649ddd6b74_0_59:notes"/>
-          <p:cNvSpPr txBox="1"/>
+          <p:cNvSpPr txBox="1">
+            <a:spLocks noGrp="1"/>
+          </p:cNvSpPr>
           <p:nvPr>
-            <p:ph idx="1" type="body"/>
+            <p:ph type="body" idx="1"/>
           </p:nvPr>
         </p:nvSpPr>
         <p:spPr>
@@ -974,12 +1008,12 @@
           </a:prstGeom>
         </p:spPr>
         <p:txBody>
-          <a:bodyPr anchorCtr="0" anchor="t" bIns="91425" lIns="91425" spcFirstLastPara="1" rIns="91425" wrap="square" tIns="91425">
+          <a:bodyPr spcFirstLastPara="1" wrap="square" lIns="91425" tIns="91425" rIns="91425" bIns="91425" anchor="t" anchorCtr="0">
             <a:noAutofit/>
           </a:bodyPr>
           <a:lstStyle/>
           <a:p>
-            <a:pPr indent="0" lvl="0" marL="0" rtl="0" algn="l">
+            <a:pPr marL="0" lvl="0" indent="0" algn="l" rtl="0">
               <a:spcBef>
                 <a:spcPts val="0"/>
               </a:spcBef>
@@ -988,9 +1022,6 @@
               </a:spcAft>
               <a:buNone/>
             </a:pPr>
-            <a:r>
-              <a:t/>
-            </a:r>
             <a:endParaRPr/>
           </a:p>
         </p:txBody>
@@ -1004,11 +1035,11 @@
 </file>
 
 <file path=ppt/notesSlides/notesSlide4.xml><?xml version="1.0" encoding="utf-8"?>
-<p:notes xmlns:a="http://schemas.openxmlformats.org/drawingml/2006/main" xmlns:r="http://schemas.openxmlformats.org/officeDocument/2006/relationships" xmlns:mc="http://schemas.openxmlformats.org/markup-compatibility/2006" xmlns:mv="urn:schemas-microsoft-com:mac:vml" xmlns:p="http://schemas.openxmlformats.org/presentationml/2006/main" xmlns:c="http://schemas.openxmlformats.org/drawingml/2006/chart" xmlns:dgm="http://schemas.openxmlformats.org/drawingml/2006/diagram" xmlns:o="urn:schemas-microsoft-com:office:office" xmlns:v="urn:schemas-microsoft-com:vml" xmlns:pvml="urn:schemas-microsoft-com:office:powerpoint" xmlns:com="http://schemas.openxmlformats.org/drawingml/2006/compatibility" xmlns:p14="http://schemas.microsoft.com/office/powerpoint/2010/main" xmlns:p15="http://schemas.microsoft.com/office/powerpoint/2012/main" showMasterPhAnim="0" showMasterSp="0">
+<p:notes xmlns:a="http://schemas.openxmlformats.org/drawingml/2006/main" xmlns:r="http://schemas.openxmlformats.org/officeDocument/2006/relationships" xmlns:p="http://schemas.openxmlformats.org/presentationml/2006/main" showMasterSp="0" showMasterPhAnim="0">
   <p:cSld>
     <p:spTree>
       <p:nvGrpSpPr>
-        <p:cNvPr id="78" name="Shape 78"/>
+        <p:cNvPr id="1" name="Shape 78"/>
         <p:cNvGrpSpPr/>
         <p:nvPr/>
       </p:nvGrpSpPr>
@@ -1023,9 +1054,11 @@
       <p:sp>
         <p:nvSpPr>
           <p:cNvPr id="79" name="Google Shape;79;g649ddd6b74_0_64:notes"/>
-          <p:cNvSpPr/>
+          <p:cNvSpPr>
+            <a:spLocks noGrp="1" noRot="1" noChangeAspect="1"/>
+          </p:cNvSpPr>
           <p:nvPr>
-            <p:ph idx="2" type="sldImg"/>
+            <p:ph type="sldImg" idx="2"/>
           </p:nvPr>
         </p:nvSpPr>
         <p:spPr>
@@ -1034,9 +1067,13 @@
             <a:ext cx="6096000" cy="3429000"/>
           </a:xfrm>
           <a:custGeom>
-            <a:rect b="b" l="l" r="r" t="t"/>
+            <a:avLst/>
+            <a:gdLst/>
+            <a:ahLst/>
+            <a:cxnLst/>
+            <a:rect l="l" t="t" r="r" b="b"/>
             <a:pathLst>
-              <a:path extrusionOk="0" h="120000" w="120000">
+              <a:path w="120000" h="120000" extrusionOk="0">
                 <a:moveTo>
                   <a:pt x="0" y="0"/>
                 </a:moveTo>
@@ -1058,9 +1095,11 @@
       <p:sp>
         <p:nvSpPr>
           <p:cNvPr id="80" name="Google Shape;80;g649ddd6b74_0_64:notes"/>
-          <p:cNvSpPr txBox="1"/>
+          <p:cNvSpPr txBox="1">
+            <a:spLocks noGrp="1"/>
+          </p:cNvSpPr>
           <p:nvPr>
-            <p:ph idx="1" type="body"/>
+            <p:ph type="body" idx="1"/>
           </p:nvPr>
         </p:nvSpPr>
         <p:spPr>
@@ -1073,12 +1112,12 @@
           </a:prstGeom>
         </p:spPr>
         <p:txBody>
-          <a:bodyPr anchorCtr="0" anchor="t" bIns="91425" lIns="91425" spcFirstLastPara="1" rIns="91425" wrap="square" tIns="91425">
+          <a:bodyPr spcFirstLastPara="1" wrap="square" lIns="91425" tIns="91425" rIns="91425" bIns="91425" anchor="t" anchorCtr="0">
             <a:noAutofit/>
           </a:bodyPr>
           <a:lstStyle/>
           <a:p>
-            <a:pPr indent="0" lvl="0" marL="0" rtl="0" algn="l">
+            <a:pPr marL="0" lvl="0" indent="0" algn="l" rtl="0">
               <a:spcBef>
                 <a:spcPts val="0"/>
               </a:spcBef>
@@ -1087,9 +1126,6 @@
               </a:spcAft>
               <a:buNone/>
             </a:pPr>
-            <a:r>
-              <a:t/>
-            </a:r>
             <a:endParaRPr/>
           </a:p>
         </p:txBody>
@@ -1103,11 +1139,11 @@
 </file>
 
 <file path=ppt/notesSlides/notesSlide5.xml><?xml version="1.0" encoding="utf-8"?>
-<p:notes xmlns:a="http://schemas.openxmlformats.org/drawingml/2006/main" xmlns:r="http://schemas.openxmlformats.org/officeDocument/2006/relationships" xmlns:mc="http://schemas.openxmlformats.org/markup-compatibility/2006" xmlns:mv="urn:schemas-microsoft-com:mac:vml" xmlns:p="http://schemas.openxmlformats.org/presentationml/2006/main" xmlns:c="http://schemas.openxmlformats.org/drawingml/2006/chart" xmlns:dgm="http://schemas.openxmlformats.org/drawingml/2006/diagram" xmlns:o="urn:schemas-microsoft-com:office:office" xmlns:v="urn:schemas-microsoft-com:vml" xmlns:pvml="urn:schemas-microsoft-com:office:powerpoint" xmlns:com="http://schemas.openxmlformats.org/drawingml/2006/compatibility" xmlns:p14="http://schemas.microsoft.com/office/powerpoint/2010/main" xmlns:p15="http://schemas.microsoft.com/office/powerpoint/2012/main" showMasterPhAnim="0" showMasterSp="0">
+<p:notes xmlns:a="http://schemas.openxmlformats.org/drawingml/2006/main" xmlns:r="http://schemas.openxmlformats.org/officeDocument/2006/relationships" xmlns:p="http://schemas.openxmlformats.org/presentationml/2006/main" showMasterSp="0" showMasterPhAnim="0">
   <p:cSld>
     <p:spTree>
       <p:nvGrpSpPr>
-        <p:cNvPr id="84" name="Shape 84"/>
+        <p:cNvPr id="1" name="Shape 84"/>
         <p:cNvGrpSpPr/>
         <p:nvPr/>
       </p:nvGrpSpPr>
@@ -1122,9 +1158,11 @@
       <p:sp>
         <p:nvSpPr>
           <p:cNvPr id="85" name="Google Shape;85;g649ddd6b74_0_71:notes"/>
-          <p:cNvSpPr/>
+          <p:cNvSpPr>
+            <a:spLocks noGrp="1" noRot="1" noChangeAspect="1"/>
+          </p:cNvSpPr>
           <p:nvPr>
-            <p:ph idx="2" type="sldImg"/>
+            <p:ph type="sldImg" idx="2"/>
           </p:nvPr>
         </p:nvSpPr>
         <p:spPr>
@@ -1133,9 +1171,13 @@
             <a:ext cx="6096000" cy="3429000"/>
           </a:xfrm>
           <a:custGeom>
-            <a:rect b="b" l="l" r="r" t="t"/>
+            <a:avLst/>
+            <a:gdLst/>
+            <a:ahLst/>
+            <a:cxnLst/>
+            <a:rect l="l" t="t" r="r" b="b"/>
             <a:pathLst>
-              <a:path extrusionOk="0" h="120000" w="120000">
+              <a:path w="120000" h="120000" extrusionOk="0">
                 <a:moveTo>
                   <a:pt x="0" y="0"/>
                 </a:moveTo>
@@ -1157,9 +1199,11 @@
       <p:sp>
         <p:nvSpPr>
           <p:cNvPr id="86" name="Google Shape;86;g649ddd6b74_0_71:notes"/>
-          <p:cNvSpPr txBox="1"/>
+          <p:cNvSpPr txBox="1">
+            <a:spLocks noGrp="1"/>
+          </p:cNvSpPr>
           <p:nvPr>
-            <p:ph idx="1" type="body"/>
+            <p:ph type="body" idx="1"/>
           </p:nvPr>
         </p:nvSpPr>
         <p:spPr>
@@ -1172,12 +1216,12 @@
           </a:prstGeom>
         </p:spPr>
         <p:txBody>
-          <a:bodyPr anchorCtr="0" anchor="t" bIns="91425" lIns="91425" spcFirstLastPara="1" rIns="91425" wrap="square" tIns="91425">
+          <a:bodyPr spcFirstLastPara="1" wrap="square" lIns="91425" tIns="91425" rIns="91425" bIns="91425" anchor="t" anchorCtr="0">
             <a:noAutofit/>
           </a:bodyPr>
           <a:lstStyle/>
           <a:p>
-            <a:pPr indent="0" lvl="0" marL="0" rtl="0" algn="l">
+            <a:pPr marL="0" lvl="0" indent="0" algn="l" rtl="0">
               <a:spcBef>
                 <a:spcPts val="0"/>
               </a:spcBef>
@@ -1186,9 +1230,6 @@
               </a:spcAft>
               <a:buNone/>
             </a:pPr>
-            <a:r>
-              <a:t/>
-            </a:r>
             <a:endParaRPr/>
           </a:p>
         </p:txBody>
@@ -1202,11 +1243,11 @@
 </file>
 
 <file path=ppt/notesSlides/notesSlide6.xml><?xml version="1.0" encoding="utf-8"?>
-<p:notes xmlns:a="http://schemas.openxmlformats.org/drawingml/2006/main" xmlns:r="http://schemas.openxmlformats.org/officeDocument/2006/relationships" xmlns:mc="http://schemas.openxmlformats.org/markup-compatibility/2006" xmlns:mv="urn:schemas-microsoft-com:mac:vml" xmlns:p="http://schemas.openxmlformats.org/presentationml/2006/main" xmlns:c="http://schemas.openxmlformats.org/drawingml/2006/chart" xmlns:dgm="http://schemas.openxmlformats.org/drawingml/2006/diagram" xmlns:o="urn:schemas-microsoft-com:office:office" xmlns:v="urn:schemas-microsoft-com:vml" xmlns:pvml="urn:schemas-microsoft-com:office:powerpoint" xmlns:com="http://schemas.openxmlformats.org/drawingml/2006/compatibility" xmlns:p14="http://schemas.microsoft.com/office/powerpoint/2010/main" xmlns:p15="http://schemas.microsoft.com/office/powerpoint/2012/main" showMasterPhAnim="0" showMasterSp="0">
+<p:notes xmlns:a="http://schemas.openxmlformats.org/drawingml/2006/main" xmlns:r="http://schemas.openxmlformats.org/officeDocument/2006/relationships" xmlns:p="http://schemas.openxmlformats.org/presentationml/2006/main" showMasterSp="0" showMasterPhAnim="0">
   <p:cSld>
     <p:spTree>
       <p:nvGrpSpPr>
-        <p:cNvPr id="91" name="Shape 91"/>
+        <p:cNvPr id="1" name="Shape 91"/>
         <p:cNvGrpSpPr/>
         <p:nvPr/>
       </p:nvGrpSpPr>
@@ -1221,9 +1262,11 @@
       <p:sp>
         <p:nvSpPr>
           <p:cNvPr id="92" name="Google Shape;92;g649ddd6b74_0_79:notes"/>
-          <p:cNvSpPr/>
+          <p:cNvSpPr>
+            <a:spLocks noGrp="1" noRot="1" noChangeAspect="1"/>
+          </p:cNvSpPr>
           <p:nvPr>
-            <p:ph idx="2" type="sldImg"/>
+            <p:ph type="sldImg" idx="2"/>
           </p:nvPr>
         </p:nvSpPr>
         <p:spPr>
@@ -1232,9 +1275,13 @@
             <a:ext cx="6096000" cy="3429000"/>
           </a:xfrm>
           <a:custGeom>
-            <a:rect b="b" l="l" r="r" t="t"/>
+            <a:avLst/>
+            <a:gdLst/>
+            <a:ahLst/>
+            <a:cxnLst/>
+            <a:rect l="l" t="t" r="r" b="b"/>
             <a:pathLst>
-              <a:path extrusionOk="0" h="120000" w="120000">
+              <a:path w="120000" h="120000" extrusionOk="0">
                 <a:moveTo>
                   <a:pt x="0" y="0"/>
                 </a:moveTo>
@@ -1256,9 +1303,11 @@
       <p:sp>
         <p:nvSpPr>
           <p:cNvPr id="93" name="Google Shape;93;g649ddd6b74_0_79:notes"/>
-          <p:cNvSpPr txBox="1"/>
+          <p:cNvSpPr txBox="1">
+            <a:spLocks noGrp="1"/>
+          </p:cNvSpPr>
           <p:nvPr>
-            <p:ph idx="1" type="body"/>
+            <p:ph type="body" idx="1"/>
           </p:nvPr>
         </p:nvSpPr>
         <p:spPr>
@@ -1271,12 +1320,12 @@
           </a:prstGeom>
         </p:spPr>
         <p:txBody>
-          <a:bodyPr anchorCtr="0" anchor="t" bIns="91425" lIns="91425" spcFirstLastPara="1" rIns="91425" wrap="square" tIns="91425">
+          <a:bodyPr spcFirstLastPara="1" wrap="square" lIns="91425" tIns="91425" rIns="91425" bIns="91425" anchor="t" anchorCtr="0">
             <a:noAutofit/>
           </a:bodyPr>
           <a:lstStyle/>
           <a:p>
-            <a:pPr indent="0" lvl="0" marL="0" rtl="0" algn="l">
+            <a:pPr marL="0" lvl="0" indent="0" algn="l" rtl="0">
               <a:spcBef>
                 <a:spcPts val="0"/>
               </a:spcBef>
@@ -1285,9 +1334,6 @@
               </a:spcAft>
               <a:buNone/>
             </a:pPr>
-            <a:r>
-              <a:t/>
-            </a:r>
             <a:endParaRPr/>
           </a:p>
         </p:txBody>
@@ -1301,11 +1347,11 @@
 </file>
 
 <file path=ppt/notesSlides/notesSlide7.xml><?xml version="1.0" encoding="utf-8"?>
-<p:notes xmlns:a="http://schemas.openxmlformats.org/drawingml/2006/main" xmlns:r="http://schemas.openxmlformats.org/officeDocument/2006/relationships" xmlns:mc="http://schemas.openxmlformats.org/markup-compatibility/2006" xmlns:mv="urn:schemas-microsoft-com:mac:vml" xmlns:p="http://schemas.openxmlformats.org/presentationml/2006/main" xmlns:c="http://schemas.openxmlformats.org/drawingml/2006/chart" xmlns:dgm="http://schemas.openxmlformats.org/drawingml/2006/diagram" xmlns:o="urn:schemas-microsoft-com:office:office" xmlns:v="urn:schemas-microsoft-com:vml" xmlns:pvml="urn:schemas-microsoft-com:office:powerpoint" xmlns:com="http://schemas.openxmlformats.org/drawingml/2006/compatibility" xmlns:p14="http://schemas.microsoft.com/office/powerpoint/2010/main" xmlns:p15="http://schemas.microsoft.com/office/powerpoint/2012/main" showMasterPhAnim="0" showMasterSp="0">
+<p:notes xmlns:a="http://schemas.openxmlformats.org/drawingml/2006/main" xmlns:r="http://schemas.openxmlformats.org/officeDocument/2006/relationships" xmlns:p="http://schemas.openxmlformats.org/presentationml/2006/main" showMasterSp="0" showMasterPhAnim="0">
   <p:cSld>
     <p:spTree>
       <p:nvGrpSpPr>
-        <p:cNvPr id="98" name="Shape 98"/>
+        <p:cNvPr id="1" name="Shape 98"/>
         <p:cNvGrpSpPr/>
         <p:nvPr/>
       </p:nvGrpSpPr>
@@ -1320,9 +1366,11 @@
       <p:sp>
         <p:nvSpPr>
           <p:cNvPr id="99" name="Google Shape;99;g649ddd6b74_0_86:notes"/>
-          <p:cNvSpPr/>
+          <p:cNvSpPr>
+            <a:spLocks noGrp="1" noRot="1" noChangeAspect="1"/>
+          </p:cNvSpPr>
           <p:nvPr>
-            <p:ph idx="2" type="sldImg"/>
+            <p:ph type="sldImg" idx="2"/>
           </p:nvPr>
         </p:nvSpPr>
         <p:spPr>
@@ -1331,9 +1379,13 @@
             <a:ext cx="6096000" cy="3429000"/>
           </a:xfrm>
           <a:custGeom>
-            <a:rect b="b" l="l" r="r" t="t"/>
+            <a:avLst/>
+            <a:gdLst/>
+            <a:ahLst/>
+            <a:cxnLst/>
+            <a:rect l="l" t="t" r="r" b="b"/>
             <a:pathLst>
-              <a:path extrusionOk="0" h="120000" w="120000">
+              <a:path w="120000" h="120000" extrusionOk="0">
                 <a:moveTo>
                   <a:pt x="0" y="0"/>
                 </a:moveTo>
@@ -1355,9 +1407,11 @@
       <p:sp>
         <p:nvSpPr>
           <p:cNvPr id="100" name="Google Shape;100;g649ddd6b74_0_86:notes"/>
-          <p:cNvSpPr txBox="1"/>
+          <p:cNvSpPr txBox="1">
+            <a:spLocks noGrp="1"/>
+          </p:cNvSpPr>
           <p:nvPr>
-            <p:ph idx="1" type="body"/>
+            <p:ph type="body" idx="1"/>
           </p:nvPr>
         </p:nvSpPr>
         <p:spPr>
@@ -1370,12 +1424,12 @@
           </a:prstGeom>
         </p:spPr>
         <p:txBody>
-          <a:bodyPr anchorCtr="0" anchor="t" bIns="91425" lIns="91425" spcFirstLastPara="1" rIns="91425" wrap="square" tIns="91425">
+          <a:bodyPr spcFirstLastPara="1" wrap="square" lIns="91425" tIns="91425" rIns="91425" bIns="91425" anchor="t" anchorCtr="0">
             <a:noAutofit/>
           </a:bodyPr>
           <a:lstStyle/>
           <a:p>
-            <a:pPr indent="0" lvl="0" marL="0" rtl="0" algn="l">
+            <a:pPr marL="0" lvl="0" indent="0" algn="l" rtl="0">
               <a:spcBef>
                 <a:spcPts val="0"/>
               </a:spcBef>
@@ -1384,9 +1438,6 @@
               </a:spcAft>
               <a:buNone/>
             </a:pPr>
-            <a:r>
-              <a:t/>
-            </a:r>
             <a:endParaRPr/>
           </a:p>
         </p:txBody>
@@ -1400,11 +1451,11 @@
 </file>
 
 <file path=ppt/slideLayouts/slideLayout1.xml><?xml version="1.0" encoding="utf-8"?>
-<p:sldLayout xmlns:a="http://schemas.openxmlformats.org/drawingml/2006/main" xmlns:r="http://schemas.openxmlformats.org/officeDocument/2006/relationships" xmlns:mc="http://schemas.openxmlformats.org/markup-compatibility/2006" xmlns:mv="urn:schemas-microsoft-com:mac:vml" xmlns:p="http://schemas.openxmlformats.org/presentationml/2006/main" xmlns:c="http://schemas.openxmlformats.org/drawingml/2006/chart" xmlns:dgm="http://schemas.openxmlformats.org/drawingml/2006/diagram" xmlns:o="urn:schemas-microsoft-com:office:office" xmlns:v="urn:schemas-microsoft-com:vml" xmlns:pvml="urn:schemas-microsoft-com:office:powerpoint" xmlns:com="http://schemas.openxmlformats.org/drawingml/2006/compatibility" xmlns:p14="http://schemas.microsoft.com/office/powerpoint/2010/main" xmlns:p15="http://schemas.microsoft.com/office/powerpoint/2012/main" matchingName="Title slide" type="title">
+<p:sldLayout xmlns:a="http://schemas.openxmlformats.org/drawingml/2006/main" xmlns:r="http://schemas.openxmlformats.org/officeDocument/2006/relationships" xmlns:p="http://schemas.openxmlformats.org/presentationml/2006/main" matchingName="Title slide" type="title">
   <p:cSld name="TITLE">
     <p:spTree>
       <p:nvGrpSpPr>
-        <p:cNvPr id="9" name="Shape 9"/>
+        <p:cNvPr id="1" name="Shape 9"/>
         <p:cNvGrpSpPr/>
         <p:nvPr/>
       </p:nvGrpSpPr>
@@ -1428,9 +1479,13 @@
             <a:ext cx="1081625" cy="1124950"/>
           </a:xfrm>
           <a:custGeom>
-            <a:rect b="b" l="l" r="r" t="t"/>
+            <a:avLst/>
+            <a:gdLst/>
+            <a:ahLst/>
+            <a:cxnLst/>
+            <a:rect l="l" t="t" r="r" b="b"/>
             <a:pathLst>
-              <a:path extrusionOk="0" h="44998" w="43265">
+              <a:path w="43265" h="44998" extrusionOk="0">
                 <a:moveTo>
                   <a:pt x="0" y="44998"/>
                 </a:moveTo>
@@ -1444,14 +1499,14 @@
             </a:pathLst>
           </a:custGeom>
           <a:noFill/>
-          <a:ln cap="flat" cmpd="sng" w="28575">
+          <a:ln w="28575" cap="flat" cmpd="sng">
             <a:solidFill>
               <a:schemeClr val="accent5"/>
             </a:solidFill>
             <a:prstDash val="solid"/>
             <a:miter lim="8000"/>
-            <a:headEnd len="sm" w="sm" type="none"/>
-            <a:tailEnd len="sm" w="sm" type="none"/>
+            <a:headEnd type="none" w="sm" len="sm"/>
+            <a:tailEnd type="none" w="sm" len="sm"/>
           </a:ln>
         </p:spPr>
       </p:sp>
@@ -1467,9 +1522,13 @@
             <a:ext cx="1081625" cy="1124950"/>
           </a:xfrm>
           <a:custGeom>
-            <a:rect b="b" l="l" r="r" t="t"/>
+            <a:avLst/>
+            <a:gdLst/>
+            <a:ahLst/>
+            <a:cxnLst/>
+            <a:rect l="l" t="t" r="r" b="b"/>
             <a:pathLst>
-              <a:path extrusionOk="0" h="44998" w="43265">
+              <a:path w="43265" h="44998" extrusionOk="0">
                 <a:moveTo>
                   <a:pt x="0" y="44998"/>
                 </a:moveTo>
@@ -1483,14 +1542,14 @@
             </a:pathLst>
           </a:custGeom>
           <a:noFill/>
-          <a:ln cap="flat" cmpd="sng" w="28575">
+          <a:ln w="28575" cap="flat" cmpd="sng">
             <a:solidFill>
               <a:schemeClr val="accent5"/>
             </a:solidFill>
             <a:prstDash val="solid"/>
             <a:miter lim="8000"/>
-            <a:headEnd len="sm" w="sm" type="none"/>
-            <a:tailEnd len="sm" w="sm" type="none"/>
+            <a:headEnd type="none" w="sm" len="sm"/>
+            <a:tailEnd type="none" w="sm" len="sm"/>
           </a:ln>
         </p:spPr>
       </p:sp>
@@ -1509,21 +1568,23 @@
             <a:avLst/>
           </a:prstGeom>
           <a:noFill/>
-          <a:ln cap="flat" cmpd="sng" w="38100">
+          <a:ln w="38100" cap="flat" cmpd="sng">
             <a:solidFill>
               <a:schemeClr val="accent4"/>
             </a:solidFill>
             <a:prstDash val="solid"/>
             <a:round/>
-            <a:headEnd len="sm" w="sm" type="none"/>
-            <a:tailEnd len="sm" w="sm" type="none"/>
+            <a:headEnd type="none" w="sm" len="sm"/>
+            <a:tailEnd type="none" w="sm" len="sm"/>
           </a:ln>
         </p:spPr>
       </p:cxnSp>
       <p:sp>
         <p:nvSpPr>
           <p:cNvPr id="13" name="Google Shape;13;p2"/>
-          <p:cNvSpPr txBox="1"/>
+          <p:cNvSpPr txBox="1">
+            <a:spLocks noGrp="1"/>
+          </p:cNvSpPr>
           <p:nvPr>
             <p:ph type="ctrTitle"/>
           </p:nvPr>
@@ -1538,7 +1599,7 @@
           </a:prstGeom>
         </p:spPr>
         <p:txBody>
-          <a:bodyPr anchorCtr="0" anchor="b" bIns="91425" lIns="91425" spcFirstLastPara="1" rIns="91425" wrap="square" tIns="91425">
+          <a:bodyPr spcFirstLastPara="1" wrap="square" lIns="91425" tIns="91425" rIns="91425" bIns="91425" anchor="b" anchorCtr="0">
             <a:noAutofit/>
           </a:bodyPr>
           <a:lstStyle>
@@ -1642,15 +1703,19 @@
               <a:defRPr sz="4000"/>
             </a:lvl9pPr>
           </a:lstStyle>
-          <a:p/>
+          <a:p>
+            <a:endParaRPr/>
+          </a:p>
         </p:txBody>
       </p:sp>
       <p:sp>
         <p:nvSpPr>
           <p:cNvPr id="14" name="Google Shape;14;p2"/>
-          <p:cNvSpPr txBox="1"/>
+          <p:cNvSpPr txBox="1">
+            <a:spLocks noGrp="1"/>
+          </p:cNvSpPr>
           <p:nvPr>
-            <p:ph idx="1" type="subTitle"/>
+            <p:ph type="subTitle" idx="1"/>
           </p:nvPr>
         </p:nvSpPr>
         <p:spPr>
@@ -1663,7 +1728,7 @@
           </a:prstGeom>
         </p:spPr>
         <p:txBody>
-          <a:bodyPr anchorCtr="0" anchor="t" bIns="91425" lIns="91425" spcFirstLastPara="1" rIns="91425" wrap="square" tIns="91425">
+          <a:bodyPr spcFirstLastPara="1" wrap="square" lIns="91425" tIns="91425" rIns="91425" bIns="91425" anchor="t" anchorCtr="0">
             <a:noAutofit/>
           </a:bodyPr>
           <a:lstStyle>
@@ -1902,15 +1967,19 @@
               </a:defRPr>
             </a:lvl9pPr>
           </a:lstStyle>
-          <a:p/>
+          <a:p>
+            <a:endParaRPr/>
+          </a:p>
         </p:txBody>
       </p:sp>
       <p:sp>
         <p:nvSpPr>
           <p:cNvPr id="15" name="Google Shape;15;p2"/>
-          <p:cNvSpPr txBox="1"/>
+          <p:cNvSpPr txBox="1">
+            <a:spLocks noGrp="1"/>
+          </p:cNvSpPr>
           <p:nvPr>
-            <p:ph idx="12" type="sldNum"/>
+            <p:ph type="sldNum" idx="12"/>
           </p:nvPr>
         </p:nvSpPr>
         <p:spPr>
@@ -1923,7 +1992,7 @@
           </a:prstGeom>
         </p:spPr>
         <p:txBody>
-          <a:bodyPr anchorCtr="0" anchor="ctr" bIns="91425" lIns="91425" spcFirstLastPara="1" rIns="91425" wrap="square" tIns="91425">
+          <a:bodyPr spcFirstLastPara="1" wrap="square" lIns="91425" tIns="91425" rIns="91425" bIns="91425" anchor="ctr" anchorCtr="0">
             <a:noAutofit/>
           </a:bodyPr>
           <a:lstStyle>
@@ -1965,7 +2034,7 @@
             </a:lvl9pPr>
           </a:lstStyle>
           <a:p>
-            <a:pPr indent="0" lvl="0" marL="0" rtl="0" algn="r">
+            <a:pPr marL="0" lvl="0" indent="0" algn="r" rtl="0">
               <a:spcBef>
                 <a:spcPts val="0"/>
               </a:spcBef>
@@ -1991,11 +2060,11 @@
 </file>
 
 <file path=ppt/slideLayouts/slideLayout10.xml><?xml version="1.0" encoding="utf-8"?>
-<p:sldLayout xmlns:a="http://schemas.openxmlformats.org/drawingml/2006/main" xmlns:r="http://schemas.openxmlformats.org/officeDocument/2006/relationships" xmlns:mc="http://schemas.openxmlformats.org/markup-compatibility/2006" xmlns:mv="urn:schemas-microsoft-com:mac:vml" xmlns:p="http://schemas.openxmlformats.org/presentationml/2006/main" xmlns:c="http://schemas.openxmlformats.org/drawingml/2006/chart" xmlns:dgm="http://schemas.openxmlformats.org/drawingml/2006/diagram" xmlns:o="urn:schemas-microsoft-com:office:office" xmlns:v="urn:schemas-microsoft-com:vml" xmlns:pvml="urn:schemas-microsoft-com:office:powerpoint" xmlns:com="http://schemas.openxmlformats.org/drawingml/2006/compatibility" xmlns:p14="http://schemas.microsoft.com/office/powerpoint/2010/main" xmlns:p15="http://schemas.microsoft.com/office/powerpoint/2012/main" matchingName="Big number">
+<p:sldLayout xmlns:a="http://schemas.openxmlformats.org/drawingml/2006/main" xmlns:r="http://schemas.openxmlformats.org/officeDocument/2006/relationships" xmlns:p="http://schemas.openxmlformats.org/presentationml/2006/main" matchingName="Big number">
   <p:cSld name="BIG_NUMBER">
     <p:spTree>
       <p:nvGrpSpPr>
-        <p:cNvPr id="52" name="Shape 52"/>
+        <p:cNvPr id="1" name="Shape 52"/>
         <p:cNvGrpSpPr/>
         <p:nvPr/>
       </p:nvGrpSpPr>
@@ -2029,12 +2098,12 @@
           </a:ln>
         </p:spPr>
         <p:txBody>
-          <a:bodyPr anchorCtr="0" anchor="ctr" bIns="91425" lIns="91425" spcFirstLastPara="1" rIns="91425" wrap="square" tIns="91425">
+          <a:bodyPr spcFirstLastPara="1" wrap="square" lIns="91425" tIns="91425" rIns="91425" bIns="91425" anchor="ctr" anchorCtr="0">
             <a:noAutofit/>
           </a:bodyPr>
           <a:lstStyle/>
           <a:p>
-            <a:pPr indent="0" lvl="0" marL="0" rtl="0" algn="l">
+            <a:pPr marL="0" lvl="0" indent="0" algn="l" rtl="0">
               <a:spcBef>
                 <a:spcPts val="0"/>
               </a:spcBef>
@@ -2043,9 +2112,6 @@
               </a:spcAft>
               <a:buNone/>
             </a:pPr>
-            <a:r>
-              <a:t/>
-            </a:r>
             <a:endParaRPr/>
           </a:p>
         </p:txBody>
@@ -2053,9 +2119,11 @@
       <p:sp>
         <p:nvSpPr>
           <p:cNvPr id="54" name="Google Shape;54;p11"/>
-          <p:cNvSpPr txBox="1"/>
+          <p:cNvSpPr txBox="1">
+            <a:spLocks noGrp="1"/>
+          </p:cNvSpPr>
           <p:nvPr>
-            <p:ph hasCustomPrompt="1" type="title"/>
+            <p:ph type="title" hasCustomPrompt="1"/>
           </p:nvPr>
         </p:nvSpPr>
         <p:spPr>
@@ -2068,7 +2136,7 @@
           </a:prstGeom>
         </p:spPr>
         <p:txBody>
-          <a:bodyPr anchorCtr="0" anchor="ctr" bIns="91425" lIns="91425" spcFirstLastPara="1" rIns="91425" wrap="square" tIns="91425">
+          <a:bodyPr spcFirstLastPara="1" wrap="square" lIns="91425" tIns="91425" rIns="91425" bIns="91425" anchor="ctr" anchorCtr="0">
             <a:noAutofit/>
           </a:bodyPr>
           <a:lstStyle>
@@ -2245,9 +2313,11 @@
       <p:sp>
         <p:nvSpPr>
           <p:cNvPr id="55" name="Google Shape;55;p11"/>
-          <p:cNvSpPr txBox="1"/>
+          <p:cNvSpPr txBox="1">
+            <a:spLocks noGrp="1"/>
+          </p:cNvSpPr>
           <p:nvPr>
-            <p:ph idx="1" type="body"/>
+            <p:ph type="body" idx="1"/>
           </p:nvPr>
         </p:nvSpPr>
         <p:spPr>
@@ -2260,11 +2330,11 @@
           </a:prstGeom>
         </p:spPr>
         <p:txBody>
-          <a:bodyPr anchorCtr="0" anchor="t" bIns="91425" lIns="91425" spcFirstLastPara="1" rIns="91425" wrap="square" tIns="91425">
+          <a:bodyPr spcFirstLastPara="1" wrap="square" lIns="91425" tIns="91425" rIns="91425" bIns="91425" anchor="t" anchorCtr="0">
             <a:noAutofit/>
           </a:bodyPr>
           <a:lstStyle>
-            <a:lvl1pPr indent="-342900" lvl="0" marL="457200" algn="ctr">
+            <a:lvl1pPr marL="457200" lvl="0" indent="-342900" algn="ctr">
               <a:spcBef>
                 <a:spcPts val="0"/>
               </a:spcBef>
@@ -2275,7 +2345,7 @@
               <a:buChar char="●"/>
               <a:defRPr/>
             </a:lvl1pPr>
-            <a:lvl2pPr indent="-317500" lvl="1" marL="914400" algn="ctr">
+            <a:lvl2pPr marL="914400" lvl="1" indent="-317500" algn="ctr">
               <a:spcBef>
                 <a:spcPts val="1600"/>
               </a:spcBef>
@@ -2286,7 +2356,7 @@
               <a:buChar char="○"/>
               <a:defRPr/>
             </a:lvl2pPr>
-            <a:lvl3pPr indent="-317500" lvl="2" marL="1371600" algn="ctr">
+            <a:lvl3pPr marL="1371600" lvl="2" indent="-317500" algn="ctr">
               <a:spcBef>
                 <a:spcPts val="1600"/>
               </a:spcBef>
@@ -2297,7 +2367,7 @@
               <a:buChar char="■"/>
               <a:defRPr/>
             </a:lvl3pPr>
-            <a:lvl4pPr indent="-317500" lvl="3" marL="1828800" algn="ctr">
+            <a:lvl4pPr marL="1828800" lvl="3" indent="-317500" algn="ctr">
               <a:spcBef>
                 <a:spcPts val="1600"/>
               </a:spcBef>
@@ -2308,7 +2378,7 @@
               <a:buChar char="●"/>
               <a:defRPr/>
             </a:lvl4pPr>
-            <a:lvl5pPr indent="-317500" lvl="4" marL="2286000" algn="ctr">
+            <a:lvl5pPr marL="2286000" lvl="4" indent="-317500" algn="ctr">
               <a:spcBef>
                 <a:spcPts val="1600"/>
               </a:spcBef>
@@ -2319,7 +2389,7 @@
               <a:buChar char="○"/>
               <a:defRPr/>
             </a:lvl5pPr>
-            <a:lvl6pPr indent="-317500" lvl="5" marL="2743200" algn="ctr">
+            <a:lvl6pPr marL="2743200" lvl="5" indent="-317500" algn="ctr">
               <a:spcBef>
                 <a:spcPts val="1600"/>
               </a:spcBef>
@@ -2330,7 +2400,7 @@
               <a:buChar char="■"/>
               <a:defRPr/>
             </a:lvl6pPr>
-            <a:lvl7pPr indent="-317500" lvl="6" marL="3200400" algn="ctr">
+            <a:lvl7pPr marL="3200400" lvl="6" indent="-317500" algn="ctr">
               <a:spcBef>
                 <a:spcPts val="1600"/>
               </a:spcBef>
@@ -2341,7 +2411,7 @@
               <a:buChar char="●"/>
               <a:defRPr/>
             </a:lvl7pPr>
-            <a:lvl8pPr indent="-317500" lvl="7" marL="3657600" algn="ctr">
+            <a:lvl8pPr marL="3657600" lvl="7" indent="-317500" algn="ctr">
               <a:spcBef>
                 <a:spcPts val="1600"/>
               </a:spcBef>
@@ -2352,7 +2422,7 @@
               <a:buChar char="○"/>
               <a:defRPr/>
             </a:lvl8pPr>
-            <a:lvl9pPr indent="-317500" lvl="8" marL="4114800" algn="ctr">
+            <a:lvl9pPr marL="4114800" lvl="8" indent="-317500" algn="ctr">
               <a:spcBef>
                 <a:spcPts val="1600"/>
               </a:spcBef>
@@ -2364,15 +2434,19 @@
               <a:defRPr/>
             </a:lvl9pPr>
           </a:lstStyle>
-          <a:p/>
+          <a:p>
+            <a:endParaRPr/>
+          </a:p>
         </p:txBody>
       </p:sp>
       <p:sp>
         <p:nvSpPr>
           <p:cNvPr id="56" name="Google Shape;56;p11"/>
-          <p:cNvSpPr txBox="1"/>
+          <p:cNvSpPr txBox="1">
+            <a:spLocks noGrp="1"/>
+          </p:cNvSpPr>
           <p:nvPr>
-            <p:ph idx="12" type="sldNum"/>
+            <p:ph type="sldNum" idx="12"/>
           </p:nvPr>
         </p:nvSpPr>
         <p:spPr>
@@ -2385,7 +2459,7 @@
           </a:prstGeom>
         </p:spPr>
         <p:txBody>
-          <a:bodyPr anchorCtr="0" anchor="ctr" bIns="91425" lIns="91425" spcFirstLastPara="1" rIns="91425" wrap="square" tIns="91425">
+          <a:bodyPr spcFirstLastPara="1" wrap="square" lIns="91425" tIns="91425" rIns="91425" bIns="91425" anchor="ctr" anchorCtr="0">
             <a:noAutofit/>
           </a:bodyPr>
           <a:lstStyle>
@@ -2427,7 +2501,7 @@
             </a:lvl9pPr>
           </a:lstStyle>
           <a:p>
-            <a:pPr indent="0" lvl="0" marL="0" rtl="0" algn="r">
+            <a:pPr marL="0" lvl="0" indent="0" algn="r" rtl="0">
               <a:spcBef>
                 <a:spcPts val="0"/>
               </a:spcBef>
@@ -2453,11 +2527,11 @@
 </file>
 
 <file path=ppt/slideLayouts/slideLayout11.xml><?xml version="1.0" encoding="utf-8"?>
-<p:sldLayout xmlns:a="http://schemas.openxmlformats.org/drawingml/2006/main" xmlns:r="http://schemas.openxmlformats.org/officeDocument/2006/relationships" xmlns:mc="http://schemas.openxmlformats.org/markup-compatibility/2006" xmlns:mv="urn:schemas-microsoft-com:mac:vml" xmlns:p="http://schemas.openxmlformats.org/presentationml/2006/main" xmlns:c="http://schemas.openxmlformats.org/drawingml/2006/chart" xmlns:dgm="http://schemas.openxmlformats.org/drawingml/2006/diagram" xmlns:o="urn:schemas-microsoft-com:office:office" xmlns:v="urn:schemas-microsoft-com:vml" xmlns:pvml="urn:schemas-microsoft-com:office:powerpoint" xmlns:com="http://schemas.openxmlformats.org/drawingml/2006/compatibility" xmlns:p14="http://schemas.microsoft.com/office/powerpoint/2010/main" xmlns:p15="http://schemas.microsoft.com/office/powerpoint/2012/main" matchingName="Blank" type="blank">
+<p:sldLayout xmlns:a="http://schemas.openxmlformats.org/drawingml/2006/main" xmlns:r="http://schemas.openxmlformats.org/officeDocument/2006/relationships" xmlns:p="http://schemas.openxmlformats.org/presentationml/2006/main" matchingName="Blank" type="blank">
   <p:cSld name="BLANK">
     <p:spTree>
       <p:nvGrpSpPr>
-        <p:cNvPr id="57" name="Shape 57"/>
+        <p:cNvPr id="1" name="Shape 57"/>
         <p:cNvGrpSpPr/>
         <p:nvPr/>
       </p:nvGrpSpPr>
@@ -2472,9 +2546,11 @@
       <p:sp>
         <p:nvSpPr>
           <p:cNvPr id="58" name="Google Shape;58;p12"/>
-          <p:cNvSpPr txBox="1"/>
+          <p:cNvSpPr txBox="1">
+            <a:spLocks noGrp="1"/>
+          </p:cNvSpPr>
           <p:nvPr>
-            <p:ph idx="12" type="sldNum"/>
+            <p:ph type="sldNum" idx="12"/>
           </p:nvPr>
         </p:nvSpPr>
         <p:spPr>
@@ -2487,7 +2563,7 @@
           </a:prstGeom>
         </p:spPr>
         <p:txBody>
-          <a:bodyPr anchorCtr="0" anchor="ctr" bIns="91425" lIns="91425" spcFirstLastPara="1" rIns="91425" wrap="square" tIns="91425">
+          <a:bodyPr spcFirstLastPara="1" wrap="square" lIns="91425" tIns="91425" rIns="91425" bIns="91425" anchor="ctr" anchorCtr="0">
             <a:noAutofit/>
           </a:bodyPr>
           <a:lstStyle>
@@ -2529,7 +2605,7 @@
             </a:lvl9pPr>
           </a:lstStyle>
           <a:p>
-            <a:pPr indent="0" lvl="0" marL="0" rtl="0" algn="r">
+            <a:pPr marL="0" lvl="0" indent="0" algn="r" rtl="0">
               <a:spcBef>
                 <a:spcPts val="0"/>
               </a:spcBef>
@@ -2555,11 +2631,11 @@
 </file>
 
 <file path=ppt/slideLayouts/slideLayout2.xml><?xml version="1.0" encoding="utf-8"?>
-<p:sldLayout xmlns:a="http://schemas.openxmlformats.org/drawingml/2006/main" xmlns:r="http://schemas.openxmlformats.org/officeDocument/2006/relationships" xmlns:mc="http://schemas.openxmlformats.org/markup-compatibility/2006" xmlns:mv="urn:schemas-microsoft-com:mac:vml" xmlns:p="http://schemas.openxmlformats.org/presentationml/2006/main" xmlns:c="http://schemas.openxmlformats.org/drawingml/2006/chart" xmlns:dgm="http://schemas.openxmlformats.org/drawingml/2006/diagram" xmlns:o="urn:schemas-microsoft-com:office:office" xmlns:v="urn:schemas-microsoft-com:vml" xmlns:pvml="urn:schemas-microsoft-com:office:powerpoint" xmlns:com="http://schemas.openxmlformats.org/drawingml/2006/compatibility" xmlns:p14="http://schemas.microsoft.com/office/powerpoint/2010/main" xmlns:p15="http://schemas.microsoft.com/office/powerpoint/2012/main" matchingName="Section header" type="secHead">
+<p:sldLayout xmlns:a="http://schemas.openxmlformats.org/drawingml/2006/main" xmlns:r="http://schemas.openxmlformats.org/officeDocument/2006/relationships" xmlns:p="http://schemas.openxmlformats.org/presentationml/2006/main" matchingName="Section header" type="secHead">
   <p:cSld name="SECTION_HEADER">
     <p:spTree>
       <p:nvGrpSpPr>
-        <p:cNvPr id="16" name="Shape 16"/>
+        <p:cNvPr id="1" name="Shape 16"/>
         <p:cNvGrpSpPr/>
         <p:nvPr/>
       </p:nvGrpSpPr>
@@ -2586,21 +2662,23 @@
             <a:avLst/>
           </a:prstGeom>
           <a:noFill/>
-          <a:ln cap="flat" cmpd="sng" w="38100">
+          <a:ln w="38100" cap="flat" cmpd="sng">
             <a:solidFill>
               <a:schemeClr val="accent4"/>
             </a:solidFill>
             <a:prstDash val="solid"/>
             <a:round/>
-            <a:headEnd len="sm" w="sm" type="none"/>
-            <a:tailEnd len="sm" w="sm" type="none"/>
+            <a:headEnd type="none" w="sm" len="sm"/>
+            <a:tailEnd type="none" w="sm" len="sm"/>
           </a:ln>
         </p:spPr>
       </p:cxnSp>
       <p:sp>
         <p:nvSpPr>
           <p:cNvPr id="18" name="Google Shape;18;p3"/>
-          <p:cNvSpPr txBox="1"/>
+          <p:cNvSpPr txBox="1">
+            <a:spLocks noGrp="1"/>
+          </p:cNvSpPr>
           <p:nvPr>
             <p:ph type="title"/>
           </p:nvPr>
@@ -2615,7 +2693,7 @@
           </a:prstGeom>
         </p:spPr>
         <p:txBody>
-          <a:bodyPr anchorCtr="0" anchor="b" bIns="91425" lIns="91425" spcFirstLastPara="1" rIns="91425" wrap="square" tIns="91425">
+          <a:bodyPr spcFirstLastPara="1" wrap="square" lIns="91425" tIns="91425" rIns="91425" bIns="91425" anchor="b" anchorCtr="0">
             <a:noAutofit/>
           </a:bodyPr>
           <a:lstStyle>
@@ -2719,15 +2797,19 @@
               <a:defRPr sz="4800"/>
             </a:lvl9pPr>
           </a:lstStyle>
-          <a:p/>
+          <a:p>
+            <a:endParaRPr/>
+          </a:p>
         </p:txBody>
       </p:sp>
       <p:sp>
         <p:nvSpPr>
           <p:cNvPr id="19" name="Google Shape;19;p3"/>
-          <p:cNvSpPr txBox="1"/>
+          <p:cNvSpPr txBox="1">
+            <a:spLocks noGrp="1"/>
+          </p:cNvSpPr>
           <p:nvPr>
-            <p:ph idx="12" type="sldNum"/>
+            <p:ph type="sldNum" idx="12"/>
           </p:nvPr>
         </p:nvSpPr>
         <p:spPr>
@@ -2740,7 +2822,7 @@
           </a:prstGeom>
         </p:spPr>
         <p:txBody>
-          <a:bodyPr anchorCtr="0" anchor="ctr" bIns="91425" lIns="91425" spcFirstLastPara="1" rIns="91425" wrap="square" tIns="91425">
+          <a:bodyPr spcFirstLastPara="1" wrap="square" lIns="91425" tIns="91425" rIns="91425" bIns="91425" anchor="ctr" anchorCtr="0">
             <a:noAutofit/>
           </a:bodyPr>
           <a:lstStyle>
@@ -2782,7 +2864,7 @@
             </a:lvl9pPr>
           </a:lstStyle>
           <a:p>
-            <a:pPr indent="0" lvl="0" marL="0" rtl="0" algn="r">
+            <a:pPr marL="0" lvl="0" indent="0" algn="r" rtl="0">
               <a:spcBef>
                 <a:spcPts val="0"/>
               </a:spcBef>
@@ -2808,11 +2890,11 @@
 </file>
 
 <file path=ppt/slideLayouts/slideLayout3.xml><?xml version="1.0" encoding="utf-8"?>
-<p:sldLayout xmlns:a="http://schemas.openxmlformats.org/drawingml/2006/main" xmlns:r="http://schemas.openxmlformats.org/officeDocument/2006/relationships" xmlns:mc="http://schemas.openxmlformats.org/markup-compatibility/2006" xmlns:mv="urn:schemas-microsoft-com:mac:vml" xmlns:p="http://schemas.openxmlformats.org/presentationml/2006/main" xmlns:c="http://schemas.openxmlformats.org/drawingml/2006/chart" xmlns:dgm="http://schemas.openxmlformats.org/drawingml/2006/diagram" xmlns:o="urn:schemas-microsoft-com:office:office" xmlns:v="urn:schemas-microsoft-com:vml" xmlns:pvml="urn:schemas-microsoft-com:office:powerpoint" xmlns:com="http://schemas.openxmlformats.org/drawingml/2006/compatibility" xmlns:p14="http://schemas.microsoft.com/office/powerpoint/2010/main" xmlns:p15="http://schemas.microsoft.com/office/powerpoint/2012/main" matchingName="Title and body" type="tx">
+<p:sldLayout xmlns:a="http://schemas.openxmlformats.org/drawingml/2006/main" xmlns:r="http://schemas.openxmlformats.org/officeDocument/2006/relationships" xmlns:p="http://schemas.openxmlformats.org/presentationml/2006/main" matchingName="Title and body" type="tx">
   <p:cSld name="TITLE_AND_BODY">
     <p:spTree>
       <p:nvGrpSpPr>
-        <p:cNvPr id="20" name="Shape 20"/>
+        <p:cNvPr id="1" name="Shape 20"/>
         <p:cNvGrpSpPr/>
         <p:nvPr/>
       </p:nvGrpSpPr>
@@ -2839,21 +2921,23 @@
             <a:avLst/>
           </a:prstGeom>
           <a:noFill/>
-          <a:ln cap="flat" cmpd="sng" w="38100">
+          <a:ln w="38100" cap="flat" cmpd="sng">
             <a:solidFill>
               <a:schemeClr val="accent4"/>
             </a:solidFill>
             <a:prstDash val="solid"/>
             <a:round/>
-            <a:headEnd len="sm" w="sm" type="none"/>
-            <a:tailEnd len="sm" w="sm" type="none"/>
+            <a:headEnd type="none" w="sm" len="sm"/>
+            <a:tailEnd type="none" w="sm" len="sm"/>
           </a:ln>
         </p:spPr>
       </p:cxnSp>
       <p:sp>
         <p:nvSpPr>
           <p:cNvPr id="22" name="Google Shape;22;p4"/>
-          <p:cNvSpPr txBox="1"/>
+          <p:cNvSpPr txBox="1">
+            <a:spLocks noGrp="1"/>
+          </p:cNvSpPr>
           <p:nvPr>
             <p:ph type="title"/>
           </p:nvPr>
@@ -2868,7 +2952,7 @@
           </a:prstGeom>
         </p:spPr>
         <p:txBody>
-          <a:bodyPr anchorCtr="0" anchor="b" bIns="91425" lIns="91425" spcFirstLastPara="1" rIns="91425" wrap="square" tIns="91425">
+          <a:bodyPr spcFirstLastPara="1" wrap="square" lIns="91425" tIns="91425" rIns="91425" bIns="91425" anchor="b" anchorCtr="0">
             <a:noAutofit/>
           </a:bodyPr>
           <a:lstStyle>
@@ -2972,15 +3056,19 @@
               <a:defRPr/>
             </a:lvl9pPr>
           </a:lstStyle>
-          <a:p/>
+          <a:p>
+            <a:endParaRPr/>
+          </a:p>
         </p:txBody>
       </p:sp>
       <p:sp>
         <p:nvSpPr>
           <p:cNvPr id="23" name="Google Shape;23;p4"/>
-          <p:cNvSpPr txBox="1"/>
+          <p:cNvSpPr txBox="1">
+            <a:spLocks noGrp="1"/>
+          </p:cNvSpPr>
           <p:nvPr>
-            <p:ph idx="1" type="body"/>
+            <p:ph type="body" idx="1"/>
           </p:nvPr>
         </p:nvSpPr>
         <p:spPr>
@@ -2993,11 +3081,11 @@
           </a:prstGeom>
         </p:spPr>
         <p:txBody>
-          <a:bodyPr anchorCtr="0" anchor="t" bIns="91425" lIns="91425" spcFirstLastPara="1" rIns="91425" wrap="square" tIns="91425">
+          <a:bodyPr spcFirstLastPara="1" wrap="square" lIns="91425" tIns="91425" rIns="91425" bIns="91425" anchor="t" anchorCtr="0">
             <a:noAutofit/>
           </a:bodyPr>
           <a:lstStyle>
-            <a:lvl1pPr indent="-342900" lvl="0" marL="457200">
+            <a:lvl1pPr marL="457200" lvl="0" indent="-342900">
               <a:spcBef>
                 <a:spcPts val="0"/>
               </a:spcBef>
@@ -3008,7 +3096,7 @@
               <a:buChar char="●"/>
               <a:defRPr/>
             </a:lvl1pPr>
-            <a:lvl2pPr indent="-317500" lvl="1" marL="914400">
+            <a:lvl2pPr marL="914400" lvl="1" indent="-317500">
               <a:spcBef>
                 <a:spcPts val="1600"/>
               </a:spcBef>
@@ -3019,7 +3107,7 @@
               <a:buChar char="○"/>
               <a:defRPr/>
             </a:lvl2pPr>
-            <a:lvl3pPr indent="-317500" lvl="2" marL="1371600">
+            <a:lvl3pPr marL="1371600" lvl="2" indent="-317500">
               <a:spcBef>
                 <a:spcPts val="1600"/>
               </a:spcBef>
@@ -3030,7 +3118,7 @@
               <a:buChar char="■"/>
               <a:defRPr/>
             </a:lvl3pPr>
-            <a:lvl4pPr indent="-317500" lvl="3" marL="1828800">
+            <a:lvl4pPr marL="1828800" lvl="3" indent="-317500">
               <a:spcBef>
                 <a:spcPts val="1600"/>
               </a:spcBef>
@@ -3041,7 +3129,7 @@
               <a:buChar char="●"/>
               <a:defRPr/>
             </a:lvl4pPr>
-            <a:lvl5pPr indent="-317500" lvl="4" marL="2286000">
+            <a:lvl5pPr marL="2286000" lvl="4" indent="-317500">
               <a:spcBef>
                 <a:spcPts val="1600"/>
               </a:spcBef>
@@ -3052,7 +3140,7 @@
               <a:buChar char="○"/>
               <a:defRPr/>
             </a:lvl5pPr>
-            <a:lvl6pPr indent="-317500" lvl="5" marL="2743200">
+            <a:lvl6pPr marL="2743200" lvl="5" indent="-317500">
               <a:spcBef>
                 <a:spcPts val="1600"/>
               </a:spcBef>
@@ -3063,7 +3151,7 @@
               <a:buChar char="■"/>
               <a:defRPr/>
             </a:lvl6pPr>
-            <a:lvl7pPr indent="-317500" lvl="6" marL="3200400">
+            <a:lvl7pPr marL="3200400" lvl="6" indent="-317500">
               <a:spcBef>
                 <a:spcPts val="1600"/>
               </a:spcBef>
@@ -3074,7 +3162,7 @@
               <a:buChar char="●"/>
               <a:defRPr/>
             </a:lvl7pPr>
-            <a:lvl8pPr indent="-317500" lvl="7" marL="3657600">
+            <a:lvl8pPr marL="3657600" lvl="7" indent="-317500">
               <a:spcBef>
                 <a:spcPts val="1600"/>
               </a:spcBef>
@@ -3085,7 +3173,7 @@
               <a:buChar char="○"/>
               <a:defRPr/>
             </a:lvl8pPr>
-            <a:lvl9pPr indent="-317500" lvl="8" marL="4114800">
+            <a:lvl9pPr marL="4114800" lvl="8" indent="-317500">
               <a:spcBef>
                 <a:spcPts val="1600"/>
               </a:spcBef>
@@ -3097,15 +3185,19 @@
               <a:defRPr/>
             </a:lvl9pPr>
           </a:lstStyle>
-          <a:p/>
+          <a:p>
+            <a:endParaRPr/>
+          </a:p>
         </p:txBody>
       </p:sp>
       <p:sp>
         <p:nvSpPr>
           <p:cNvPr id="24" name="Google Shape;24;p4"/>
-          <p:cNvSpPr txBox="1"/>
+          <p:cNvSpPr txBox="1">
+            <a:spLocks noGrp="1"/>
+          </p:cNvSpPr>
           <p:nvPr>
-            <p:ph idx="12" type="sldNum"/>
+            <p:ph type="sldNum" idx="12"/>
           </p:nvPr>
         </p:nvSpPr>
         <p:spPr>
@@ -3118,7 +3210,7 @@
           </a:prstGeom>
         </p:spPr>
         <p:txBody>
-          <a:bodyPr anchorCtr="0" anchor="ctr" bIns="91425" lIns="91425" spcFirstLastPara="1" rIns="91425" wrap="square" tIns="91425">
+          <a:bodyPr spcFirstLastPara="1" wrap="square" lIns="91425" tIns="91425" rIns="91425" bIns="91425" anchor="ctr" anchorCtr="0">
             <a:noAutofit/>
           </a:bodyPr>
           <a:lstStyle>
@@ -3160,7 +3252,7 @@
             </a:lvl9pPr>
           </a:lstStyle>
           <a:p>
-            <a:pPr indent="0" lvl="0" marL="0" rtl="0" algn="r">
+            <a:pPr marL="0" lvl="0" indent="0" algn="r" rtl="0">
               <a:spcBef>
                 <a:spcPts val="0"/>
               </a:spcBef>
@@ -3186,11 +3278,11 @@
 </file>
 
 <file path=ppt/slideLayouts/slideLayout4.xml><?xml version="1.0" encoding="utf-8"?>
-<p:sldLayout xmlns:a="http://schemas.openxmlformats.org/drawingml/2006/main" xmlns:r="http://schemas.openxmlformats.org/officeDocument/2006/relationships" xmlns:mc="http://schemas.openxmlformats.org/markup-compatibility/2006" xmlns:mv="urn:schemas-microsoft-com:mac:vml" xmlns:p="http://schemas.openxmlformats.org/presentationml/2006/main" xmlns:c="http://schemas.openxmlformats.org/drawingml/2006/chart" xmlns:dgm="http://schemas.openxmlformats.org/drawingml/2006/diagram" xmlns:o="urn:schemas-microsoft-com:office:office" xmlns:v="urn:schemas-microsoft-com:vml" xmlns:pvml="urn:schemas-microsoft-com:office:powerpoint" xmlns:com="http://schemas.openxmlformats.org/drawingml/2006/compatibility" xmlns:p14="http://schemas.microsoft.com/office/powerpoint/2010/main" xmlns:p15="http://schemas.microsoft.com/office/powerpoint/2012/main" matchingName="Title and two columns" type="twoColTx">
+<p:sldLayout xmlns:a="http://schemas.openxmlformats.org/drawingml/2006/main" xmlns:r="http://schemas.openxmlformats.org/officeDocument/2006/relationships" xmlns:p="http://schemas.openxmlformats.org/presentationml/2006/main" matchingName="Title and two columns" type="twoColTx">
   <p:cSld name="TITLE_AND_TWO_COLUMNS">
     <p:spTree>
       <p:nvGrpSpPr>
-        <p:cNvPr id="25" name="Shape 25"/>
+        <p:cNvPr id="1" name="Shape 25"/>
         <p:cNvGrpSpPr/>
         <p:nvPr/>
       </p:nvGrpSpPr>
@@ -3217,21 +3309,23 @@
             <a:avLst/>
           </a:prstGeom>
           <a:noFill/>
-          <a:ln cap="flat" cmpd="sng" w="38100">
+          <a:ln w="38100" cap="flat" cmpd="sng">
             <a:solidFill>
               <a:schemeClr val="accent4"/>
             </a:solidFill>
             <a:prstDash val="solid"/>
             <a:round/>
-            <a:headEnd len="sm" w="sm" type="none"/>
-            <a:tailEnd len="sm" w="sm" type="none"/>
+            <a:headEnd type="none" w="sm" len="sm"/>
+            <a:tailEnd type="none" w="sm" len="sm"/>
           </a:ln>
         </p:spPr>
       </p:cxnSp>
       <p:sp>
         <p:nvSpPr>
           <p:cNvPr id="27" name="Google Shape;27;p5"/>
-          <p:cNvSpPr txBox="1"/>
+          <p:cNvSpPr txBox="1">
+            <a:spLocks noGrp="1"/>
+          </p:cNvSpPr>
           <p:nvPr>
             <p:ph type="title"/>
           </p:nvPr>
@@ -3246,7 +3340,7 @@
           </a:prstGeom>
         </p:spPr>
         <p:txBody>
-          <a:bodyPr anchorCtr="0" anchor="b" bIns="91425" lIns="91425" spcFirstLastPara="1" rIns="91425" wrap="square" tIns="91425">
+          <a:bodyPr spcFirstLastPara="1" wrap="square" lIns="91425" tIns="91425" rIns="91425" bIns="91425" anchor="b" anchorCtr="0">
             <a:noAutofit/>
           </a:bodyPr>
           <a:lstStyle>
@@ -3350,15 +3444,19 @@
               <a:defRPr/>
             </a:lvl9pPr>
           </a:lstStyle>
-          <a:p/>
+          <a:p>
+            <a:endParaRPr/>
+          </a:p>
         </p:txBody>
       </p:sp>
       <p:sp>
         <p:nvSpPr>
           <p:cNvPr id="28" name="Google Shape;28;p5"/>
-          <p:cNvSpPr txBox="1"/>
+          <p:cNvSpPr txBox="1">
+            <a:spLocks noGrp="1"/>
+          </p:cNvSpPr>
           <p:nvPr>
-            <p:ph idx="1" type="body"/>
+            <p:ph type="body" idx="1"/>
           </p:nvPr>
         </p:nvSpPr>
         <p:spPr>
@@ -3371,11 +3469,11 @@
           </a:prstGeom>
         </p:spPr>
         <p:txBody>
-          <a:bodyPr anchorCtr="0" anchor="t" bIns="91425" lIns="91425" spcFirstLastPara="1" rIns="91425" wrap="square" tIns="91425">
+          <a:bodyPr spcFirstLastPara="1" wrap="square" lIns="91425" tIns="91425" rIns="91425" bIns="91425" anchor="t" anchorCtr="0">
             <a:noAutofit/>
           </a:bodyPr>
           <a:lstStyle>
-            <a:lvl1pPr indent="-317500" lvl="0" marL="457200">
+            <a:lvl1pPr marL="457200" lvl="0" indent="-317500">
               <a:spcBef>
                 <a:spcPts val="0"/>
               </a:spcBef>
@@ -3386,7 +3484,7 @@
               <a:buChar char="●"/>
               <a:defRPr sz="1400"/>
             </a:lvl1pPr>
-            <a:lvl2pPr indent="-304800" lvl="1" marL="914400">
+            <a:lvl2pPr marL="914400" lvl="1" indent="-304800">
               <a:spcBef>
                 <a:spcPts val="1600"/>
               </a:spcBef>
@@ -3397,7 +3495,7 @@
               <a:buChar char="○"/>
               <a:defRPr sz="1200"/>
             </a:lvl2pPr>
-            <a:lvl3pPr indent="-304800" lvl="2" marL="1371600">
+            <a:lvl3pPr marL="1371600" lvl="2" indent="-304800">
               <a:spcBef>
                 <a:spcPts val="1600"/>
               </a:spcBef>
@@ -3408,7 +3506,7 @@
               <a:buChar char="■"/>
               <a:defRPr sz="1200"/>
             </a:lvl3pPr>
-            <a:lvl4pPr indent="-304800" lvl="3" marL="1828800">
+            <a:lvl4pPr marL="1828800" lvl="3" indent="-304800">
               <a:spcBef>
                 <a:spcPts val="1600"/>
               </a:spcBef>
@@ -3419,7 +3517,7 @@
               <a:buChar char="●"/>
               <a:defRPr sz="1200"/>
             </a:lvl4pPr>
-            <a:lvl5pPr indent="-304800" lvl="4" marL="2286000">
+            <a:lvl5pPr marL="2286000" lvl="4" indent="-304800">
               <a:spcBef>
                 <a:spcPts val="1600"/>
               </a:spcBef>
@@ -3430,7 +3528,7 @@
               <a:buChar char="○"/>
               <a:defRPr sz="1200"/>
             </a:lvl5pPr>
-            <a:lvl6pPr indent="-304800" lvl="5" marL="2743200">
+            <a:lvl6pPr marL="2743200" lvl="5" indent="-304800">
               <a:spcBef>
                 <a:spcPts val="1600"/>
               </a:spcBef>
@@ -3441,7 +3539,7 @@
               <a:buChar char="■"/>
               <a:defRPr sz="1200"/>
             </a:lvl6pPr>
-            <a:lvl7pPr indent="-304800" lvl="6" marL="3200400">
+            <a:lvl7pPr marL="3200400" lvl="6" indent="-304800">
               <a:spcBef>
                 <a:spcPts val="1600"/>
               </a:spcBef>
@@ -3452,7 +3550,7 @@
               <a:buChar char="●"/>
               <a:defRPr sz="1200"/>
             </a:lvl7pPr>
-            <a:lvl8pPr indent="-304800" lvl="7" marL="3657600">
+            <a:lvl8pPr marL="3657600" lvl="7" indent="-304800">
               <a:spcBef>
                 <a:spcPts val="1600"/>
               </a:spcBef>
@@ -3463,7 +3561,7 @@
               <a:buChar char="○"/>
               <a:defRPr sz="1200"/>
             </a:lvl8pPr>
-            <a:lvl9pPr indent="-304800" lvl="8" marL="4114800">
+            <a:lvl9pPr marL="4114800" lvl="8" indent="-304800">
               <a:spcBef>
                 <a:spcPts val="1600"/>
               </a:spcBef>
@@ -3475,15 +3573,19 @@
               <a:defRPr sz="1200"/>
             </a:lvl9pPr>
           </a:lstStyle>
-          <a:p/>
+          <a:p>
+            <a:endParaRPr/>
+          </a:p>
         </p:txBody>
       </p:sp>
       <p:sp>
         <p:nvSpPr>
           <p:cNvPr id="29" name="Google Shape;29;p5"/>
-          <p:cNvSpPr txBox="1"/>
+          <p:cNvSpPr txBox="1">
+            <a:spLocks noGrp="1"/>
+          </p:cNvSpPr>
           <p:nvPr>
-            <p:ph idx="2" type="body"/>
+            <p:ph type="body" idx="2"/>
           </p:nvPr>
         </p:nvSpPr>
         <p:spPr>
@@ -3496,11 +3598,11 @@
           </a:prstGeom>
         </p:spPr>
         <p:txBody>
-          <a:bodyPr anchorCtr="0" anchor="t" bIns="91425" lIns="91425" spcFirstLastPara="1" rIns="91425" wrap="square" tIns="91425">
+          <a:bodyPr spcFirstLastPara="1" wrap="square" lIns="91425" tIns="91425" rIns="91425" bIns="91425" anchor="t" anchorCtr="0">
             <a:noAutofit/>
           </a:bodyPr>
           <a:lstStyle>
-            <a:lvl1pPr indent="-317500" lvl="0" marL="457200">
+            <a:lvl1pPr marL="457200" lvl="0" indent="-317500">
               <a:spcBef>
                 <a:spcPts val="0"/>
               </a:spcBef>
@@ -3511,7 +3613,7 @@
               <a:buChar char="●"/>
               <a:defRPr sz="1400"/>
             </a:lvl1pPr>
-            <a:lvl2pPr indent="-304800" lvl="1" marL="914400">
+            <a:lvl2pPr marL="914400" lvl="1" indent="-304800">
               <a:spcBef>
                 <a:spcPts val="1600"/>
               </a:spcBef>
@@ -3522,7 +3624,7 @@
               <a:buChar char="○"/>
               <a:defRPr sz="1200"/>
             </a:lvl2pPr>
-            <a:lvl3pPr indent="-304800" lvl="2" marL="1371600">
+            <a:lvl3pPr marL="1371600" lvl="2" indent="-304800">
               <a:spcBef>
                 <a:spcPts val="1600"/>
               </a:spcBef>
@@ -3533,7 +3635,7 @@
               <a:buChar char="■"/>
               <a:defRPr sz="1200"/>
             </a:lvl3pPr>
-            <a:lvl4pPr indent="-304800" lvl="3" marL="1828800">
+            <a:lvl4pPr marL="1828800" lvl="3" indent="-304800">
               <a:spcBef>
                 <a:spcPts val="1600"/>
               </a:spcBef>
@@ -3544,7 +3646,7 @@
               <a:buChar char="●"/>
               <a:defRPr sz="1200"/>
             </a:lvl4pPr>
-            <a:lvl5pPr indent="-304800" lvl="4" marL="2286000">
+            <a:lvl5pPr marL="2286000" lvl="4" indent="-304800">
               <a:spcBef>
                 <a:spcPts val="1600"/>
               </a:spcBef>
@@ -3555,7 +3657,7 @@
               <a:buChar char="○"/>
               <a:defRPr sz="1200"/>
             </a:lvl5pPr>
-            <a:lvl6pPr indent="-304800" lvl="5" marL="2743200">
+            <a:lvl6pPr marL="2743200" lvl="5" indent="-304800">
               <a:spcBef>
                 <a:spcPts val="1600"/>
               </a:spcBef>
@@ -3566,7 +3668,7 @@
               <a:buChar char="■"/>
               <a:defRPr sz="1200"/>
             </a:lvl6pPr>
-            <a:lvl7pPr indent="-304800" lvl="6" marL="3200400">
+            <a:lvl7pPr marL="3200400" lvl="6" indent="-304800">
               <a:spcBef>
                 <a:spcPts val="1600"/>
               </a:spcBef>
@@ -3577,7 +3679,7 @@
               <a:buChar char="●"/>
               <a:defRPr sz="1200"/>
             </a:lvl7pPr>
-            <a:lvl8pPr indent="-304800" lvl="7" marL="3657600">
+            <a:lvl8pPr marL="3657600" lvl="7" indent="-304800">
               <a:spcBef>
                 <a:spcPts val="1600"/>
               </a:spcBef>
@@ -3588,7 +3690,7 @@
               <a:buChar char="○"/>
               <a:defRPr sz="1200"/>
             </a:lvl8pPr>
-            <a:lvl9pPr indent="-304800" lvl="8" marL="4114800">
+            <a:lvl9pPr marL="4114800" lvl="8" indent="-304800">
               <a:spcBef>
                 <a:spcPts val="1600"/>
               </a:spcBef>
@@ -3600,15 +3702,19 @@
               <a:defRPr sz="1200"/>
             </a:lvl9pPr>
           </a:lstStyle>
-          <a:p/>
+          <a:p>
+            <a:endParaRPr/>
+          </a:p>
         </p:txBody>
       </p:sp>
       <p:sp>
         <p:nvSpPr>
           <p:cNvPr id="30" name="Google Shape;30;p5"/>
-          <p:cNvSpPr txBox="1"/>
+          <p:cNvSpPr txBox="1">
+            <a:spLocks noGrp="1"/>
+          </p:cNvSpPr>
           <p:nvPr>
-            <p:ph idx="12" type="sldNum"/>
+            <p:ph type="sldNum" idx="12"/>
           </p:nvPr>
         </p:nvSpPr>
         <p:spPr>
@@ -3621,7 +3727,7 @@
           </a:prstGeom>
         </p:spPr>
         <p:txBody>
-          <a:bodyPr anchorCtr="0" anchor="ctr" bIns="91425" lIns="91425" spcFirstLastPara="1" rIns="91425" wrap="square" tIns="91425">
+          <a:bodyPr spcFirstLastPara="1" wrap="square" lIns="91425" tIns="91425" rIns="91425" bIns="91425" anchor="ctr" anchorCtr="0">
             <a:noAutofit/>
           </a:bodyPr>
           <a:lstStyle>
@@ -3663,7 +3769,7 @@
             </a:lvl9pPr>
           </a:lstStyle>
           <a:p>
-            <a:pPr indent="0" lvl="0" marL="0" rtl="0" algn="r">
+            <a:pPr marL="0" lvl="0" indent="0" algn="r" rtl="0">
               <a:spcBef>
                 <a:spcPts val="0"/>
               </a:spcBef>
@@ -3689,11 +3795,11 @@
 </file>
 
 <file path=ppt/slideLayouts/slideLayout5.xml><?xml version="1.0" encoding="utf-8"?>
-<p:sldLayout xmlns:a="http://schemas.openxmlformats.org/drawingml/2006/main" xmlns:r="http://schemas.openxmlformats.org/officeDocument/2006/relationships" xmlns:mc="http://schemas.openxmlformats.org/markup-compatibility/2006" xmlns:mv="urn:schemas-microsoft-com:mac:vml" xmlns:p="http://schemas.openxmlformats.org/presentationml/2006/main" xmlns:c="http://schemas.openxmlformats.org/drawingml/2006/chart" xmlns:dgm="http://schemas.openxmlformats.org/drawingml/2006/diagram" xmlns:o="urn:schemas-microsoft-com:office:office" xmlns:v="urn:schemas-microsoft-com:vml" xmlns:pvml="urn:schemas-microsoft-com:office:powerpoint" xmlns:com="http://schemas.openxmlformats.org/drawingml/2006/compatibility" xmlns:p14="http://schemas.microsoft.com/office/powerpoint/2010/main" xmlns:p15="http://schemas.microsoft.com/office/powerpoint/2012/main" matchingName="Title only" type="titleOnly">
+<p:sldLayout xmlns:a="http://schemas.openxmlformats.org/drawingml/2006/main" xmlns:r="http://schemas.openxmlformats.org/officeDocument/2006/relationships" xmlns:p="http://schemas.openxmlformats.org/presentationml/2006/main" matchingName="Title only" type="titleOnly">
   <p:cSld name="TITLE_ONLY">
     <p:spTree>
       <p:nvGrpSpPr>
-        <p:cNvPr id="31" name="Shape 31"/>
+        <p:cNvPr id="1" name="Shape 31"/>
         <p:cNvGrpSpPr/>
         <p:nvPr/>
       </p:nvGrpSpPr>
@@ -3708,7 +3814,9 @@
       <p:sp>
         <p:nvSpPr>
           <p:cNvPr id="32" name="Google Shape;32;p6"/>
-          <p:cNvSpPr txBox="1"/>
+          <p:cNvSpPr txBox="1">
+            <a:spLocks noGrp="1"/>
+          </p:cNvSpPr>
           <p:nvPr>
             <p:ph type="title"/>
           </p:nvPr>
@@ -3723,7 +3831,7 @@
           </a:prstGeom>
         </p:spPr>
         <p:txBody>
-          <a:bodyPr anchorCtr="0" anchor="b" bIns="91425" lIns="91425" spcFirstLastPara="1" rIns="91425" wrap="square" tIns="91425">
+          <a:bodyPr spcFirstLastPara="1" wrap="square" lIns="91425" tIns="91425" rIns="91425" bIns="91425" anchor="b" anchorCtr="0">
             <a:noAutofit/>
           </a:bodyPr>
           <a:lstStyle>
@@ -3827,15 +3935,19 @@
               <a:defRPr/>
             </a:lvl9pPr>
           </a:lstStyle>
-          <a:p/>
+          <a:p>
+            <a:endParaRPr/>
+          </a:p>
         </p:txBody>
       </p:sp>
       <p:sp>
         <p:nvSpPr>
           <p:cNvPr id="33" name="Google Shape;33;p6"/>
-          <p:cNvSpPr txBox="1"/>
+          <p:cNvSpPr txBox="1">
+            <a:spLocks noGrp="1"/>
+          </p:cNvSpPr>
           <p:nvPr>
-            <p:ph idx="12" type="sldNum"/>
+            <p:ph type="sldNum" idx="12"/>
           </p:nvPr>
         </p:nvSpPr>
         <p:spPr>
@@ -3848,7 +3960,7 @@
           </a:prstGeom>
         </p:spPr>
         <p:txBody>
-          <a:bodyPr anchorCtr="0" anchor="ctr" bIns="91425" lIns="91425" spcFirstLastPara="1" rIns="91425" wrap="square" tIns="91425">
+          <a:bodyPr spcFirstLastPara="1" wrap="square" lIns="91425" tIns="91425" rIns="91425" bIns="91425" anchor="ctr" anchorCtr="0">
             <a:noAutofit/>
           </a:bodyPr>
           <a:lstStyle>
@@ -3890,7 +4002,7 @@
             </a:lvl9pPr>
           </a:lstStyle>
           <a:p>
-            <a:pPr indent="0" lvl="0" marL="0" rtl="0" algn="r">
+            <a:pPr marL="0" lvl="0" indent="0" algn="r" rtl="0">
               <a:spcBef>
                 <a:spcPts val="0"/>
               </a:spcBef>
@@ -3916,11 +4028,11 @@
 </file>
 
 <file path=ppt/slideLayouts/slideLayout6.xml><?xml version="1.0" encoding="utf-8"?>
-<p:sldLayout xmlns:a="http://schemas.openxmlformats.org/drawingml/2006/main" xmlns:r="http://schemas.openxmlformats.org/officeDocument/2006/relationships" xmlns:mc="http://schemas.openxmlformats.org/markup-compatibility/2006" xmlns:mv="urn:schemas-microsoft-com:mac:vml" xmlns:p="http://schemas.openxmlformats.org/presentationml/2006/main" xmlns:c="http://schemas.openxmlformats.org/drawingml/2006/chart" xmlns:dgm="http://schemas.openxmlformats.org/drawingml/2006/diagram" xmlns:o="urn:schemas-microsoft-com:office:office" xmlns:v="urn:schemas-microsoft-com:vml" xmlns:pvml="urn:schemas-microsoft-com:office:powerpoint" xmlns:com="http://schemas.openxmlformats.org/drawingml/2006/compatibility" xmlns:p14="http://schemas.microsoft.com/office/powerpoint/2010/main" xmlns:p15="http://schemas.microsoft.com/office/powerpoint/2012/main" matchingName="One column text">
+<p:sldLayout xmlns:a="http://schemas.openxmlformats.org/drawingml/2006/main" xmlns:r="http://schemas.openxmlformats.org/officeDocument/2006/relationships" xmlns:p="http://schemas.openxmlformats.org/presentationml/2006/main" matchingName="One column text">
   <p:cSld name="ONE_COLUMN_TEXT">
     <p:spTree>
       <p:nvGrpSpPr>
-        <p:cNvPr id="34" name="Shape 34"/>
+        <p:cNvPr id="1" name="Shape 34"/>
         <p:cNvGrpSpPr/>
         <p:nvPr/>
       </p:nvGrpSpPr>
@@ -3947,21 +4059,23 @@
             <a:avLst/>
           </a:prstGeom>
           <a:noFill/>
-          <a:ln cap="flat" cmpd="sng" w="38100">
+          <a:ln w="38100" cap="flat" cmpd="sng">
             <a:solidFill>
               <a:schemeClr val="accent4"/>
             </a:solidFill>
             <a:prstDash val="solid"/>
             <a:round/>
-            <a:headEnd len="sm" w="sm" type="none"/>
-            <a:tailEnd len="sm" w="sm" type="none"/>
+            <a:headEnd type="none" w="sm" len="sm"/>
+            <a:tailEnd type="none" w="sm" len="sm"/>
           </a:ln>
         </p:spPr>
       </p:cxnSp>
       <p:sp>
         <p:nvSpPr>
           <p:cNvPr id="36" name="Google Shape;36;p7"/>
-          <p:cNvSpPr txBox="1"/>
+          <p:cNvSpPr txBox="1">
+            <a:spLocks noGrp="1"/>
+          </p:cNvSpPr>
           <p:nvPr>
             <p:ph type="title"/>
           </p:nvPr>
@@ -3976,7 +4090,7 @@
           </a:prstGeom>
         </p:spPr>
         <p:txBody>
-          <a:bodyPr anchorCtr="0" anchor="b" bIns="91425" lIns="91425" spcFirstLastPara="1" rIns="91425" wrap="square" tIns="91425">
+          <a:bodyPr spcFirstLastPara="1" wrap="square" lIns="91425" tIns="91425" rIns="91425" bIns="91425" anchor="b" anchorCtr="0">
             <a:noAutofit/>
           </a:bodyPr>
           <a:lstStyle>
@@ -4080,15 +4194,19 @@
               <a:defRPr sz="2400"/>
             </a:lvl9pPr>
           </a:lstStyle>
-          <a:p/>
+          <a:p>
+            <a:endParaRPr/>
+          </a:p>
         </p:txBody>
       </p:sp>
       <p:sp>
         <p:nvSpPr>
           <p:cNvPr id="37" name="Google Shape;37;p7"/>
-          <p:cNvSpPr txBox="1"/>
+          <p:cNvSpPr txBox="1">
+            <a:spLocks noGrp="1"/>
+          </p:cNvSpPr>
           <p:nvPr>
-            <p:ph idx="1" type="body"/>
+            <p:ph type="body" idx="1"/>
           </p:nvPr>
         </p:nvSpPr>
         <p:spPr>
@@ -4101,11 +4219,11 @@
           </a:prstGeom>
         </p:spPr>
         <p:txBody>
-          <a:bodyPr anchorCtr="0" anchor="t" bIns="91425" lIns="91425" spcFirstLastPara="1" rIns="91425" wrap="square" tIns="91425">
+          <a:bodyPr spcFirstLastPara="1" wrap="square" lIns="91425" tIns="91425" rIns="91425" bIns="91425" anchor="t" anchorCtr="0">
             <a:noAutofit/>
           </a:bodyPr>
           <a:lstStyle>
-            <a:lvl1pPr indent="-304800" lvl="0" marL="457200">
+            <a:lvl1pPr marL="457200" lvl="0" indent="-304800">
               <a:spcBef>
                 <a:spcPts val="0"/>
               </a:spcBef>
@@ -4116,7 +4234,7 @@
               <a:buChar char="●"/>
               <a:defRPr sz="1200"/>
             </a:lvl1pPr>
-            <a:lvl2pPr indent="-304800" lvl="1" marL="914400">
+            <a:lvl2pPr marL="914400" lvl="1" indent="-304800">
               <a:spcBef>
                 <a:spcPts val="1600"/>
               </a:spcBef>
@@ -4127,7 +4245,7 @@
               <a:buChar char="○"/>
               <a:defRPr sz="1200"/>
             </a:lvl2pPr>
-            <a:lvl3pPr indent="-304800" lvl="2" marL="1371600">
+            <a:lvl3pPr marL="1371600" lvl="2" indent="-304800">
               <a:spcBef>
                 <a:spcPts val="1600"/>
               </a:spcBef>
@@ -4138,7 +4256,7 @@
               <a:buChar char="■"/>
               <a:defRPr sz="1200"/>
             </a:lvl3pPr>
-            <a:lvl4pPr indent="-304800" lvl="3" marL="1828800">
+            <a:lvl4pPr marL="1828800" lvl="3" indent="-304800">
               <a:spcBef>
                 <a:spcPts val="1600"/>
               </a:spcBef>
@@ -4149,7 +4267,7 @@
               <a:buChar char="●"/>
               <a:defRPr sz="1200"/>
             </a:lvl4pPr>
-            <a:lvl5pPr indent="-304800" lvl="4" marL="2286000">
+            <a:lvl5pPr marL="2286000" lvl="4" indent="-304800">
               <a:spcBef>
                 <a:spcPts val="1600"/>
               </a:spcBef>
@@ -4160,7 +4278,7 @@
               <a:buChar char="○"/>
               <a:defRPr sz="1200"/>
             </a:lvl5pPr>
-            <a:lvl6pPr indent="-304800" lvl="5" marL="2743200">
+            <a:lvl6pPr marL="2743200" lvl="5" indent="-304800">
               <a:spcBef>
                 <a:spcPts val="1600"/>
               </a:spcBef>
@@ -4171,7 +4289,7 @@
               <a:buChar char="■"/>
               <a:defRPr sz="1200"/>
             </a:lvl6pPr>
-            <a:lvl7pPr indent="-304800" lvl="6" marL="3200400">
+            <a:lvl7pPr marL="3200400" lvl="6" indent="-304800">
               <a:spcBef>
                 <a:spcPts val="1600"/>
               </a:spcBef>
@@ -4182,7 +4300,7 @@
               <a:buChar char="●"/>
               <a:defRPr sz="1200"/>
             </a:lvl7pPr>
-            <a:lvl8pPr indent="-304800" lvl="7" marL="3657600">
+            <a:lvl8pPr marL="3657600" lvl="7" indent="-304800">
               <a:spcBef>
                 <a:spcPts val="1600"/>
               </a:spcBef>
@@ -4193,7 +4311,7 @@
               <a:buChar char="○"/>
               <a:defRPr sz="1200"/>
             </a:lvl8pPr>
-            <a:lvl9pPr indent="-304800" lvl="8" marL="4114800">
+            <a:lvl9pPr marL="4114800" lvl="8" indent="-304800">
               <a:spcBef>
                 <a:spcPts val="1600"/>
               </a:spcBef>
@@ -4205,15 +4323,19 @@
               <a:defRPr sz="1200"/>
             </a:lvl9pPr>
           </a:lstStyle>
-          <a:p/>
+          <a:p>
+            <a:endParaRPr/>
+          </a:p>
         </p:txBody>
       </p:sp>
       <p:sp>
         <p:nvSpPr>
           <p:cNvPr id="38" name="Google Shape;38;p7"/>
-          <p:cNvSpPr txBox="1"/>
+          <p:cNvSpPr txBox="1">
+            <a:spLocks noGrp="1"/>
+          </p:cNvSpPr>
           <p:nvPr>
-            <p:ph idx="12" type="sldNum"/>
+            <p:ph type="sldNum" idx="12"/>
           </p:nvPr>
         </p:nvSpPr>
         <p:spPr>
@@ -4226,7 +4348,7 @@
           </a:prstGeom>
         </p:spPr>
         <p:txBody>
-          <a:bodyPr anchorCtr="0" anchor="ctr" bIns="91425" lIns="91425" spcFirstLastPara="1" rIns="91425" wrap="square" tIns="91425">
+          <a:bodyPr spcFirstLastPara="1" wrap="square" lIns="91425" tIns="91425" rIns="91425" bIns="91425" anchor="ctr" anchorCtr="0">
             <a:noAutofit/>
           </a:bodyPr>
           <a:lstStyle>
@@ -4268,7 +4390,7 @@
             </a:lvl9pPr>
           </a:lstStyle>
           <a:p>
-            <a:pPr indent="0" lvl="0" marL="0" rtl="0" algn="r">
+            <a:pPr marL="0" lvl="0" indent="0" algn="r" rtl="0">
               <a:spcBef>
                 <a:spcPts val="0"/>
               </a:spcBef>
@@ -4294,11 +4416,11 @@
 </file>
 
 <file path=ppt/slideLayouts/slideLayout7.xml><?xml version="1.0" encoding="utf-8"?>
-<p:sldLayout xmlns:a="http://schemas.openxmlformats.org/drawingml/2006/main" xmlns:r="http://schemas.openxmlformats.org/officeDocument/2006/relationships" xmlns:mc="http://schemas.openxmlformats.org/markup-compatibility/2006" xmlns:mv="urn:schemas-microsoft-com:mac:vml" xmlns:p="http://schemas.openxmlformats.org/presentationml/2006/main" xmlns:c="http://schemas.openxmlformats.org/drawingml/2006/chart" xmlns:dgm="http://schemas.openxmlformats.org/drawingml/2006/diagram" xmlns:o="urn:schemas-microsoft-com:office:office" xmlns:v="urn:schemas-microsoft-com:vml" xmlns:pvml="urn:schemas-microsoft-com:office:powerpoint" xmlns:com="http://schemas.openxmlformats.org/drawingml/2006/compatibility" xmlns:p14="http://schemas.microsoft.com/office/powerpoint/2010/main" xmlns:p15="http://schemas.microsoft.com/office/powerpoint/2012/main" matchingName="Main point">
+<p:sldLayout xmlns:a="http://schemas.openxmlformats.org/drawingml/2006/main" xmlns:r="http://schemas.openxmlformats.org/officeDocument/2006/relationships" xmlns:p="http://schemas.openxmlformats.org/presentationml/2006/main" matchingName="Main point">
   <p:cSld name="MAIN_POINT">
     <p:spTree>
       <p:nvGrpSpPr>
-        <p:cNvPr id="39" name="Shape 39"/>
+        <p:cNvPr id="1" name="Shape 39"/>
         <p:cNvGrpSpPr/>
         <p:nvPr/>
       </p:nvGrpSpPr>
@@ -4313,7 +4435,9 @@
       <p:sp>
         <p:nvSpPr>
           <p:cNvPr id="40" name="Google Shape;40;p8"/>
-          <p:cNvSpPr txBox="1"/>
+          <p:cNvSpPr txBox="1">
+            <a:spLocks noGrp="1"/>
+          </p:cNvSpPr>
           <p:nvPr>
             <p:ph type="title"/>
           </p:nvPr>
@@ -4328,7 +4452,7 @@
           </a:prstGeom>
         </p:spPr>
         <p:txBody>
-          <a:bodyPr anchorCtr="0" anchor="ctr" bIns="91425" lIns="91425" spcFirstLastPara="1" rIns="91425" wrap="square" tIns="91425">
+          <a:bodyPr spcFirstLastPara="1" wrap="square" lIns="91425" tIns="91425" rIns="91425" bIns="91425" anchor="ctr" anchorCtr="0">
             <a:noAutofit/>
           </a:bodyPr>
           <a:lstStyle>
@@ -4432,15 +4556,19 @@
               <a:defRPr sz="4800"/>
             </a:lvl9pPr>
           </a:lstStyle>
-          <a:p/>
+          <a:p>
+            <a:endParaRPr/>
+          </a:p>
         </p:txBody>
       </p:sp>
       <p:sp>
         <p:nvSpPr>
           <p:cNvPr id="41" name="Google Shape;41;p8"/>
-          <p:cNvSpPr txBox="1"/>
+          <p:cNvSpPr txBox="1">
+            <a:spLocks noGrp="1"/>
+          </p:cNvSpPr>
           <p:nvPr>
-            <p:ph idx="12" type="sldNum"/>
+            <p:ph type="sldNum" idx="12"/>
           </p:nvPr>
         </p:nvSpPr>
         <p:spPr>
@@ -4453,7 +4581,7 @@
           </a:prstGeom>
         </p:spPr>
         <p:txBody>
-          <a:bodyPr anchorCtr="0" anchor="ctr" bIns="91425" lIns="91425" spcFirstLastPara="1" rIns="91425" wrap="square" tIns="91425">
+          <a:bodyPr spcFirstLastPara="1" wrap="square" lIns="91425" tIns="91425" rIns="91425" bIns="91425" anchor="ctr" anchorCtr="0">
             <a:noAutofit/>
           </a:bodyPr>
           <a:lstStyle>
@@ -4495,7 +4623,7 @@
             </a:lvl9pPr>
           </a:lstStyle>
           <a:p>
-            <a:pPr indent="0" lvl="0" marL="0" rtl="0" algn="r">
+            <a:pPr marL="0" lvl="0" indent="0" algn="r" rtl="0">
               <a:spcBef>
                 <a:spcPts val="0"/>
               </a:spcBef>
@@ -4521,11 +4649,11 @@
 </file>
 
 <file path=ppt/slideLayouts/slideLayout8.xml><?xml version="1.0" encoding="utf-8"?>
-<p:sldLayout xmlns:a="http://schemas.openxmlformats.org/drawingml/2006/main" xmlns:r="http://schemas.openxmlformats.org/officeDocument/2006/relationships" xmlns:mc="http://schemas.openxmlformats.org/markup-compatibility/2006" xmlns:mv="urn:schemas-microsoft-com:mac:vml" xmlns:p="http://schemas.openxmlformats.org/presentationml/2006/main" xmlns:c="http://schemas.openxmlformats.org/drawingml/2006/chart" xmlns:dgm="http://schemas.openxmlformats.org/drawingml/2006/diagram" xmlns:o="urn:schemas-microsoft-com:office:office" xmlns:v="urn:schemas-microsoft-com:vml" xmlns:pvml="urn:schemas-microsoft-com:office:powerpoint" xmlns:com="http://schemas.openxmlformats.org/drawingml/2006/compatibility" xmlns:p14="http://schemas.microsoft.com/office/powerpoint/2010/main" xmlns:p15="http://schemas.microsoft.com/office/powerpoint/2012/main" matchingName="Section title and description">
+<p:sldLayout xmlns:a="http://schemas.openxmlformats.org/drawingml/2006/main" xmlns:r="http://schemas.openxmlformats.org/officeDocument/2006/relationships" xmlns:p="http://schemas.openxmlformats.org/presentationml/2006/main" matchingName="Section title and description">
   <p:cSld name="SECTION_TITLE_AND_DESCRIPTION">
     <p:spTree>
       <p:nvGrpSpPr>
-        <p:cNvPr id="42" name="Shape 42"/>
+        <p:cNvPr id="1" name="Shape 42"/>
         <p:cNvGrpSpPr/>
         <p:nvPr/>
       </p:nvGrpSpPr>
@@ -4559,12 +4687,12 @@
           </a:ln>
         </p:spPr>
         <p:txBody>
-          <a:bodyPr anchorCtr="0" anchor="ctr" bIns="91425" lIns="91425" spcFirstLastPara="1" rIns="91425" wrap="square" tIns="91425">
+          <a:bodyPr spcFirstLastPara="1" wrap="square" lIns="91425" tIns="91425" rIns="91425" bIns="91425" anchor="ctr" anchorCtr="0">
             <a:noAutofit/>
           </a:bodyPr>
           <a:lstStyle/>
           <a:p>
-            <a:pPr indent="0" lvl="0" marL="0" rtl="0" algn="l">
+            <a:pPr marL="0" lvl="0" indent="0" algn="l" rtl="0">
               <a:spcBef>
                 <a:spcPts val="0"/>
               </a:spcBef>
@@ -4573,9 +4701,6 @@
               </a:spcAft>
               <a:buNone/>
             </a:pPr>
-            <a:r>
-              <a:t/>
-            </a:r>
             <a:endParaRPr/>
           </a:p>
         </p:txBody>
@@ -4595,21 +4720,23 @@
             <a:avLst/>
           </a:prstGeom>
           <a:noFill/>
-          <a:ln cap="flat" cmpd="sng" w="38100">
+          <a:ln w="38100" cap="flat" cmpd="sng">
             <a:solidFill>
               <a:schemeClr val="accent5"/>
             </a:solidFill>
             <a:prstDash val="solid"/>
             <a:round/>
-            <a:headEnd len="sm" w="sm" type="none"/>
-            <a:tailEnd len="sm" w="sm" type="none"/>
+            <a:headEnd type="none" w="sm" len="sm"/>
+            <a:tailEnd type="none" w="sm" len="sm"/>
           </a:ln>
         </p:spPr>
       </p:cxnSp>
       <p:sp>
         <p:nvSpPr>
           <p:cNvPr id="45" name="Google Shape;45;p9"/>
-          <p:cNvSpPr txBox="1"/>
+          <p:cNvSpPr txBox="1">
+            <a:spLocks noGrp="1"/>
+          </p:cNvSpPr>
           <p:nvPr>
             <p:ph type="title"/>
           </p:nvPr>
@@ -4624,7 +4751,7 @@
           </a:prstGeom>
         </p:spPr>
         <p:txBody>
-          <a:bodyPr anchorCtr="0" anchor="b" bIns="91425" lIns="91425" spcFirstLastPara="1" rIns="91425" wrap="square" tIns="91425">
+          <a:bodyPr spcFirstLastPara="1" wrap="square" lIns="91425" tIns="91425" rIns="91425" bIns="91425" anchor="b" anchorCtr="0">
             <a:noAutofit/>
           </a:bodyPr>
           <a:lstStyle>
@@ -4728,15 +4855,19 @@
               <a:defRPr sz="3800"/>
             </a:lvl9pPr>
           </a:lstStyle>
-          <a:p/>
+          <a:p>
+            <a:endParaRPr/>
+          </a:p>
         </p:txBody>
       </p:sp>
       <p:sp>
         <p:nvSpPr>
           <p:cNvPr id="46" name="Google Shape;46;p9"/>
-          <p:cNvSpPr txBox="1"/>
+          <p:cNvSpPr txBox="1">
+            <a:spLocks noGrp="1"/>
+          </p:cNvSpPr>
           <p:nvPr>
-            <p:ph idx="1" type="subTitle"/>
+            <p:ph type="subTitle" idx="1"/>
           </p:nvPr>
         </p:nvSpPr>
         <p:spPr>
@@ -4749,7 +4880,7 @@
           </a:prstGeom>
         </p:spPr>
         <p:txBody>
-          <a:bodyPr anchorCtr="0" anchor="t" bIns="91425" lIns="91425" spcFirstLastPara="1" rIns="91425" wrap="square" tIns="91425">
+          <a:bodyPr spcFirstLastPara="1" wrap="square" lIns="91425" tIns="91425" rIns="91425" bIns="91425" anchor="t" anchorCtr="0">
             <a:noAutofit/>
           </a:bodyPr>
           <a:lstStyle>
@@ -4943,15 +5074,19 @@
               </a:defRPr>
             </a:lvl9pPr>
           </a:lstStyle>
-          <a:p/>
+          <a:p>
+            <a:endParaRPr/>
+          </a:p>
         </p:txBody>
       </p:sp>
       <p:sp>
         <p:nvSpPr>
           <p:cNvPr id="47" name="Google Shape;47;p9"/>
-          <p:cNvSpPr txBox="1"/>
+          <p:cNvSpPr txBox="1">
+            <a:spLocks noGrp="1"/>
+          </p:cNvSpPr>
           <p:nvPr>
-            <p:ph idx="2" type="body"/>
+            <p:ph type="body" idx="2"/>
           </p:nvPr>
         </p:nvSpPr>
         <p:spPr>
@@ -4964,11 +5099,11 @@
           </a:prstGeom>
         </p:spPr>
         <p:txBody>
-          <a:bodyPr anchorCtr="0" anchor="ctr" bIns="91425" lIns="91425" spcFirstLastPara="1" rIns="91425" wrap="square" tIns="91425">
+          <a:bodyPr spcFirstLastPara="1" wrap="square" lIns="91425" tIns="91425" rIns="91425" bIns="91425" anchor="ctr" anchorCtr="0">
             <a:noAutofit/>
           </a:bodyPr>
           <a:lstStyle>
-            <a:lvl1pPr indent="-342900" lvl="0" marL="457200">
+            <a:lvl1pPr marL="457200" lvl="0" indent="-342900">
               <a:spcBef>
                 <a:spcPts val="0"/>
               </a:spcBef>
@@ -4979,7 +5114,7 @@
               <a:buChar char="●"/>
               <a:defRPr/>
             </a:lvl1pPr>
-            <a:lvl2pPr indent="-317500" lvl="1" marL="914400">
+            <a:lvl2pPr marL="914400" lvl="1" indent="-317500">
               <a:spcBef>
                 <a:spcPts val="1600"/>
               </a:spcBef>
@@ -4990,7 +5125,7 @@
               <a:buChar char="○"/>
               <a:defRPr/>
             </a:lvl2pPr>
-            <a:lvl3pPr indent="-317500" lvl="2" marL="1371600">
+            <a:lvl3pPr marL="1371600" lvl="2" indent="-317500">
               <a:spcBef>
                 <a:spcPts val="1600"/>
               </a:spcBef>
@@ -5001,7 +5136,7 @@
               <a:buChar char="■"/>
               <a:defRPr/>
             </a:lvl3pPr>
-            <a:lvl4pPr indent="-317500" lvl="3" marL="1828800">
+            <a:lvl4pPr marL="1828800" lvl="3" indent="-317500">
               <a:spcBef>
                 <a:spcPts val="1600"/>
               </a:spcBef>
@@ -5012,7 +5147,7 @@
               <a:buChar char="●"/>
               <a:defRPr/>
             </a:lvl4pPr>
-            <a:lvl5pPr indent="-317500" lvl="4" marL="2286000">
+            <a:lvl5pPr marL="2286000" lvl="4" indent="-317500">
               <a:spcBef>
                 <a:spcPts val="1600"/>
               </a:spcBef>
@@ -5023,7 +5158,7 @@
               <a:buChar char="○"/>
               <a:defRPr/>
             </a:lvl5pPr>
-            <a:lvl6pPr indent="-317500" lvl="5" marL="2743200">
+            <a:lvl6pPr marL="2743200" lvl="5" indent="-317500">
               <a:spcBef>
                 <a:spcPts val="1600"/>
               </a:spcBef>
@@ -5034,7 +5169,7 @@
               <a:buChar char="■"/>
               <a:defRPr/>
             </a:lvl6pPr>
-            <a:lvl7pPr indent="-317500" lvl="6" marL="3200400">
+            <a:lvl7pPr marL="3200400" lvl="6" indent="-317500">
               <a:spcBef>
                 <a:spcPts val="1600"/>
               </a:spcBef>
@@ -5045,7 +5180,7 @@
               <a:buChar char="●"/>
               <a:defRPr/>
             </a:lvl7pPr>
-            <a:lvl8pPr indent="-317500" lvl="7" marL="3657600">
+            <a:lvl8pPr marL="3657600" lvl="7" indent="-317500">
               <a:spcBef>
                 <a:spcPts val="1600"/>
               </a:spcBef>
@@ -5056,7 +5191,7 @@
               <a:buChar char="○"/>
               <a:defRPr/>
             </a:lvl8pPr>
-            <a:lvl9pPr indent="-317500" lvl="8" marL="4114800">
+            <a:lvl9pPr marL="4114800" lvl="8" indent="-317500">
               <a:spcBef>
                 <a:spcPts val="1600"/>
               </a:spcBef>
@@ -5068,15 +5203,19 @@
               <a:defRPr/>
             </a:lvl9pPr>
           </a:lstStyle>
-          <a:p/>
+          <a:p>
+            <a:endParaRPr/>
+          </a:p>
         </p:txBody>
       </p:sp>
       <p:sp>
         <p:nvSpPr>
           <p:cNvPr id="48" name="Google Shape;48;p9"/>
-          <p:cNvSpPr txBox="1"/>
+          <p:cNvSpPr txBox="1">
+            <a:spLocks noGrp="1"/>
+          </p:cNvSpPr>
           <p:nvPr>
-            <p:ph idx="12" type="sldNum"/>
+            <p:ph type="sldNum" idx="12"/>
           </p:nvPr>
         </p:nvSpPr>
         <p:spPr>
@@ -5089,7 +5228,7 @@
           </a:prstGeom>
         </p:spPr>
         <p:txBody>
-          <a:bodyPr anchorCtr="0" anchor="ctr" bIns="91425" lIns="91425" spcFirstLastPara="1" rIns="91425" wrap="square" tIns="91425">
+          <a:bodyPr spcFirstLastPara="1" wrap="square" lIns="91425" tIns="91425" rIns="91425" bIns="91425" anchor="ctr" anchorCtr="0">
             <a:noAutofit/>
           </a:bodyPr>
           <a:lstStyle>
@@ -5131,7 +5270,7 @@
             </a:lvl9pPr>
           </a:lstStyle>
           <a:p>
-            <a:pPr indent="0" lvl="0" marL="0" rtl="0" algn="r">
+            <a:pPr marL="0" lvl="0" indent="0" algn="r" rtl="0">
               <a:spcBef>
                 <a:spcPts val="0"/>
               </a:spcBef>
@@ -5157,11 +5296,11 @@
 </file>
 
 <file path=ppt/slideLayouts/slideLayout9.xml><?xml version="1.0" encoding="utf-8"?>
-<p:sldLayout xmlns:a="http://schemas.openxmlformats.org/drawingml/2006/main" xmlns:r="http://schemas.openxmlformats.org/officeDocument/2006/relationships" xmlns:mc="http://schemas.openxmlformats.org/markup-compatibility/2006" xmlns:mv="urn:schemas-microsoft-com:mac:vml" xmlns:p="http://schemas.openxmlformats.org/presentationml/2006/main" xmlns:c="http://schemas.openxmlformats.org/drawingml/2006/chart" xmlns:dgm="http://schemas.openxmlformats.org/drawingml/2006/diagram" xmlns:o="urn:schemas-microsoft-com:office:office" xmlns:v="urn:schemas-microsoft-com:vml" xmlns:pvml="urn:schemas-microsoft-com:office:powerpoint" xmlns:com="http://schemas.openxmlformats.org/drawingml/2006/compatibility" xmlns:p14="http://schemas.microsoft.com/office/powerpoint/2010/main" xmlns:p15="http://schemas.microsoft.com/office/powerpoint/2012/main" matchingName="Caption">
+<p:sldLayout xmlns:a="http://schemas.openxmlformats.org/drawingml/2006/main" xmlns:r="http://schemas.openxmlformats.org/officeDocument/2006/relationships" xmlns:p="http://schemas.openxmlformats.org/presentationml/2006/main" matchingName="Caption">
   <p:cSld name="CAPTION_ONLY">
     <p:spTree>
       <p:nvGrpSpPr>
-        <p:cNvPr id="49" name="Shape 49"/>
+        <p:cNvPr id="1" name="Shape 49"/>
         <p:cNvGrpSpPr/>
         <p:nvPr/>
       </p:nvGrpSpPr>
@@ -5176,9 +5315,11 @@
       <p:sp>
         <p:nvSpPr>
           <p:cNvPr id="50" name="Google Shape;50;p10"/>
-          <p:cNvSpPr txBox="1"/>
+          <p:cNvSpPr txBox="1">
+            <a:spLocks noGrp="1"/>
+          </p:cNvSpPr>
           <p:nvPr>
-            <p:ph idx="1" type="body"/>
+            <p:ph type="body" idx="1"/>
           </p:nvPr>
         </p:nvSpPr>
         <p:spPr>
@@ -5191,11 +5332,11 @@
           </a:prstGeom>
         </p:spPr>
         <p:txBody>
-          <a:bodyPr anchorCtr="0" anchor="ctr" bIns="91425" lIns="91425" spcFirstLastPara="1" rIns="91425" wrap="square" tIns="91425">
+          <a:bodyPr spcFirstLastPara="1" wrap="square" lIns="91425" tIns="91425" rIns="91425" bIns="91425" anchor="ctr" anchorCtr="0">
             <a:noAutofit/>
           </a:bodyPr>
           <a:lstStyle>
-            <a:lvl1pPr indent="-228600" lvl="0" marL="457200">
+            <a:lvl1pPr marL="457200" lvl="0" indent="-228600">
               <a:lnSpc>
                 <a:spcPct val="100000"/>
               </a:lnSpc>
@@ -5216,15 +5357,19 @@
               </a:defRPr>
             </a:lvl1pPr>
           </a:lstStyle>
-          <a:p/>
+          <a:p>
+            <a:endParaRPr/>
+          </a:p>
         </p:txBody>
       </p:sp>
       <p:sp>
         <p:nvSpPr>
           <p:cNvPr id="51" name="Google Shape;51;p10"/>
-          <p:cNvSpPr txBox="1"/>
+          <p:cNvSpPr txBox="1">
+            <a:spLocks noGrp="1"/>
+          </p:cNvSpPr>
           <p:nvPr>
-            <p:ph idx="12" type="sldNum"/>
+            <p:ph type="sldNum" idx="12"/>
           </p:nvPr>
         </p:nvSpPr>
         <p:spPr>
@@ -5237,7 +5382,7 @@
           </a:prstGeom>
         </p:spPr>
         <p:txBody>
-          <a:bodyPr anchorCtr="0" anchor="ctr" bIns="91425" lIns="91425" spcFirstLastPara="1" rIns="91425" wrap="square" tIns="91425">
+          <a:bodyPr spcFirstLastPara="1" wrap="square" lIns="91425" tIns="91425" rIns="91425" bIns="91425" anchor="ctr" anchorCtr="0">
             <a:noAutofit/>
           </a:bodyPr>
           <a:lstStyle>
@@ -5279,7 +5424,7 @@
             </a:lvl9pPr>
           </a:lstStyle>
           <a:p>
-            <a:pPr indent="0" lvl="0" marL="0" rtl="0" algn="r">
+            <a:pPr marL="0" lvl="0" indent="0" algn="r" rtl="0">
               <a:spcBef>
                 <a:spcPts val="0"/>
               </a:spcBef>
@@ -5305,18 +5450,19 @@
 </file>
 
 <file path=ppt/slideMasters/slideMaster1.xml><?xml version="1.0" encoding="utf-8"?>
-<p:sldMaster xmlns:a="http://schemas.openxmlformats.org/drawingml/2006/main" xmlns:r="http://schemas.openxmlformats.org/officeDocument/2006/relationships" xmlns:mc="http://schemas.openxmlformats.org/markup-compatibility/2006" xmlns:mv="urn:schemas-microsoft-com:mac:vml" xmlns:p="http://schemas.openxmlformats.org/presentationml/2006/main" xmlns:c="http://schemas.openxmlformats.org/drawingml/2006/chart" xmlns:dgm="http://schemas.openxmlformats.org/drawingml/2006/diagram" xmlns:o="urn:schemas-microsoft-com:office:office" xmlns:v="urn:schemas-microsoft-com:vml" xmlns:pvml="urn:schemas-microsoft-com:office:powerpoint" xmlns:com="http://schemas.openxmlformats.org/drawingml/2006/compatibility" xmlns:p14="http://schemas.microsoft.com/office/powerpoint/2010/main" xmlns:p15="http://schemas.microsoft.com/office/powerpoint/2012/main">
+<p:sldMaster xmlns:a="http://schemas.openxmlformats.org/drawingml/2006/main" xmlns:r="http://schemas.openxmlformats.org/officeDocument/2006/relationships" xmlns:p="http://schemas.openxmlformats.org/presentationml/2006/main">
   <p:cSld name="marina">
     <p:bg>
       <p:bgPr>
         <a:solidFill>
           <a:schemeClr val="lt1"/>
         </a:solidFill>
+        <a:effectLst/>
       </p:bgPr>
     </p:bg>
     <p:spTree>
       <p:nvGrpSpPr>
-        <p:cNvPr id="5" name="Shape 5"/>
+        <p:cNvPr id="1" name="Shape 5"/>
         <p:cNvGrpSpPr/>
         <p:nvPr/>
       </p:nvGrpSpPr>
@@ -5331,7 +5477,9 @@
       <p:sp>
         <p:nvSpPr>
           <p:cNvPr id="6" name="Google Shape;6;p1"/>
-          <p:cNvSpPr txBox="1"/>
+          <p:cNvSpPr txBox="1">
+            <a:spLocks noGrp="1"/>
+          </p:cNvSpPr>
           <p:nvPr>
             <p:ph type="title"/>
           </p:nvPr>
@@ -5350,7 +5498,7 @@
           </a:ln>
         </p:spPr>
         <p:txBody>
-          <a:bodyPr anchorCtr="0" anchor="b" bIns="91425" lIns="91425" spcFirstLastPara="1" rIns="91425" wrap="square" tIns="91425">
+          <a:bodyPr spcFirstLastPara="1" wrap="square" lIns="91425" tIns="91425" rIns="91425" bIns="91425" anchor="b" anchorCtr="0">
             <a:noAutofit/>
           </a:bodyPr>
           <a:lstStyle>
@@ -5562,15 +5710,19 @@
               </a:defRPr>
             </a:lvl9pPr>
           </a:lstStyle>
-          <a:p/>
+          <a:p>
+            <a:endParaRPr/>
+          </a:p>
         </p:txBody>
       </p:sp>
       <p:sp>
         <p:nvSpPr>
           <p:cNvPr id="7" name="Google Shape;7;p1"/>
-          <p:cNvSpPr txBox="1"/>
+          <p:cNvSpPr txBox="1">
+            <a:spLocks noGrp="1"/>
+          </p:cNvSpPr>
           <p:nvPr>
-            <p:ph idx="1" type="body"/>
+            <p:ph type="body" idx="1"/>
           </p:nvPr>
         </p:nvSpPr>
         <p:spPr>
@@ -5587,11 +5739,11 @@
           </a:ln>
         </p:spPr>
         <p:txBody>
-          <a:bodyPr anchorCtr="0" anchor="t" bIns="91425" lIns="91425" spcFirstLastPara="1" rIns="91425" wrap="square" tIns="91425">
+          <a:bodyPr spcFirstLastPara="1" wrap="square" lIns="91425" tIns="91425" rIns="91425" bIns="91425" anchor="t" anchorCtr="0">
             <a:noAutofit/>
           </a:bodyPr>
           <a:lstStyle>
-            <a:lvl1pPr indent="-342900" lvl="0" marL="457200">
+            <a:lvl1pPr marL="457200" lvl="0" indent="-342900">
               <a:lnSpc>
                 <a:spcPct val="115000"/>
               </a:lnSpc>
@@ -5617,7 +5769,7 @@
                 <a:sym typeface="Roboto"/>
               </a:defRPr>
             </a:lvl1pPr>
-            <a:lvl2pPr indent="-317500" lvl="1" marL="914400">
+            <a:lvl2pPr marL="914400" lvl="1" indent="-317500">
               <a:lnSpc>
                 <a:spcPct val="115000"/>
               </a:lnSpc>
@@ -5643,7 +5795,7 @@
                 <a:sym typeface="Roboto"/>
               </a:defRPr>
             </a:lvl2pPr>
-            <a:lvl3pPr indent="-317500" lvl="2" marL="1371600">
+            <a:lvl3pPr marL="1371600" lvl="2" indent="-317500">
               <a:lnSpc>
                 <a:spcPct val="115000"/>
               </a:lnSpc>
@@ -5669,7 +5821,7 @@
                 <a:sym typeface="Roboto"/>
               </a:defRPr>
             </a:lvl3pPr>
-            <a:lvl4pPr indent="-317500" lvl="3" marL="1828800">
+            <a:lvl4pPr marL="1828800" lvl="3" indent="-317500">
               <a:lnSpc>
                 <a:spcPct val="115000"/>
               </a:lnSpc>
@@ -5695,7 +5847,7 @@
                 <a:sym typeface="Roboto"/>
               </a:defRPr>
             </a:lvl4pPr>
-            <a:lvl5pPr indent="-317500" lvl="4" marL="2286000">
+            <a:lvl5pPr marL="2286000" lvl="4" indent="-317500">
               <a:lnSpc>
                 <a:spcPct val="115000"/>
               </a:lnSpc>
@@ -5721,7 +5873,7 @@
                 <a:sym typeface="Roboto"/>
               </a:defRPr>
             </a:lvl5pPr>
-            <a:lvl6pPr indent="-317500" lvl="5" marL="2743200">
+            <a:lvl6pPr marL="2743200" lvl="5" indent="-317500">
               <a:lnSpc>
                 <a:spcPct val="115000"/>
               </a:lnSpc>
@@ -5747,7 +5899,7 @@
                 <a:sym typeface="Roboto"/>
               </a:defRPr>
             </a:lvl6pPr>
-            <a:lvl7pPr indent="-317500" lvl="6" marL="3200400">
+            <a:lvl7pPr marL="3200400" lvl="6" indent="-317500">
               <a:lnSpc>
                 <a:spcPct val="115000"/>
               </a:lnSpc>
@@ -5773,7 +5925,7 @@
                 <a:sym typeface="Roboto"/>
               </a:defRPr>
             </a:lvl7pPr>
-            <a:lvl8pPr indent="-317500" lvl="7" marL="3657600">
+            <a:lvl8pPr marL="3657600" lvl="7" indent="-317500">
               <a:lnSpc>
                 <a:spcPct val="115000"/>
               </a:lnSpc>
@@ -5799,7 +5951,7 @@
                 <a:sym typeface="Roboto"/>
               </a:defRPr>
             </a:lvl8pPr>
-            <a:lvl9pPr indent="-317500" lvl="8" marL="4114800">
+            <a:lvl9pPr marL="4114800" lvl="8" indent="-317500">
               <a:lnSpc>
                 <a:spcPct val="115000"/>
               </a:lnSpc>
@@ -5826,15 +5978,19 @@
               </a:defRPr>
             </a:lvl9pPr>
           </a:lstStyle>
-          <a:p/>
+          <a:p>
+            <a:endParaRPr/>
+          </a:p>
         </p:txBody>
       </p:sp>
       <p:sp>
         <p:nvSpPr>
           <p:cNvPr id="8" name="Google Shape;8;p1"/>
-          <p:cNvSpPr txBox="1"/>
+          <p:cNvSpPr txBox="1">
+            <a:spLocks noGrp="1"/>
+          </p:cNvSpPr>
           <p:nvPr>
-            <p:ph idx="12" type="sldNum"/>
+            <p:ph type="sldNum" idx="12"/>
           </p:nvPr>
         </p:nvSpPr>
         <p:spPr>
@@ -5851,7 +6007,7 @@
           </a:ln>
         </p:spPr>
         <p:txBody>
-          <a:bodyPr anchorCtr="0" anchor="ctr" bIns="91425" lIns="91425" spcFirstLastPara="1" rIns="91425" wrap="square" tIns="91425">
+          <a:bodyPr spcFirstLastPara="1" wrap="square" lIns="91425" tIns="91425" rIns="91425" bIns="91425" anchor="ctr" anchorCtr="0">
             <a:noAutofit/>
           </a:bodyPr>
           <a:lstStyle>
@@ -5965,7 +6121,7 @@
             </a:lvl9pPr>
           </a:lstStyle>
           <a:p>
-            <a:pPr indent="0" lvl="0" marL="0" rtl="0" algn="r">
+            <a:pPr marL="0" lvl="0" indent="0" algn="r" rtl="0">
               <a:spcBef>
                 <a:spcPts val="0"/>
               </a:spcBef>
@@ -5984,7 +6140,7 @@
       </p:sp>
     </p:spTree>
   </p:cSld>
-  <p:clrMap accent1="accent1" accent2="accent2" accent3="accent3" accent4="accent4" accent5="accent5" accent6="accent6" bg1="lt1" bg2="dk2" tx1="dk1" tx2="lt2" folHlink="folHlink" hlink="hlink"/>
+  <p:clrMap bg1="lt1" tx1="dk1" bg2="dk2" tx2="lt2" accent1="accent1" accent2="accent2" accent3="accent3" accent4="accent4" accent5="accent5" accent6="accent6" hlink="hlink" folHlink="folHlink"/>
   <p:sldLayoutIdLst>
     <p:sldLayoutId id="2147483648" r:id="rId1"/>
     <p:sldLayoutId id="2147483649" r:id="rId2"/>
@@ -5998,10 +6154,10 @@
     <p:sldLayoutId id="2147483657" r:id="rId10"/>
     <p:sldLayoutId id="2147483658" r:id="rId11"/>
   </p:sldLayoutIdLst>
-  <p:hf dt="0" ftr="0" hdr="0" sldNum="0"/>
+  <p:hf sldNum="0" hdr="0" ftr="0" dt="0"/>
   <p:txStyles>
     <p:titleStyle>
-      <a:defPPr lvl="0" marR="0" rtl="0" algn="l">
+      <a:defPPr marR="0" lvl="0" algn="l" rtl="0">
         <a:lnSpc>
           <a:spcPct val="100000"/>
         </a:lnSpc>
@@ -6012,7 +6168,7 @@
           <a:spcPts val="0"/>
         </a:spcAft>
       </a:defPPr>
-      <a:lvl1pPr lvl="0" marR="0" rtl="0" algn="l">
+      <a:lvl1pPr marR="0" lvl="0" algn="l" rtl="0">
         <a:lnSpc>
           <a:spcPct val="100000"/>
         </a:lnSpc>
@@ -6026,7 +6182,7 @@
           <a:srgbClr val="000000"/>
         </a:buClr>
         <a:buFont typeface="Arial"/>
-        <a:defRPr b="0" i="0" sz="1400" u="none" cap="none" strike="noStrike">
+        <a:defRPr sz="1400" b="0" i="0" u="none" strike="noStrike" cap="none">
           <a:solidFill>
             <a:srgbClr val="000000"/>
           </a:solidFill>
@@ -6036,7 +6192,7 @@
           <a:sym typeface="Arial"/>
         </a:defRPr>
       </a:lvl1pPr>
-      <a:lvl2pPr lvl="1" marR="0" rtl="0" algn="l">
+      <a:lvl2pPr marR="0" lvl="1" algn="l" rtl="0">
         <a:lnSpc>
           <a:spcPct val="100000"/>
         </a:lnSpc>
@@ -6050,7 +6206,7 @@
           <a:srgbClr val="000000"/>
         </a:buClr>
         <a:buFont typeface="Arial"/>
-        <a:defRPr b="0" i="0" sz="1400" u="none" cap="none" strike="noStrike">
+        <a:defRPr sz="1400" b="0" i="0" u="none" strike="noStrike" cap="none">
           <a:solidFill>
             <a:srgbClr val="000000"/>
           </a:solidFill>
@@ -6060,7 +6216,7 @@
           <a:sym typeface="Arial"/>
         </a:defRPr>
       </a:lvl2pPr>
-      <a:lvl3pPr lvl="2" marR="0" rtl="0" algn="l">
+      <a:lvl3pPr marR="0" lvl="2" algn="l" rtl="0">
         <a:lnSpc>
           <a:spcPct val="100000"/>
         </a:lnSpc>
@@ -6074,7 +6230,7 @@
           <a:srgbClr val="000000"/>
         </a:buClr>
         <a:buFont typeface="Arial"/>
-        <a:defRPr b="0" i="0" sz="1400" u="none" cap="none" strike="noStrike">
+        <a:defRPr sz="1400" b="0" i="0" u="none" strike="noStrike" cap="none">
           <a:solidFill>
             <a:srgbClr val="000000"/>
           </a:solidFill>
@@ -6084,7 +6240,7 @@
           <a:sym typeface="Arial"/>
         </a:defRPr>
       </a:lvl3pPr>
-      <a:lvl4pPr lvl="3" marR="0" rtl="0" algn="l">
+      <a:lvl4pPr marR="0" lvl="3" algn="l" rtl="0">
         <a:lnSpc>
           <a:spcPct val="100000"/>
         </a:lnSpc>
@@ -6098,7 +6254,7 @@
           <a:srgbClr val="000000"/>
         </a:buClr>
         <a:buFont typeface="Arial"/>
-        <a:defRPr b="0" i="0" sz="1400" u="none" cap="none" strike="noStrike">
+        <a:defRPr sz="1400" b="0" i="0" u="none" strike="noStrike" cap="none">
           <a:solidFill>
             <a:srgbClr val="000000"/>
           </a:solidFill>
@@ -6108,7 +6264,7 @@
           <a:sym typeface="Arial"/>
         </a:defRPr>
       </a:lvl4pPr>
-      <a:lvl5pPr lvl="4" marR="0" rtl="0" algn="l">
+      <a:lvl5pPr marR="0" lvl="4" algn="l" rtl="0">
         <a:lnSpc>
           <a:spcPct val="100000"/>
         </a:lnSpc>
@@ -6122,7 +6278,7 @@
           <a:srgbClr val="000000"/>
         </a:buClr>
         <a:buFont typeface="Arial"/>
-        <a:defRPr b="0" i="0" sz="1400" u="none" cap="none" strike="noStrike">
+        <a:defRPr sz="1400" b="0" i="0" u="none" strike="noStrike" cap="none">
           <a:solidFill>
             <a:srgbClr val="000000"/>
           </a:solidFill>
@@ -6132,7 +6288,7 @@
           <a:sym typeface="Arial"/>
         </a:defRPr>
       </a:lvl5pPr>
-      <a:lvl6pPr lvl="5" marR="0" rtl="0" algn="l">
+      <a:lvl6pPr marR="0" lvl="5" algn="l" rtl="0">
         <a:lnSpc>
           <a:spcPct val="100000"/>
         </a:lnSpc>
@@ -6146,7 +6302,7 @@
           <a:srgbClr val="000000"/>
         </a:buClr>
         <a:buFont typeface="Arial"/>
-        <a:defRPr b="0" i="0" sz="1400" u="none" cap="none" strike="noStrike">
+        <a:defRPr sz="1400" b="0" i="0" u="none" strike="noStrike" cap="none">
           <a:solidFill>
             <a:srgbClr val="000000"/>
           </a:solidFill>
@@ -6156,7 +6312,7 @@
           <a:sym typeface="Arial"/>
         </a:defRPr>
       </a:lvl6pPr>
-      <a:lvl7pPr lvl="6" marR="0" rtl="0" algn="l">
+      <a:lvl7pPr marR="0" lvl="6" algn="l" rtl="0">
         <a:lnSpc>
           <a:spcPct val="100000"/>
         </a:lnSpc>
@@ -6170,7 +6326,7 @@
           <a:srgbClr val="000000"/>
         </a:buClr>
         <a:buFont typeface="Arial"/>
-        <a:defRPr b="0" i="0" sz="1400" u="none" cap="none" strike="noStrike">
+        <a:defRPr sz="1400" b="0" i="0" u="none" strike="noStrike" cap="none">
           <a:solidFill>
             <a:srgbClr val="000000"/>
           </a:solidFill>
@@ -6180,7 +6336,7 @@
           <a:sym typeface="Arial"/>
         </a:defRPr>
       </a:lvl7pPr>
-      <a:lvl8pPr lvl="7" marR="0" rtl="0" algn="l">
+      <a:lvl8pPr marR="0" lvl="7" algn="l" rtl="0">
         <a:lnSpc>
           <a:spcPct val="100000"/>
         </a:lnSpc>
@@ -6194,7 +6350,7 @@
           <a:srgbClr val="000000"/>
         </a:buClr>
         <a:buFont typeface="Arial"/>
-        <a:defRPr b="0" i="0" sz="1400" u="none" cap="none" strike="noStrike">
+        <a:defRPr sz="1400" b="0" i="0" u="none" strike="noStrike" cap="none">
           <a:solidFill>
             <a:srgbClr val="000000"/>
           </a:solidFill>
@@ -6204,7 +6360,7 @@
           <a:sym typeface="Arial"/>
         </a:defRPr>
       </a:lvl8pPr>
-      <a:lvl9pPr lvl="8" marR="0" rtl="0" algn="l">
+      <a:lvl9pPr marR="0" lvl="8" algn="l" rtl="0">
         <a:lnSpc>
           <a:spcPct val="100000"/>
         </a:lnSpc>
@@ -6218,7 +6374,7 @@
           <a:srgbClr val="000000"/>
         </a:buClr>
         <a:buFont typeface="Arial"/>
-        <a:defRPr b="0" i="0" sz="1400" u="none" cap="none" strike="noStrike">
+        <a:defRPr sz="1400" b="0" i="0" u="none" strike="noStrike" cap="none">
           <a:solidFill>
             <a:srgbClr val="000000"/>
           </a:solidFill>
@@ -6230,7 +6386,7 @@
       </a:lvl9pPr>
     </p:titleStyle>
     <p:bodyStyle>
-      <a:defPPr lvl="0" marR="0" rtl="0" algn="l">
+      <a:defPPr marR="0" lvl="0" algn="l" rtl="0">
         <a:lnSpc>
           <a:spcPct val="100000"/>
         </a:lnSpc>
@@ -6241,7 +6397,7 @@
           <a:spcPts val="0"/>
         </a:spcAft>
       </a:defPPr>
-      <a:lvl1pPr lvl="0" marR="0" rtl="0" algn="l">
+      <a:lvl1pPr marR="0" lvl="0" algn="l" rtl="0">
         <a:lnSpc>
           <a:spcPct val="100000"/>
         </a:lnSpc>
@@ -6255,7 +6411,7 @@
           <a:srgbClr val="000000"/>
         </a:buClr>
         <a:buFont typeface="Arial"/>
-        <a:defRPr b="0" i="0" sz="1400" u="none" cap="none" strike="noStrike">
+        <a:defRPr sz="1400" b="0" i="0" u="none" strike="noStrike" cap="none">
           <a:solidFill>
             <a:srgbClr val="000000"/>
           </a:solidFill>
@@ -6265,7 +6421,7 @@
           <a:sym typeface="Arial"/>
         </a:defRPr>
       </a:lvl1pPr>
-      <a:lvl2pPr lvl="1" marR="0" rtl="0" algn="l">
+      <a:lvl2pPr marR="0" lvl="1" algn="l" rtl="0">
         <a:lnSpc>
           <a:spcPct val="100000"/>
         </a:lnSpc>
@@ -6279,7 +6435,7 @@
           <a:srgbClr val="000000"/>
         </a:buClr>
         <a:buFont typeface="Arial"/>
-        <a:defRPr b="0" i="0" sz="1400" u="none" cap="none" strike="noStrike">
+        <a:defRPr sz="1400" b="0" i="0" u="none" strike="noStrike" cap="none">
           <a:solidFill>
             <a:srgbClr val="000000"/>
           </a:solidFill>
@@ -6289,7 +6445,7 @@
           <a:sym typeface="Arial"/>
         </a:defRPr>
       </a:lvl2pPr>
-      <a:lvl3pPr lvl="2" marR="0" rtl="0" algn="l">
+      <a:lvl3pPr marR="0" lvl="2" algn="l" rtl="0">
         <a:lnSpc>
           <a:spcPct val="100000"/>
         </a:lnSpc>
@@ -6303,7 +6459,7 @@
           <a:srgbClr val="000000"/>
         </a:buClr>
         <a:buFont typeface="Arial"/>
-        <a:defRPr b="0" i="0" sz="1400" u="none" cap="none" strike="noStrike">
+        <a:defRPr sz="1400" b="0" i="0" u="none" strike="noStrike" cap="none">
           <a:solidFill>
             <a:srgbClr val="000000"/>
           </a:solidFill>
@@ -6313,7 +6469,7 @@
           <a:sym typeface="Arial"/>
         </a:defRPr>
       </a:lvl3pPr>
-      <a:lvl4pPr lvl="3" marR="0" rtl="0" algn="l">
+      <a:lvl4pPr marR="0" lvl="3" algn="l" rtl="0">
         <a:lnSpc>
           <a:spcPct val="100000"/>
         </a:lnSpc>
@@ -6327,7 +6483,7 @@
           <a:srgbClr val="000000"/>
         </a:buClr>
         <a:buFont typeface="Arial"/>
-        <a:defRPr b="0" i="0" sz="1400" u="none" cap="none" strike="noStrike">
+        <a:defRPr sz="1400" b="0" i="0" u="none" strike="noStrike" cap="none">
           <a:solidFill>
             <a:srgbClr val="000000"/>
           </a:solidFill>
@@ -6337,7 +6493,7 @@
           <a:sym typeface="Arial"/>
         </a:defRPr>
       </a:lvl4pPr>
-      <a:lvl5pPr lvl="4" marR="0" rtl="0" algn="l">
+      <a:lvl5pPr marR="0" lvl="4" algn="l" rtl="0">
         <a:lnSpc>
           <a:spcPct val="100000"/>
         </a:lnSpc>
@@ -6351,7 +6507,7 @@
           <a:srgbClr val="000000"/>
         </a:buClr>
         <a:buFont typeface="Arial"/>
-        <a:defRPr b="0" i="0" sz="1400" u="none" cap="none" strike="noStrike">
+        <a:defRPr sz="1400" b="0" i="0" u="none" strike="noStrike" cap="none">
           <a:solidFill>
             <a:srgbClr val="000000"/>
           </a:solidFill>
@@ -6361,7 +6517,7 @@
           <a:sym typeface="Arial"/>
         </a:defRPr>
       </a:lvl5pPr>
-      <a:lvl6pPr lvl="5" marR="0" rtl="0" algn="l">
+      <a:lvl6pPr marR="0" lvl="5" algn="l" rtl="0">
         <a:lnSpc>
           <a:spcPct val="100000"/>
         </a:lnSpc>
@@ -6375,7 +6531,7 @@
           <a:srgbClr val="000000"/>
         </a:buClr>
         <a:buFont typeface="Arial"/>
-        <a:defRPr b="0" i="0" sz="1400" u="none" cap="none" strike="noStrike">
+        <a:defRPr sz="1400" b="0" i="0" u="none" strike="noStrike" cap="none">
           <a:solidFill>
             <a:srgbClr val="000000"/>
           </a:solidFill>
@@ -6385,7 +6541,7 @@
           <a:sym typeface="Arial"/>
         </a:defRPr>
       </a:lvl6pPr>
-      <a:lvl7pPr lvl="6" marR="0" rtl="0" algn="l">
+      <a:lvl7pPr marR="0" lvl="6" algn="l" rtl="0">
         <a:lnSpc>
           <a:spcPct val="100000"/>
         </a:lnSpc>
@@ -6399,7 +6555,7 @@
           <a:srgbClr val="000000"/>
         </a:buClr>
         <a:buFont typeface="Arial"/>
-        <a:defRPr b="0" i="0" sz="1400" u="none" cap="none" strike="noStrike">
+        <a:defRPr sz="1400" b="0" i="0" u="none" strike="noStrike" cap="none">
           <a:solidFill>
             <a:srgbClr val="000000"/>
           </a:solidFill>
@@ -6409,7 +6565,7 @@
           <a:sym typeface="Arial"/>
         </a:defRPr>
       </a:lvl7pPr>
-      <a:lvl8pPr lvl="7" marR="0" rtl="0" algn="l">
+      <a:lvl8pPr marR="0" lvl="7" algn="l" rtl="0">
         <a:lnSpc>
           <a:spcPct val="100000"/>
         </a:lnSpc>
@@ -6423,7 +6579,7 @@
           <a:srgbClr val="000000"/>
         </a:buClr>
         <a:buFont typeface="Arial"/>
-        <a:defRPr b="0" i="0" sz="1400" u="none" cap="none" strike="noStrike">
+        <a:defRPr sz="1400" b="0" i="0" u="none" strike="noStrike" cap="none">
           <a:solidFill>
             <a:srgbClr val="000000"/>
           </a:solidFill>
@@ -6433,7 +6589,7 @@
           <a:sym typeface="Arial"/>
         </a:defRPr>
       </a:lvl8pPr>
-      <a:lvl9pPr lvl="8" marR="0" rtl="0" algn="l">
+      <a:lvl9pPr marR="0" lvl="8" algn="l" rtl="0">
         <a:lnSpc>
           <a:spcPct val="100000"/>
         </a:lnSpc>
@@ -6447,7 +6603,7 @@
           <a:srgbClr val="000000"/>
         </a:buClr>
         <a:buFont typeface="Arial"/>
-        <a:defRPr b="0" i="0" sz="1400" u="none" cap="none" strike="noStrike">
+        <a:defRPr sz="1400" b="0" i="0" u="none" strike="noStrike" cap="none">
           <a:solidFill>
             <a:srgbClr val="000000"/>
           </a:solidFill>
@@ -6459,7 +6615,7 @@
       </a:lvl9pPr>
     </p:bodyStyle>
     <p:otherStyle>
-      <a:defPPr lvl="0" marR="0" rtl="0" algn="l">
+      <a:defPPr marR="0" lvl="0" algn="l" rtl="0">
         <a:lnSpc>
           <a:spcPct val="100000"/>
         </a:lnSpc>
@@ -6470,7 +6626,7 @@
           <a:spcPts val="0"/>
         </a:spcAft>
       </a:defPPr>
-      <a:lvl1pPr lvl="0" marR="0" rtl="0" algn="l">
+      <a:lvl1pPr marR="0" lvl="0" algn="l" rtl="0">
         <a:lnSpc>
           <a:spcPct val="100000"/>
         </a:lnSpc>
@@ -6484,7 +6640,7 @@
           <a:srgbClr val="000000"/>
         </a:buClr>
         <a:buFont typeface="Arial"/>
-        <a:defRPr b="0" i="0" sz="1400" u="none" cap="none" strike="noStrike">
+        <a:defRPr sz="1400" b="0" i="0" u="none" strike="noStrike" cap="none">
           <a:solidFill>
             <a:srgbClr val="000000"/>
           </a:solidFill>
@@ -6494,7 +6650,7 @@
           <a:sym typeface="Arial"/>
         </a:defRPr>
       </a:lvl1pPr>
-      <a:lvl2pPr lvl="1" marR="0" rtl="0" algn="l">
+      <a:lvl2pPr marR="0" lvl="1" algn="l" rtl="0">
         <a:lnSpc>
           <a:spcPct val="100000"/>
         </a:lnSpc>
@@ -6508,7 +6664,7 @@
           <a:srgbClr val="000000"/>
         </a:buClr>
         <a:buFont typeface="Arial"/>
-        <a:defRPr b="0" i="0" sz="1400" u="none" cap="none" strike="noStrike">
+        <a:defRPr sz="1400" b="0" i="0" u="none" strike="noStrike" cap="none">
           <a:solidFill>
             <a:srgbClr val="000000"/>
           </a:solidFill>
@@ -6518,7 +6674,7 @@
           <a:sym typeface="Arial"/>
         </a:defRPr>
       </a:lvl2pPr>
-      <a:lvl3pPr lvl="2" marR="0" rtl="0" algn="l">
+      <a:lvl3pPr marR="0" lvl="2" algn="l" rtl="0">
         <a:lnSpc>
           <a:spcPct val="100000"/>
         </a:lnSpc>
@@ -6532,7 +6688,7 @@
           <a:srgbClr val="000000"/>
         </a:buClr>
         <a:buFont typeface="Arial"/>
-        <a:defRPr b="0" i="0" sz="1400" u="none" cap="none" strike="noStrike">
+        <a:defRPr sz="1400" b="0" i="0" u="none" strike="noStrike" cap="none">
           <a:solidFill>
             <a:srgbClr val="000000"/>
           </a:solidFill>
@@ -6542,7 +6698,7 @@
           <a:sym typeface="Arial"/>
         </a:defRPr>
       </a:lvl3pPr>
-      <a:lvl4pPr lvl="3" marR="0" rtl="0" algn="l">
+      <a:lvl4pPr marR="0" lvl="3" algn="l" rtl="0">
         <a:lnSpc>
           <a:spcPct val="100000"/>
         </a:lnSpc>
@@ -6556,7 +6712,7 @@
           <a:srgbClr val="000000"/>
         </a:buClr>
         <a:buFont typeface="Arial"/>
-        <a:defRPr b="0" i="0" sz="1400" u="none" cap="none" strike="noStrike">
+        <a:defRPr sz="1400" b="0" i="0" u="none" strike="noStrike" cap="none">
           <a:solidFill>
             <a:srgbClr val="000000"/>
           </a:solidFill>
@@ -6566,7 +6722,7 @@
           <a:sym typeface="Arial"/>
         </a:defRPr>
       </a:lvl4pPr>
-      <a:lvl5pPr lvl="4" marR="0" rtl="0" algn="l">
+      <a:lvl5pPr marR="0" lvl="4" algn="l" rtl="0">
         <a:lnSpc>
           <a:spcPct val="100000"/>
         </a:lnSpc>
@@ -6580,7 +6736,7 @@
           <a:srgbClr val="000000"/>
         </a:buClr>
         <a:buFont typeface="Arial"/>
-        <a:defRPr b="0" i="0" sz="1400" u="none" cap="none" strike="noStrike">
+        <a:defRPr sz="1400" b="0" i="0" u="none" strike="noStrike" cap="none">
           <a:solidFill>
             <a:srgbClr val="000000"/>
           </a:solidFill>
@@ -6590,7 +6746,7 @@
           <a:sym typeface="Arial"/>
         </a:defRPr>
       </a:lvl5pPr>
-      <a:lvl6pPr lvl="5" marR="0" rtl="0" algn="l">
+      <a:lvl6pPr marR="0" lvl="5" algn="l" rtl="0">
         <a:lnSpc>
           <a:spcPct val="100000"/>
         </a:lnSpc>
@@ -6604,7 +6760,7 @@
           <a:srgbClr val="000000"/>
         </a:buClr>
         <a:buFont typeface="Arial"/>
-        <a:defRPr b="0" i="0" sz="1400" u="none" cap="none" strike="noStrike">
+        <a:defRPr sz="1400" b="0" i="0" u="none" strike="noStrike" cap="none">
           <a:solidFill>
             <a:srgbClr val="000000"/>
           </a:solidFill>
@@ -6614,7 +6770,7 @@
           <a:sym typeface="Arial"/>
         </a:defRPr>
       </a:lvl6pPr>
-      <a:lvl7pPr lvl="6" marR="0" rtl="0" algn="l">
+      <a:lvl7pPr marR="0" lvl="6" algn="l" rtl="0">
         <a:lnSpc>
           <a:spcPct val="100000"/>
         </a:lnSpc>
@@ -6628,7 +6784,7 @@
           <a:srgbClr val="000000"/>
         </a:buClr>
         <a:buFont typeface="Arial"/>
-        <a:defRPr b="0" i="0" sz="1400" u="none" cap="none" strike="noStrike">
+        <a:defRPr sz="1400" b="0" i="0" u="none" strike="noStrike" cap="none">
           <a:solidFill>
             <a:srgbClr val="000000"/>
           </a:solidFill>
@@ -6638,7 +6794,7 @@
           <a:sym typeface="Arial"/>
         </a:defRPr>
       </a:lvl7pPr>
-      <a:lvl8pPr lvl="7" marR="0" rtl="0" algn="l">
+      <a:lvl8pPr marR="0" lvl="7" algn="l" rtl="0">
         <a:lnSpc>
           <a:spcPct val="100000"/>
         </a:lnSpc>
@@ -6652,7 +6808,7 @@
           <a:srgbClr val="000000"/>
         </a:buClr>
         <a:buFont typeface="Arial"/>
-        <a:defRPr b="0" i="0" sz="1400" u="none" cap="none" strike="noStrike">
+        <a:defRPr sz="1400" b="0" i="0" u="none" strike="noStrike" cap="none">
           <a:solidFill>
             <a:srgbClr val="000000"/>
           </a:solidFill>
@@ -6662,7 +6818,7 @@
           <a:sym typeface="Arial"/>
         </a:defRPr>
       </a:lvl8pPr>
-      <a:lvl9pPr lvl="8" marR="0" rtl="0" algn="l">
+      <a:lvl9pPr marR="0" lvl="8" algn="l" rtl="0">
         <a:lnSpc>
           <a:spcPct val="100000"/>
         </a:lnSpc>
@@ -6676,7 +6832,7 @@
           <a:srgbClr val="000000"/>
         </a:buClr>
         <a:buFont typeface="Arial"/>
-        <a:defRPr b="0" i="0" sz="1400" u="none" cap="none" strike="noStrike">
+        <a:defRPr sz="1400" b="0" i="0" u="none" strike="noStrike" cap="none">
           <a:solidFill>
             <a:srgbClr val="000000"/>
           </a:solidFill>
@@ -6692,11 +6848,11 @@
 </file>
 
 <file path=ppt/slides/slide1.xml><?xml version="1.0" encoding="utf-8"?>
-<p:sld xmlns:a="http://schemas.openxmlformats.org/drawingml/2006/main" xmlns:r="http://schemas.openxmlformats.org/officeDocument/2006/relationships" xmlns:mc="http://schemas.openxmlformats.org/markup-compatibility/2006" xmlns:mv="urn:schemas-microsoft-com:mac:vml" xmlns:p="http://schemas.openxmlformats.org/presentationml/2006/main" xmlns:c="http://schemas.openxmlformats.org/drawingml/2006/chart" xmlns:dgm="http://schemas.openxmlformats.org/drawingml/2006/diagram" xmlns:o="urn:schemas-microsoft-com:office:office" xmlns:v="urn:schemas-microsoft-com:vml" xmlns:pvml="urn:schemas-microsoft-com:office:powerpoint" xmlns:com="http://schemas.openxmlformats.org/drawingml/2006/compatibility" xmlns:p14="http://schemas.microsoft.com/office/powerpoint/2010/main" xmlns:p15="http://schemas.microsoft.com/office/powerpoint/2012/main">
+<p:sld xmlns:a="http://schemas.openxmlformats.org/drawingml/2006/main" xmlns:r="http://schemas.openxmlformats.org/officeDocument/2006/relationships" xmlns:p="http://schemas.openxmlformats.org/presentationml/2006/main">
   <p:cSld>
     <p:spTree>
       <p:nvGrpSpPr>
-        <p:cNvPr id="62" name="Shape 62"/>
+        <p:cNvPr id="1" name="Shape 62"/>
         <p:cNvGrpSpPr/>
         <p:nvPr/>
       </p:nvGrpSpPr>
@@ -6711,7 +6867,9 @@
       <p:sp>
         <p:nvSpPr>
           <p:cNvPr id="63" name="Google Shape;63;p13"/>
-          <p:cNvSpPr txBox="1"/>
+          <p:cNvSpPr txBox="1">
+            <a:spLocks noGrp="1"/>
+          </p:cNvSpPr>
           <p:nvPr>
             <p:ph type="ctrTitle"/>
           </p:nvPr>
@@ -6726,12 +6884,12 @@
           </a:prstGeom>
         </p:spPr>
         <p:txBody>
-          <a:bodyPr anchorCtr="0" anchor="b" bIns="91425" lIns="91425" spcFirstLastPara="1" rIns="91425" wrap="square" tIns="91425">
+          <a:bodyPr spcFirstLastPara="1" wrap="square" lIns="91425" tIns="91425" rIns="91425" bIns="91425" anchor="b" anchorCtr="0">
             <a:noAutofit/>
           </a:bodyPr>
           <a:lstStyle/>
           <a:p>
-            <a:pPr indent="0" lvl="0" marL="0" rtl="0" algn="ctr">
+            <a:pPr marL="0" lvl="0" indent="0" algn="ctr" rtl="0">
               <a:spcBef>
                 <a:spcPts val="0"/>
               </a:spcBef>
@@ -6751,9 +6909,11 @@
       <p:sp>
         <p:nvSpPr>
           <p:cNvPr id="64" name="Google Shape;64;p13"/>
-          <p:cNvSpPr txBox="1"/>
+          <p:cNvSpPr txBox="1">
+            <a:spLocks noGrp="1"/>
+          </p:cNvSpPr>
           <p:nvPr>
-            <p:ph idx="1" type="subTitle"/>
+            <p:ph type="subTitle" idx="1"/>
           </p:nvPr>
         </p:nvSpPr>
         <p:spPr>
@@ -6766,12 +6926,12 @@
           </a:prstGeom>
         </p:spPr>
         <p:txBody>
-          <a:bodyPr anchorCtr="0" anchor="t" bIns="91425" lIns="91425" spcFirstLastPara="1" rIns="91425" wrap="square" tIns="91425">
+          <a:bodyPr spcFirstLastPara="1" wrap="square" lIns="91425" tIns="91425" rIns="91425" bIns="91425" anchor="t" anchorCtr="0">
             <a:noAutofit/>
           </a:bodyPr>
           <a:lstStyle/>
           <a:p>
-            <a:pPr indent="0" lvl="0" marL="0" rtl="0" algn="ctr">
+            <a:pPr marL="0" lvl="0" indent="0" algn="ctr" rtl="0">
               <a:spcBef>
                 <a:spcPts val="0"/>
               </a:spcBef>
@@ -6808,12 +6968,12 @@
           </a:ln>
         </p:spPr>
         <p:txBody>
-          <a:bodyPr anchorCtr="0" anchor="t" bIns="91425" lIns="91425" spcFirstLastPara="1" rIns="91425" wrap="square" tIns="91425">
+          <a:bodyPr spcFirstLastPara="1" wrap="square" lIns="91425" tIns="91425" rIns="91425" bIns="91425" anchor="t" anchorCtr="0">
             <a:noAutofit/>
           </a:bodyPr>
           <a:lstStyle/>
           <a:p>
-            <a:pPr indent="0" lvl="0" marL="0" rtl="0" algn="r">
+            <a:pPr marL="0" lvl="0" indent="0" algn="r" rtl="0">
               <a:spcBef>
                 <a:spcPts val="0"/>
               </a:spcBef>
@@ -6855,11 +7015,11 @@
 </file>
 
 <file path=ppt/slides/slide2.xml><?xml version="1.0" encoding="utf-8"?>
-<p:sld xmlns:a="http://schemas.openxmlformats.org/drawingml/2006/main" xmlns:r="http://schemas.openxmlformats.org/officeDocument/2006/relationships" xmlns:mc="http://schemas.openxmlformats.org/markup-compatibility/2006" xmlns:mv="urn:schemas-microsoft-com:mac:vml" xmlns:p="http://schemas.openxmlformats.org/presentationml/2006/main" xmlns:c="http://schemas.openxmlformats.org/drawingml/2006/chart" xmlns:dgm="http://schemas.openxmlformats.org/drawingml/2006/diagram" xmlns:o="urn:schemas-microsoft-com:office:office" xmlns:v="urn:schemas-microsoft-com:vml" xmlns:pvml="urn:schemas-microsoft-com:office:powerpoint" xmlns:com="http://schemas.openxmlformats.org/drawingml/2006/compatibility" xmlns:p14="http://schemas.microsoft.com/office/powerpoint/2010/main" xmlns:p15="http://schemas.microsoft.com/office/powerpoint/2012/main">
+<p:sld xmlns:a="http://schemas.openxmlformats.org/drawingml/2006/main" xmlns:r="http://schemas.openxmlformats.org/officeDocument/2006/relationships" xmlns:p="http://schemas.openxmlformats.org/presentationml/2006/main">
   <p:cSld>
     <p:spTree>
       <p:nvGrpSpPr>
-        <p:cNvPr id="69" name="Shape 69"/>
+        <p:cNvPr id="1" name="Shape 69"/>
         <p:cNvGrpSpPr/>
         <p:nvPr/>
       </p:nvGrpSpPr>
@@ -6874,7 +7034,9 @@
       <p:sp>
         <p:nvSpPr>
           <p:cNvPr id="70" name="Google Shape;70;p14"/>
-          <p:cNvSpPr txBox="1"/>
+          <p:cNvSpPr txBox="1">
+            <a:spLocks noGrp="1"/>
+          </p:cNvSpPr>
           <p:nvPr>
             <p:ph type="title"/>
           </p:nvPr>
@@ -6889,12 +7051,12 @@
           </a:prstGeom>
         </p:spPr>
         <p:txBody>
-          <a:bodyPr anchorCtr="0" anchor="b" bIns="91425" lIns="91425" spcFirstLastPara="1" rIns="91425" wrap="square" tIns="91425">
+          <a:bodyPr spcFirstLastPara="1" wrap="square" lIns="91425" tIns="91425" rIns="91425" bIns="91425" anchor="b" anchorCtr="0">
             <a:noAutofit/>
           </a:bodyPr>
           <a:lstStyle/>
           <a:p>
-            <a:pPr indent="0" lvl="0" marL="0" rtl="0" algn="l">
+            <a:pPr marL="0" lvl="0" indent="0" algn="l" rtl="0">
               <a:spcBef>
                 <a:spcPts val="0"/>
               </a:spcBef>
@@ -6914,9 +7076,11 @@
       <p:sp>
         <p:nvSpPr>
           <p:cNvPr id="71" name="Google Shape;71;p14"/>
-          <p:cNvSpPr txBox="1"/>
+          <p:cNvSpPr txBox="1">
+            <a:spLocks noGrp="1"/>
+          </p:cNvSpPr>
           <p:nvPr>
-            <p:ph idx="1" type="body"/>
+            <p:ph type="body" idx="1"/>
           </p:nvPr>
         </p:nvSpPr>
         <p:spPr>
@@ -6929,12 +7093,12 @@
           </a:prstGeom>
         </p:spPr>
         <p:txBody>
-          <a:bodyPr anchorCtr="0" anchor="t" bIns="91425" lIns="91425" spcFirstLastPara="1" rIns="91425" wrap="square" tIns="91425">
+          <a:bodyPr spcFirstLastPara="1" wrap="square" lIns="91425" tIns="91425" rIns="91425" bIns="91425" anchor="t" anchorCtr="0">
             <a:noAutofit/>
           </a:bodyPr>
           <a:lstStyle/>
           <a:p>
-            <a:pPr indent="0" lvl="0" marL="0" rtl="0" algn="l">
+            <a:pPr marL="0" lvl="0" indent="0" algn="l" rtl="0">
               <a:spcBef>
                 <a:spcPts val="0"/>
               </a:spcBef>
@@ -6950,7 +7114,7 @@
             <a:endParaRPr/>
           </a:p>
           <a:p>
-            <a:pPr indent="0" lvl="0" marL="0" rtl="0" algn="l">
+            <a:pPr marL="0" lvl="0" indent="0" algn="l" rtl="0">
               <a:spcBef>
                 <a:spcPts val="1600"/>
               </a:spcBef>
@@ -6976,11 +7140,11 @@
 </file>
 
 <file path=ppt/slides/slide3.xml><?xml version="1.0" encoding="utf-8"?>
-<p:sld xmlns:a="http://schemas.openxmlformats.org/drawingml/2006/main" xmlns:r="http://schemas.openxmlformats.org/officeDocument/2006/relationships" xmlns:mc="http://schemas.openxmlformats.org/markup-compatibility/2006" xmlns:mv="urn:schemas-microsoft-com:mac:vml" xmlns:p="http://schemas.openxmlformats.org/presentationml/2006/main" xmlns:c="http://schemas.openxmlformats.org/drawingml/2006/chart" xmlns:dgm="http://schemas.openxmlformats.org/drawingml/2006/diagram" xmlns:o="urn:schemas-microsoft-com:office:office" xmlns:v="urn:schemas-microsoft-com:vml" xmlns:pvml="urn:schemas-microsoft-com:office:powerpoint" xmlns:com="http://schemas.openxmlformats.org/drawingml/2006/compatibility" xmlns:p14="http://schemas.microsoft.com/office/powerpoint/2010/main" xmlns:p15="http://schemas.microsoft.com/office/powerpoint/2012/main">
+<p:sld xmlns:a="http://schemas.openxmlformats.org/drawingml/2006/main" xmlns:r="http://schemas.openxmlformats.org/officeDocument/2006/relationships" xmlns:p="http://schemas.openxmlformats.org/presentationml/2006/main">
   <p:cSld>
     <p:spTree>
       <p:nvGrpSpPr>
-        <p:cNvPr id="75" name="Shape 75"/>
+        <p:cNvPr id="1" name="Shape 75"/>
         <p:cNvGrpSpPr/>
         <p:nvPr/>
       </p:nvGrpSpPr>
@@ -6995,7 +7159,9 @@
       <p:sp>
         <p:nvSpPr>
           <p:cNvPr id="76" name="Google Shape;76;p15"/>
-          <p:cNvSpPr txBox="1"/>
+          <p:cNvSpPr txBox="1">
+            <a:spLocks noGrp="1"/>
+          </p:cNvSpPr>
           <p:nvPr>
             <p:ph type="title"/>
           </p:nvPr>
@@ -7010,12 +7176,12 @@
           </a:prstGeom>
         </p:spPr>
         <p:txBody>
-          <a:bodyPr anchorCtr="0" anchor="b" bIns="91425" lIns="91425" spcFirstLastPara="1" rIns="91425" wrap="square" tIns="91425">
+          <a:bodyPr spcFirstLastPara="1" wrap="square" lIns="91425" tIns="91425" rIns="91425" bIns="91425" anchor="b" anchorCtr="0">
             <a:noAutofit/>
           </a:bodyPr>
           <a:lstStyle/>
           <a:p>
-            <a:pPr indent="0" lvl="0" marL="0" rtl="0" algn="l">
+            <a:pPr marL="0" lvl="0" indent="0" algn="l" rtl="0">
               <a:spcBef>
                 <a:spcPts val="0"/>
               </a:spcBef>
@@ -7035,9 +7201,11 @@
       <p:sp>
         <p:nvSpPr>
           <p:cNvPr id="77" name="Google Shape;77;p15"/>
-          <p:cNvSpPr txBox="1"/>
+          <p:cNvSpPr txBox="1">
+            <a:spLocks noGrp="1"/>
+          </p:cNvSpPr>
           <p:nvPr>
-            <p:ph idx="1" type="body"/>
+            <p:ph type="body" idx="1"/>
           </p:nvPr>
         </p:nvSpPr>
         <p:spPr>
@@ -7050,12 +7218,12 @@
           </a:prstGeom>
         </p:spPr>
         <p:txBody>
-          <a:bodyPr anchorCtr="0" anchor="t" bIns="91425" lIns="91425" spcFirstLastPara="1" rIns="91425" wrap="square" tIns="91425">
+          <a:bodyPr spcFirstLastPara="1" wrap="square" lIns="91425" tIns="91425" rIns="91425" bIns="91425" anchor="t" anchorCtr="0">
             <a:noAutofit/>
           </a:bodyPr>
           <a:lstStyle/>
           <a:p>
-            <a:pPr indent="0" lvl="0" marL="0" rtl="0" algn="l">
+            <a:pPr marL="0" lvl="0" indent="0" algn="l" rtl="0">
               <a:spcBef>
                 <a:spcPts val="0"/>
               </a:spcBef>
@@ -7071,7 +7239,7 @@
             <a:endParaRPr/>
           </a:p>
           <a:p>
-            <a:pPr indent="0" lvl="0" marL="0" rtl="0" algn="l">
+            <a:pPr marL="0" lvl="0" indent="0" algn="l" rtl="0">
               <a:spcBef>
                 <a:spcPts val="1600"/>
               </a:spcBef>
@@ -7080,13 +7248,10 @@
               </a:spcAft>
               <a:buNone/>
             </a:pPr>
-            <a:r>
-              <a:t/>
-            </a:r>
             <a:endParaRPr/>
           </a:p>
           <a:p>
-            <a:pPr indent="0" lvl="0" marL="0" rtl="0" algn="l">
+            <a:pPr marL="0" lvl="0" indent="0" algn="l" rtl="0">
               <a:spcBef>
                 <a:spcPts val="1600"/>
               </a:spcBef>
@@ -7112,11 +7277,11 @@
 </file>
 
 <file path=ppt/slides/slide4.xml><?xml version="1.0" encoding="utf-8"?>
-<p:sld xmlns:a="http://schemas.openxmlformats.org/drawingml/2006/main" xmlns:r="http://schemas.openxmlformats.org/officeDocument/2006/relationships" xmlns:mc="http://schemas.openxmlformats.org/markup-compatibility/2006" xmlns:mv="urn:schemas-microsoft-com:mac:vml" xmlns:p="http://schemas.openxmlformats.org/presentationml/2006/main" xmlns:c="http://schemas.openxmlformats.org/drawingml/2006/chart" xmlns:dgm="http://schemas.openxmlformats.org/drawingml/2006/diagram" xmlns:o="urn:schemas-microsoft-com:office:office" xmlns:v="urn:schemas-microsoft-com:vml" xmlns:pvml="urn:schemas-microsoft-com:office:powerpoint" xmlns:com="http://schemas.openxmlformats.org/drawingml/2006/compatibility" xmlns:p14="http://schemas.microsoft.com/office/powerpoint/2010/main" xmlns:p15="http://schemas.microsoft.com/office/powerpoint/2012/main">
+<p:sld xmlns:a="http://schemas.openxmlformats.org/drawingml/2006/main" xmlns:r="http://schemas.openxmlformats.org/officeDocument/2006/relationships" xmlns:p="http://schemas.openxmlformats.org/presentationml/2006/main">
   <p:cSld>
     <p:spTree>
       <p:nvGrpSpPr>
-        <p:cNvPr id="81" name="Shape 81"/>
+        <p:cNvPr id="1" name="Shape 81"/>
         <p:cNvGrpSpPr/>
         <p:nvPr/>
       </p:nvGrpSpPr>
@@ -7131,7 +7296,9 @@
       <p:sp>
         <p:nvSpPr>
           <p:cNvPr id="82" name="Google Shape;82;p16"/>
-          <p:cNvSpPr txBox="1"/>
+          <p:cNvSpPr txBox="1">
+            <a:spLocks noGrp="1"/>
+          </p:cNvSpPr>
           <p:nvPr>
             <p:ph type="title"/>
           </p:nvPr>
@@ -7146,12 +7313,12 @@
           </a:prstGeom>
         </p:spPr>
         <p:txBody>
-          <a:bodyPr anchorCtr="0" anchor="b" bIns="91425" lIns="91425" spcFirstLastPara="1" rIns="91425" wrap="square" tIns="91425">
+          <a:bodyPr spcFirstLastPara="1" wrap="square" lIns="91425" tIns="91425" rIns="91425" bIns="91425" anchor="b" anchorCtr="0">
             <a:noAutofit/>
           </a:bodyPr>
           <a:lstStyle/>
           <a:p>
-            <a:pPr indent="0" lvl="0" marL="0" rtl="0" algn="l">
+            <a:pPr marL="0" lvl="0" indent="0" algn="l" rtl="0">
               <a:spcBef>
                 <a:spcPts val="0"/>
               </a:spcBef>
@@ -7171,9 +7338,11 @@
       <p:sp>
         <p:nvSpPr>
           <p:cNvPr id="83" name="Google Shape;83;p16"/>
-          <p:cNvSpPr txBox="1"/>
+          <p:cNvSpPr txBox="1">
+            <a:spLocks noGrp="1"/>
+          </p:cNvSpPr>
           <p:nvPr>
-            <p:ph idx="1" type="body"/>
+            <p:ph type="body" idx="1"/>
           </p:nvPr>
         </p:nvSpPr>
         <p:spPr>
@@ -7186,12 +7355,12 @@
           </a:prstGeom>
         </p:spPr>
         <p:txBody>
-          <a:bodyPr anchorCtr="0" anchor="t" bIns="91425" lIns="91425" spcFirstLastPara="1" rIns="91425" wrap="square" tIns="91425">
+          <a:bodyPr spcFirstLastPara="1" wrap="square" lIns="91425" tIns="91425" rIns="91425" bIns="91425" anchor="t" anchorCtr="0">
             <a:noAutofit/>
           </a:bodyPr>
           <a:lstStyle/>
           <a:p>
-            <a:pPr indent="0" lvl="0" marL="0" rtl="0" algn="l">
+            <a:pPr marL="0" lvl="0" indent="0" algn="l" rtl="0">
               <a:spcBef>
                 <a:spcPts val="0"/>
               </a:spcBef>
@@ -7207,7 +7376,7 @@
             <a:endParaRPr/>
           </a:p>
           <a:p>
-            <a:pPr indent="-342900" lvl="0" marL="457200" rtl="0" algn="l">
+            <a:pPr marL="457200" lvl="0" indent="-342900" algn="l" rtl="0">
               <a:spcBef>
                 <a:spcPts val="1600"/>
               </a:spcBef>
@@ -7224,7 +7393,7 @@
             <a:endParaRPr/>
           </a:p>
           <a:p>
-            <a:pPr indent="-342900" lvl="0" marL="457200" rtl="0" algn="l">
+            <a:pPr marL="457200" lvl="0" indent="-342900" algn="l" rtl="0">
               <a:spcBef>
                 <a:spcPts val="0"/>
               </a:spcBef>
@@ -7251,11 +7420,11 @@
 </file>
 
 <file path=ppt/slides/slide5.xml><?xml version="1.0" encoding="utf-8"?>
-<p:sld xmlns:a="http://schemas.openxmlformats.org/drawingml/2006/main" xmlns:r="http://schemas.openxmlformats.org/officeDocument/2006/relationships" xmlns:mc="http://schemas.openxmlformats.org/markup-compatibility/2006" xmlns:mv="urn:schemas-microsoft-com:mac:vml" xmlns:p="http://schemas.openxmlformats.org/presentationml/2006/main" xmlns:c="http://schemas.openxmlformats.org/drawingml/2006/chart" xmlns:dgm="http://schemas.openxmlformats.org/drawingml/2006/diagram" xmlns:o="urn:schemas-microsoft-com:office:office" xmlns:v="urn:schemas-microsoft-com:vml" xmlns:pvml="urn:schemas-microsoft-com:office:powerpoint" xmlns:com="http://schemas.openxmlformats.org/drawingml/2006/compatibility" xmlns:p14="http://schemas.microsoft.com/office/powerpoint/2010/main" xmlns:p15="http://schemas.microsoft.com/office/powerpoint/2012/main">
+<p:sld xmlns:a="http://schemas.openxmlformats.org/drawingml/2006/main" xmlns:r="http://schemas.openxmlformats.org/officeDocument/2006/relationships" xmlns:p="http://schemas.openxmlformats.org/presentationml/2006/main">
   <p:cSld>
     <p:spTree>
       <p:nvGrpSpPr>
-        <p:cNvPr id="87" name="Shape 87"/>
+        <p:cNvPr id="1" name="Shape 87"/>
         <p:cNvGrpSpPr/>
         <p:nvPr/>
       </p:nvGrpSpPr>
@@ -7270,7 +7439,9 @@
       <p:sp>
         <p:nvSpPr>
           <p:cNvPr id="88" name="Google Shape;88;p17"/>
-          <p:cNvSpPr txBox="1"/>
+          <p:cNvSpPr txBox="1">
+            <a:spLocks noGrp="1"/>
+          </p:cNvSpPr>
           <p:nvPr>
             <p:ph type="title"/>
           </p:nvPr>
@@ -7285,12 +7456,12 @@
           </a:prstGeom>
         </p:spPr>
         <p:txBody>
-          <a:bodyPr anchorCtr="0" anchor="b" bIns="91425" lIns="91425" spcFirstLastPara="1" rIns="91425" wrap="square" tIns="91425">
+          <a:bodyPr spcFirstLastPara="1" wrap="square" lIns="91425" tIns="91425" rIns="91425" bIns="91425" anchor="b" anchorCtr="0">
             <a:noAutofit/>
           </a:bodyPr>
           <a:lstStyle/>
           <a:p>
-            <a:pPr indent="0" lvl="0" marL="0" rtl="0" algn="l">
+            <a:pPr marL="0" lvl="0" indent="0" algn="l" rtl="0">
               <a:spcBef>
                 <a:spcPts val="0"/>
               </a:spcBef>
@@ -7327,12 +7498,12 @@
           </a:ln>
         </p:spPr>
         <p:txBody>
-          <a:bodyPr anchorCtr="0" anchor="t" bIns="91425" lIns="91425" spcFirstLastPara="1" rIns="91425" wrap="square" tIns="91425">
+          <a:bodyPr spcFirstLastPara="1" wrap="square" lIns="91425" tIns="91425" rIns="91425" bIns="91425" anchor="t" anchorCtr="0">
             <a:noAutofit/>
           </a:bodyPr>
           <a:lstStyle/>
           <a:p>
-            <a:pPr indent="0" lvl="0" marL="0" rtl="0" algn="l">
+            <a:pPr marL="0" lvl="0" indent="0" algn="l" rtl="0">
               <a:spcBef>
                 <a:spcPts val="0"/>
               </a:spcBef>
@@ -7342,7 +7513,7 @@
               <a:buNone/>
             </a:pPr>
             <a:r>
-              <a:rPr b="1" lang="en">
+              <a:rPr lang="en" b="1">
                 <a:solidFill>
                   <a:srgbClr val="FFFFFF"/>
                 </a:solidFill>
@@ -7376,7 +7547,7 @@
             </a:endParaRPr>
           </a:p>
           <a:p>
-            <a:pPr indent="0" lvl="0" marL="0" rtl="0" algn="l">
+            <a:pPr marL="0" lvl="0" indent="0" algn="l" rtl="0">
               <a:spcBef>
                 <a:spcPts val="0"/>
               </a:spcBef>
@@ -7386,7 +7557,7 @@
               <a:buNone/>
             </a:pPr>
             <a:r>
-              <a:rPr b="1" lang="en">
+              <a:rPr lang="en" b="1">
                 <a:solidFill>
                   <a:srgbClr val="FFFFFF"/>
                 </a:solidFill>
@@ -7420,7 +7591,7 @@
             </a:endParaRPr>
           </a:p>
           <a:p>
-            <a:pPr indent="0" lvl="0" marL="0" rtl="0" algn="l">
+            <a:pPr marL="0" lvl="0" indent="0" algn="l" rtl="0">
               <a:spcBef>
                 <a:spcPts val="0"/>
               </a:spcBef>
@@ -7430,7 +7601,7 @@
               <a:buNone/>
             </a:pPr>
             <a:r>
-              <a:rPr b="1" lang="en">
+              <a:rPr lang="en" b="1">
                 <a:solidFill>
                   <a:srgbClr val="FFFFFF"/>
                 </a:solidFill>
@@ -7464,7 +7635,7 @@
             </a:endParaRPr>
           </a:p>
           <a:p>
-            <a:pPr indent="0" lvl="0" marL="0" rtl="0" algn="l">
+            <a:pPr marL="0" lvl="0" indent="0" algn="l" rtl="0">
               <a:spcBef>
                 <a:spcPts val="0"/>
               </a:spcBef>
@@ -7474,7 +7645,7 @@
               <a:buNone/>
             </a:pPr>
             <a:r>
-              <a:rPr b="1" lang="en">
+              <a:rPr lang="en" b="1">
                 <a:solidFill>
                   <a:srgbClr val="FFFFFF"/>
                 </a:solidFill>
@@ -7508,7 +7679,7 @@
             </a:endParaRPr>
           </a:p>
           <a:p>
-            <a:pPr indent="0" lvl="0" marL="0" rtl="0" algn="l">
+            <a:pPr marL="0" lvl="0" indent="0" algn="l" rtl="0">
               <a:spcBef>
                 <a:spcPts val="0"/>
               </a:spcBef>
@@ -7518,7 +7689,7 @@
               <a:buNone/>
             </a:pPr>
             <a:r>
-              <a:rPr b="1" lang="en">
+              <a:rPr lang="en" b="1">
                 <a:solidFill>
                   <a:srgbClr val="FFFFFF"/>
                 </a:solidFill>
@@ -7539,55 +7710,7 @@
                 <a:cs typeface="Roboto"/>
                 <a:sym typeface="Roboto"/>
               </a:rPr>
-              <a:t>: Kevin is a graduate of </a:t>
-            </a:r>
-            <a:r>
-              <a:rPr lang="en">
-                <a:solidFill>
-                  <a:srgbClr val="FFFFFF"/>
-                </a:solidFill>
-                <a:latin typeface="Roboto"/>
-                <a:ea typeface="Roboto"/>
-                <a:cs typeface="Roboto"/>
-                <a:sym typeface="Roboto"/>
-              </a:rPr>
-              <a:t>Georgetown</a:t>
-            </a:r>
-            <a:r>
-              <a:rPr lang="en">
-                <a:solidFill>
-                  <a:srgbClr val="FFFFFF"/>
-                </a:solidFill>
-                <a:latin typeface="Roboto"/>
-                <a:ea typeface="Roboto"/>
-                <a:cs typeface="Roboto"/>
-                <a:sym typeface="Roboto"/>
-              </a:rPr>
-              <a:t> University in Washington D.C, where he studied political science in his undergraduate degree. Since he was a kid he had always been interested in politics, and has worked his way to being a </a:t>
-            </a:r>
-            <a:r>
-              <a:rPr lang="en">
-                <a:solidFill>
-                  <a:srgbClr val="FFFFFF"/>
-                </a:solidFill>
-                <a:latin typeface="Roboto"/>
-                <a:ea typeface="Roboto"/>
-                <a:cs typeface="Roboto"/>
-                <a:sym typeface="Roboto"/>
-              </a:rPr>
-              <a:t>campaign</a:t>
-            </a:r>
-            <a:r>
-              <a:rPr lang="en">
-                <a:solidFill>
-                  <a:srgbClr val="FFFFFF"/>
-                </a:solidFill>
-                <a:latin typeface="Roboto"/>
-                <a:ea typeface="Roboto"/>
-                <a:cs typeface="Roboto"/>
-                <a:sym typeface="Roboto"/>
-              </a:rPr>
-              <a:t> manager .</a:t>
+              <a:t>: Kevin is a graduate of Georgetown University in Washington D.C, where he studied political science in his undergraduate degree. Since he was a kid he had always been interested in politics, and has worked his way to being a campaign manager .</a:t>
             </a:r>
             <a:endParaRPr>
               <a:solidFill>
@@ -7600,7 +7723,7 @@
             </a:endParaRPr>
           </a:p>
           <a:p>
-            <a:pPr indent="0" lvl="0" marL="0" rtl="0" algn="l">
+            <a:pPr marL="0" lvl="0" indent="0" algn="l" rtl="0">
               <a:spcBef>
                 <a:spcPts val="0"/>
               </a:spcBef>
@@ -7610,7 +7733,7 @@
               <a:buNone/>
             </a:pPr>
             <a:r>
-              <a:rPr b="1" lang="en">
+              <a:rPr lang="en" b="1">
                 <a:solidFill>
                   <a:srgbClr val="FFFFFF"/>
                 </a:solidFill>
@@ -7644,7 +7767,7 @@
             </a:endParaRPr>
           </a:p>
           <a:p>
-            <a:pPr indent="0" lvl="0" marL="0" rtl="0" algn="l">
+            <a:pPr marL="0" lvl="0" indent="0" algn="l" rtl="0">
               <a:spcBef>
                 <a:spcPts val="0"/>
               </a:spcBef>
@@ -7654,7 +7777,7 @@
               <a:buNone/>
             </a:pPr>
             <a:r>
-              <a:rPr b="1" lang="en">
+              <a:rPr lang="en" b="1">
                 <a:solidFill>
                   <a:srgbClr val="FFFFFF"/>
                 </a:solidFill>
@@ -7726,11 +7849,11 @@
 </file>
 
 <file path=ppt/slides/slide6.xml><?xml version="1.0" encoding="utf-8"?>
-<p:sld xmlns:a="http://schemas.openxmlformats.org/drawingml/2006/main" xmlns:r="http://schemas.openxmlformats.org/officeDocument/2006/relationships" xmlns:mc="http://schemas.openxmlformats.org/markup-compatibility/2006" xmlns:mv="urn:schemas-microsoft-com:mac:vml" xmlns:p="http://schemas.openxmlformats.org/presentationml/2006/main" xmlns:c="http://schemas.openxmlformats.org/drawingml/2006/chart" xmlns:dgm="http://schemas.openxmlformats.org/drawingml/2006/diagram" xmlns:o="urn:schemas-microsoft-com:office:office" xmlns:v="urn:schemas-microsoft-com:vml" xmlns:pvml="urn:schemas-microsoft-com:office:powerpoint" xmlns:com="http://schemas.openxmlformats.org/drawingml/2006/compatibility" xmlns:p14="http://schemas.microsoft.com/office/powerpoint/2010/main" xmlns:p15="http://schemas.microsoft.com/office/powerpoint/2012/main">
+<p:sld xmlns:a="http://schemas.openxmlformats.org/drawingml/2006/main" xmlns:r="http://schemas.openxmlformats.org/officeDocument/2006/relationships" xmlns:p="http://schemas.openxmlformats.org/presentationml/2006/main">
   <p:cSld>
     <p:spTree>
       <p:nvGrpSpPr>
-        <p:cNvPr id="94" name="Shape 94"/>
+        <p:cNvPr id="1" name="Shape 94"/>
         <p:cNvGrpSpPr/>
         <p:nvPr/>
       </p:nvGrpSpPr>
@@ -7745,7 +7868,9 @@
       <p:sp>
         <p:nvSpPr>
           <p:cNvPr id="95" name="Google Shape;95;p18"/>
-          <p:cNvSpPr txBox="1"/>
+          <p:cNvSpPr txBox="1">
+            <a:spLocks noGrp="1"/>
+          </p:cNvSpPr>
           <p:nvPr>
             <p:ph type="title"/>
           </p:nvPr>
@@ -7760,12 +7885,12 @@
           </a:prstGeom>
         </p:spPr>
         <p:txBody>
-          <a:bodyPr anchorCtr="0" anchor="b" bIns="91425" lIns="91425" spcFirstLastPara="1" rIns="91425" wrap="square" tIns="91425">
+          <a:bodyPr spcFirstLastPara="1" wrap="square" lIns="91425" tIns="91425" rIns="91425" bIns="91425" anchor="b" anchorCtr="0">
             <a:noAutofit/>
           </a:bodyPr>
           <a:lstStyle/>
           <a:p>
-            <a:pPr indent="0" lvl="0" marL="0" rtl="0" algn="l">
+            <a:pPr marL="0" lvl="0" indent="0" algn="l" rtl="0">
               <a:spcBef>
                 <a:spcPts val="0"/>
               </a:spcBef>
@@ -7802,12 +7927,12 @@
           </a:ln>
         </p:spPr>
         <p:txBody>
-          <a:bodyPr anchorCtr="0" anchor="t" bIns="91425" lIns="91425" spcFirstLastPara="1" rIns="91425" wrap="square" tIns="91425">
+          <a:bodyPr spcFirstLastPara="1" wrap="square" lIns="91425" tIns="91425" rIns="91425" bIns="91425" anchor="t" anchorCtr="0">
             <a:noAutofit/>
           </a:bodyPr>
           <a:lstStyle/>
           <a:p>
-            <a:pPr indent="0" lvl="0" marL="0" rtl="0" algn="l">
+            <a:pPr marL="0" lvl="0" indent="0" algn="l" rtl="0">
               <a:spcBef>
                 <a:spcPts val="0"/>
               </a:spcBef>
@@ -7817,7 +7942,7 @@
               <a:buNone/>
             </a:pPr>
             <a:r>
-              <a:rPr b="1" lang="en">
+              <a:rPr lang="en" b="1">
                 <a:solidFill>
                   <a:srgbClr val="FFFFFF"/>
                 </a:solidFill>
@@ -7851,7 +7976,7 @@
             </a:endParaRPr>
           </a:p>
           <a:p>
-            <a:pPr indent="0" lvl="0" marL="0" rtl="0" algn="l">
+            <a:pPr marL="0" lvl="0" indent="0" algn="l" rtl="0">
               <a:spcBef>
                 <a:spcPts val="0"/>
               </a:spcBef>
@@ -7861,7 +7986,7 @@
               <a:buNone/>
             </a:pPr>
             <a:r>
-              <a:rPr b="1" lang="en">
+              <a:rPr lang="en" b="1">
                 <a:solidFill>
                   <a:srgbClr val="FFFFFF"/>
                 </a:solidFill>
@@ -7895,7 +8020,7 @@
             </a:endParaRPr>
           </a:p>
           <a:p>
-            <a:pPr indent="0" lvl="0" marL="0" rtl="0" algn="l">
+            <a:pPr marL="0" lvl="0" indent="0" algn="l" rtl="0">
               <a:spcBef>
                 <a:spcPts val="0"/>
               </a:spcBef>
@@ -7905,7 +8030,7 @@
               <a:buNone/>
             </a:pPr>
             <a:r>
-              <a:rPr b="1" lang="en">
+              <a:rPr lang="en" b="1">
                 <a:solidFill>
                   <a:srgbClr val="FFFFFF"/>
                 </a:solidFill>
@@ -7939,7 +8064,7 @@
             </a:endParaRPr>
           </a:p>
           <a:p>
-            <a:pPr indent="0" lvl="0" marL="0" rtl="0" algn="l">
+            <a:pPr marL="0" lvl="0" indent="0" algn="l" rtl="0">
               <a:spcBef>
                 <a:spcPts val="0"/>
               </a:spcBef>
@@ -7949,7 +8074,7 @@
               <a:buNone/>
             </a:pPr>
             <a:r>
-              <a:rPr b="1" lang="en">
+              <a:rPr lang="en" b="1">
                 <a:solidFill>
                   <a:srgbClr val="FFFFFF"/>
                 </a:solidFill>
@@ -7983,7 +8108,7 @@
             </a:endParaRPr>
           </a:p>
           <a:p>
-            <a:pPr indent="0" lvl="0" marL="0" rtl="0" algn="l">
+            <a:pPr marL="0" lvl="0" indent="0" algn="l" rtl="0">
               <a:spcBef>
                 <a:spcPts val="0"/>
               </a:spcBef>
@@ -7993,7 +8118,7 @@
               <a:buNone/>
             </a:pPr>
             <a:r>
-              <a:rPr b="1" lang="en">
+              <a:rPr lang="en" b="1">
                 <a:solidFill>
                   <a:srgbClr val="FFFFFF"/>
                 </a:solidFill>
@@ -8014,31 +8139,7 @@
                 <a:cs typeface="Roboto"/>
                 <a:sym typeface="Roboto"/>
               </a:rPr>
-              <a:t>: Originally from Texas, Sarah recently moved to Seattle because she wants to help her </a:t>
-            </a:r>
-            <a:r>
-              <a:rPr lang="en">
-                <a:solidFill>
-                  <a:srgbClr val="FFFFFF"/>
-                </a:solidFill>
-                <a:latin typeface="Roboto"/>
-                <a:ea typeface="Roboto"/>
-                <a:cs typeface="Roboto"/>
-                <a:sym typeface="Roboto"/>
-              </a:rPr>
-              <a:t>best friend Jackie who is running for councilman win her campaign. She enjoys the atmosphere of seattle and wants to move after the campaign is over</a:t>
-            </a:r>
-            <a:r>
-              <a:rPr lang="en">
-                <a:solidFill>
-                  <a:srgbClr val="FFFFFF"/>
-                </a:solidFill>
-                <a:latin typeface="Roboto"/>
-                <a:ea typeface="Roboto"/>
-                <a:cs typeface="Roboto"/>
-                <a:sym typeface="Roboto"/>
-              </a:rPr>
-              <a:t>  </a:t>
+              <a:t>: Originally from Texas, Sarah recently moved to Seattle because she wants to help her best friend Jackie who is running for councilman win her campaign. She enjoys the atmosphere of seattle and wants to move after the campaign is over  </a:t>
             </a:r>
             <a:endParaRPr>
               <a:solidFill>
@@ -8051,7 +8152,7 @@
             </a:endParaRPr>
           </a:p>
           <a:p>
-            <a:pPr indent="0" lvl="0" marL="0" rtl="0" algn="l">
+            <a:pPr marL="0" lvl="0" indent="0" algn="l" rtl="0">
               <a:spcBef>
                 <a:spcPts val="0"/>
               </a:spcBef>
@@ -8061,7 +8162,7 @@
               <a:buNone/>
             </a:pPr>
             <a:r>
-              <a:rPr b="1" lang="en">
+              <a:rPr lang="en" b="1">
                 <a:solidFill>
                   <a:srgbClr val="FFFFFF"/>
                 </a:solidFill>
@@ -8082,31 +8183,7 @@
                 <a:cs typeface="Roboto"/>
                 <a:sym typeface="Roboto"/>
               </a:rPr>
-              <a:t>: As a novice to campaigning and campaign strategies, she seeks to always find new opportunities to optimize the time she spends doing </a:t>
-            </a:r>
-            <a:r>
-              <a:rPr lang="en">
-                <a:solidFill>
-                  <a:srgbClr val="FFFFFF"/>
-                </a:solidFill>
-                <a:latin typeface="Roboto"/>
-                <a:ea typeface="Roboto"/>
-                <a:cs typeface="Roboto"/>
-                <a:sym typeface="Roboto"/>
-              </a:rPr>
-              <a:t>campaign</a:t>
-            </a:r>
-            <a:r>
-              <a:rPr lang="en">
-                <a:solidFill>
-                  <a:srgbClr val="FFFFFF"/>
-                </a:solidFill>
-                <a:latin typeface="Roboto"/>
-                <a:ea typeface="Roboto"/>
-                <a:cs typeface="Roboto"/>
-                <a:sym typeface="Roboto"/>
-              </a:rPr>
-              <a:t> activities.She notices that when they have volunteers, she spends a lot of time planning out the turfs and places their volunteers are to go to and wants to find a more efficient way to optimize this process so she can spend her time completing other tasks </a:t>
+              <a:t>: As a novice to campaigning and campaign strategies, she seeks to always find new opportunities to optimize the time she spends doing campaign activities.She notices that when they have volunteers, she spends a lot of time planning out the turfs and places their volunteers are to go to and wants to find a more efficient way to optimize this process so she can spend her time completing other tasks </a:t>
             </a:r>
             <a:endParaRPr>
               <a:solidFill>
@@ -8119,7 +8196,7 @@
             </a:endParaRPr>
           </a:p>
           <a:p>
-            <a:pPr indent="0" lvl="0" marL="0" rtl="0" algn="l">
+            <a:pPr marL="0" lvl="0" indent="0" algn="l" rtl="0">
               <a:spcBef>
                 <a:spcPts val="0"/>
               </a:spcBef>
@@ -8129,7 +8206,7 @@
               <a:buNone/>
             </a:pPr>
             <a:r>
-              <a:rPr b="1" lang="en">
+              <a:rPr lang="en" b="1">
                 <a:solidFill>
                   <a:srgbClr val="FFFFFF"/>
                 </a:solidFill>
@@ -8201,11 +8278,11 @@
 </file>
 
 <file path=ppt/slides/slide7.xml><?xml version="1.0" encoding="utf-8"?>
-<p:sld xmlns:a="http://schemas.openxmlformats.org/drawingml/2006/main" xmlns:r="http://schemas.openxmlformats.org/officeDocument/2006/relationships" xmlns:mc="http://schemas.openxmlformats.org/markup-compatibility/2006" xmlns:mv="urn:schemas-microsoft-com:mac:vml" xmlns:p="http://schemas.openxmlformats.org/presentationml/2006/main" xmlns:c="http://schemas.openxmlformats.org/drawingml/2006/chart" xmlns:dgm="http://schemas.openxmlformats.org/drawingml/2006/diagram" xmlns:o="urn:schemas-microsoft-com:office:office" xmlns:v="urn:schemas-microsoft-com:vml" xmlns:pvml="urn:schemas-microsoft-com:office:powerpoint" xmlns:com="http://schemas.openxmlformats.org/drawingml/2006/compatibility" xmlns:p14="http://schemas.microsoft.com/office/powerpoint/2010/main" xmlns:p15="http://schemas.microsoft.com/office/powerpoint/2012/main">
+<p:sld xmlns:a="http://schemas.openxmlformats.org/drawingml/2006/main" xmlns:r="http://schemas.openxmlformats.org/officeDocument/2006/relationships" xmlns:p="http://schemas.openxmlformats.org/presentationml/2006/main">
   <p:cSld>
     <p:spTree>
       <p:nvGrpSpPr>
-        <p:cNvPr id="101" name="Shape 101"/>
+        <p:cNvPr id="1" name="Shape 101"/>
         <p:cNvGrpSpPr/>
         <p:nvPr/>
       </p:nvGrpSpPr>
@@ -8220,7 +8297,9 @@
       <p:sp>
         <p:nvSpPr>
           <p:cNvPr id="102" name="Google Shape;102;p19"/>
-          <p:cNvSpPr txBox="1"/>
+          <p:cNvSpPr txBox="1">
+            <a:spLocks noGrp="1"/>
+          </p:cNvSpPr>
           <p:nvPr>
             <p:ph type="title"/>
           </p:nvPr>
@@ -8235,12 +8314,12 @@
           </a:prstGeom>
         </p:spPr>
         <p:txBody>
-          <a:bodyPr anchorCtr="0" anchor="b" bIns="91425" lIns="91425" spcFirstLastPara="1" rIns="91425" wrap="square" tIns="91425">
+          <a:bodyPr spcFirstLastPara="1" wrap="square" lIns="91425" tIns="91425" rIns="91425" bIns="91425" anchor="b" anchorCtr="0">
             <a:noAutofit/>
           </a:bodyPr>
           <a:lstStyle/>
           <a:p>
-            <a:pPr indent="0" lvl="0" marL="0" rtl="0" algn="l">
+            <a:pPr marL="0" lvl="0" indent="0" algn="l" rtl="0">
               <a:spcBef>
                 <a:spcPts val="0"/>
               </a:spcBef>
@@ -8251,19 +8330,7 @@
             </a:pPr>
             <a:r>
               <a:rPr lang="en"/>
-              <a:t>Functionalities</a:t>
-            </a:r>
-            <a:r>
-              <a:rPr lang="en"/>
-              <a:t> </a:t>
-            </a:r>
-            <a:r>
-              <a:rPr lang="en"/>
-              <a:t>Prototyped</a:t>
-            </a:r>
-            <a:r>
-              <a:rPr lang="en"/>
-              <a:t> </a:t>
+              <a:t>Functionalities Prototyped </a:t>
             </a:r>
             <a:endParaRPr/>
           </a:p>
@@ -8272,9 +8339,11 @@
       <p:sp>
         <p:nvSpPr>
           <p:cNvPr id="103" name="Google Shape;103;p19"/>
-          <p:cNvSpPr txBox="1"/>
+          <p:cNvSpPr txBox="1">
+            <a:spLocks noGrp="1"/>
+          </p:cNvSpPr>
           <p:nvPr>
-            <p:ph idx="1" type="body"/>
+            <p:ph type="body" idx="1"/>
           </p:nvPr>
         </p:nvSpPr>
         <p:spPr>
@@ -8287,12 +8356,12 @@
           </a:prstGeom>
         </p:spPr>
         <p:txBody>
-          <a:bodyPr anchorCtr="0" anchor="t" bIns="91425" lIns="91425" spcFirstLastPara="1" rIns="91425" wrap="square" tIns="91425">
+          <a:bodyPr spcFirstLastPara="1" wrap="square" lIns="91425" tIns="91425" rIns="91425" bIns="91425" anchor="t" anchorCtr="0">
             <a:noAutofit/>
           </a:bodyPr>
           <a:lstStyle/>
           <a:p>
-            <a:pPr indent="-336550" lvl="0" marL="457200" rtl="0" algn="l">
+            <a:pPr marL="457200" lvl="0" indent="-336550" algn="l" rtl="0">
               <a:spcBef>
                 <a:spcPts val="0"/>
               </a:spcBef>
@@ -8303,25 +8372,17 @@
               <a:buAutoNum type="arabicParenR"/>
             </a:pPr>
             <a:r>
-              <a:rPr b="1" lang="en" sz="1700"/>
+              <a:rPr lang="en" sz="1700" b="1"/>
               <a:t>Algorithm:</a:t>
             </a:r>
             <a:r>
               <a:rPr lang="en" sz="1700"/>
-              <a:t> Prototyping of the algorithm helps in providing a basis of understanding on what turf cutting using an algorithm should look like. With the basic in mind, we can implement </a:t>
-            </a:r>
-            <a:r>
-              <a:rPr lang="en" sz="1700"/>
-              <a:t>heuristics</a:t>
-            </a:r>
-            <a:r>
-              <a:rPr lang="en" sz="1700"/>
-              <a:t> to help improve the functionality of the algorithm   </a:t>
+              <a:t> Prototyping of the algorithm helps in providing a basis of understanding on what turf cutting using an algorithm should look like. With the basic in mind, we can implement heuristics to help improve the functionality of the algorithm   </a:t>
             </a:r>
             <a:endParaRPr sz="1700"/>
           </a:p>
           <a:p>
-            <a:pPr indent="-336550" lvl="0" marL="457200" rtl="0" algn="l">
+            <a:pPr marL="457200" lvl="0" indent="-336550" algn="l" rtl="0">
               <a:spcBef>
                 <a:spcPts val="0"/>
               </a:spcBef>
@@ -8332,7 +8393,7 @@
               <a:buAutoNum type="arabicParenR"/>
             </a:pPr>
             <a:r>
-              <a:rPr b="1" lang="en" sz="1700"/>
+              <a:rPr lang="en" sz="1700" b="1"/>
               <a:t>Visualization</a:t>
             </a:r>
             <a:r>
@@ -8342,7 +8403,7 @@
             <a:endParaRPr sz="1700"/>
           </a:p>
           <a:p>
-            <a:pPr indent="-342900" lvl="0" marL="457200" rtl="0" algn="l">
+            <a:pPr marL="457200" lvl="0" indent="-342900" algn="l" rtl="0">
               <a:spcBef>
                 <a:spcPts val="0"/>
               </a:spcBef>
@@ -8353,11 +8414,11 @@
               <a:buAutoNum type="arabicParenR"/>
             </a:pPr>
             <a:r>
-              <a:rPr b="1" lang="en" sz="1700"/>
+              <a:rPr lang="en" sz="1700" b="1"/>
               <a:t>COTS integration:</a:t>
             </a:r>
             <a:r>
-              <a:rPr b="1" lang="en"/>
+              <a:rPr lang="en" b="1"/>
               <a:t> </a:t>
             </a:r>
             <a:r>
@@ -8376,8 +8437,139 @@
 </p:sld>
 </file>
 
+<file path=ppt/slides/slide8.xml><?xml version="1.0" encoding="utf-8"?>
+<p:sld xmlns:a="http://schemas.openxmlformats.org/drawingml/2006/main" xmlns:r="http://schemas.openxmlformats.org/officeDocument/2006/relationships" xmlns:p="http://schemas.openxmlformats.org/presentationml/2006/main">
+  <p:cSld>
+    <p:spTree>
+      <p:nvGrpSpPr>
+        <p:cNvPr id="1" name=""/>
+        <p:cNvGrpSpPr/>
+        <p:nvPr/>
+      </p:nvGrpSpPr>
+      <p:grpSpPr>
+        <a:xfrm>
+          <a:off x="0" y="0"/>
+          <a:ext cx="0" cy="0"/>
+          <a:chOff x="0" y="0"/>
+          <a:chExt cx="0" cy="0"/>
+        </a:xfrm>
+      </p:grpSpPr>
+      <p:sp>
+        <p:nvSpPr>
+          <p:cNvPr id="2" name="Title 1">
+            <a:extLst>
+              <a:ext uri="{FF2B5EF4-FFF2-40B4-BE49-F238E27FC236}">
+                <a16:creationId xmlns:a16="http://schemas.microsoft.com/office/drawing/2014/main" id="{AF5173C1-A8C6-EB47-893C-4BF719336563}"/>
+              </a:ext>
+            </a:extLst>
+          </p:cNvPr>
+          <p:cNvSpPr>
+            <a:spLocks noGrp="1"/>
+          </p:cNvSpPr>
+          <p:nvPr>
+            <p:ph type="title"/>
+          </p:nvPr>
+        </p:nvSpPr>
+        <p:spPr/>
+        <p:txBody>
+          <a:bodyPr/>
+          <a:lstStyle/>
+          <a:p>
+            <a:r>
+              <a:rPr lang="en-US" dirty="0"/>
+              <a:t>Risk Mitigation</a:t>
+            </a:r>
+          </a:p>
+        </p:txBody>
+      </p:sp>
+      <p:sp>
+        <p:nvSpPr>
+          <p:cNvPr id="3" name="Text Placeholder 2">
+            <a:extLst>
+              <a:ext uri="{FF2B5EF4-FFF2-40B4-BE49-F238E27FC236}">
+                <a16:creationId xmlns:a16="http://schemas.microsoft.com/office/drawing/2014/main" id="{E9971BB8-5806-D747-A7DB-7D4D82621366}"/>
+              </a:ext>
+            </a:extLst>
+          </p:cNvPr>
+          <p:cNvSpPr>
+            <a:spLocks noGrp="1"/>
+          </p:cNvSpPr>
+          <p:nvPr>
+            <p:ph type="body" idx="1"/>
+          </p:nvPr>
+        </p:nvSpPr>
+        <p:spPr/>
+        <p:txBody>
+          <a:bodyPr/>
+          <a:lstStyle/>
+          <a:p>
+            <a:r>
+              <a:rPr lang="en-US" dirty="0"/>
+              <a:t>Risk - Algorithm for turf </a:t>
+            </a:r>
+            <a:r>
+              <a:rPr lang="en-US"/>
+              <a:t>cutting </a:t>
+            </a:r>
+            <a:endParaRPr lang="en-US" dirty="0"/>
+          </a:p>
+          <a:p>
+            <a:pPr marL="114300" indent="0">
+              <a:buNone/>
+            </a:pPr>
+            <a:r>
+              <a:rPr lang="en-US" dirty="0"/>
+              <a:t> Risk Mitigation – Implemented the K-means clustering algorithm which would be the foundation on top which further improvements and heuristics can be applied to add additional features.</a:t>
+            </a:r>
+          </a:p>
+          <a:p>
+            <a:r>
+              <a:rPr lang="en-US" dirty="0"/>
+              <a:t>Risk -  Visualization using COTS</a:t>
+            </a:r>
+          </a:p>
+          <a:p>
+            <a:pPr marL="114300" indent="0">
+              <a:buNone/>
+            </a:pPr>
+            <a:r>
+              <a:rPr lang="en-US" dirty="0"/>
+              <a:t> Risk Mitigation –We were successful in mitigating the risk of COTS software integration for implementing the visualization of the turfs by integrating </a:t>
+            </a:r>
+            <a:r>
+              <a:rPr lang="en-US" dirty="0" err="1"/>
+              <a:t>Mapbox</a:t>
+            </a:r>
+            <a:r>
+              <a:rPr lang="en-US" dirty="0"/>
+              <a:t> and </a:t>
+            </a:r>
+            <a:r>
+              <a:rPr lang="en-US" dirty="0" err="1"/>
+              <a:t>Jupyter</a:t>
+            </a:r>
+            <a:r>
+              <a:rPr lang="en-US" dirty="0"/>
+              <a:t> notebook for visualizing the results of the algorithm.</a:t>
+            </a:r>
+          </a:p>
+        </p:txBody>
+      </p:sp>
+    </p:spTree>
+    <p:extLst>
+      <p:ext uri="{BB962C8B-B14F-4D97-AF65-F5344CB8AC3E}">
+        <p14:creationId xmlns:p14="http://schemas.microsoft.com/office/powerpoint/2010/main" val="3321376594"/>
+      </p:ext>
+    </p:extLst>
+  </p:cSld>
+  <p:clrMapOvr>
+    <a:masterClrMapping/>
+  </p:clrMapOvr>
+</p:sld>
+</file>
+
 <file path=ppt/theme/theme1.xml><?xml version="1.0" encoding="utf-8"?>
-<a:theme xmlns:a="http://schemas.openxmlformats.org/drawingml/2006/main" xmlns:r="http://schemas.openxmlformats.org/officeDocument/2006/relationships" name="Marina">
+<a:theme xmlns:a="http://schemas.openxmlformats.org/drawingml/2006/main" name="Marina">
   <a:themeElements>
     <a:clrScheme name="Marina">
       <a:dk1>
@@ -8652,11 +8844,13 @@
       </a:bgFillStyleLst>
     </a:fmtScheme>
   </a:themeElements>
+  <a:objectDefaults/>
+  <a:extraClrSchemeLst/>
 </a:theme>
 </file>
 
 <file path=ppt/theme/theme2.xml><?xml version="1.0" encoding="utf-8"?>
-<a:theme xmlns:a="http://schemas.openxmlformats.org/drawingml/2006/main" xmlns:r="http://schemas.openxmlformats.org/officeDocument/2006/relationships">
+<a:theme xmlns:a="http://schemas.openxmlformats.org/drawingml/2006/main">
   <a:themeElements>
     <a:clrScheme name="Default">
       <a:dk1>
@@ -8931,5 +9125,7 @@
       </a:bgFillStyleLst>
     </a:fmtScheme>
   </a:themeElements>
+  <a:objectDefaults/>
+  <a:extraClrSchemeLst/>
 </a:theme>
 </file>
</xml_diff>